<commit_message>
Continue updating PowerPoint version of Storage section.
</commit_message>
<xml_diff>
--- a/undergraduate/lectures/storage.pptx
+++ b/undergraduate/lectures/storage.pptx
@@ -5,45 +5,43 @@
     <p:sldMasterId id="2147483786" r:id="rId1"/>
   </p:sldMasterIdLst>
   <p:notesMasterIdLst>
-    <p:notesMasterId r:id="rId38"/>
+    <p:notesMasterId r:id="rId36"/>
   </p:notesMasterIdLst>
   <p:sldIdLst>
     <p:sldId id="256" r:id="rId2"/>
-    <p:sldId id="257" r:id="rId3"/>
-    <p:sldId id="258" r:id="rId4"/>
-    <p:sldId id="264" r:id="rId5"/>
-    <p:sldId id="265" r:id="rId6"/>
-    <p:sldId id="266" r:id="rId7"/>
-    <p:sldId id="267" r:id="rId8"/>
-    <p:sldId id="268" r:id="rId9"/>
-    <p:sldId id="269" r:id="rId10"/>
-    <p:sldId id="270" r:id="rId11"/>
-    <p:sldId id="271" r:id="rId12"/>
-    <p:sldId id="272" r:id="rId13"/>
-    <p:sldId id="273" r:id="rId14"/>
-    <p:sldId id="259" r:id="rId15"/>
-    <p:sldId id="260" r:id="rId16"/>
-    <p:sldId id="261" r:id="rId17"/>
-    <p:sldId id="262" r:id="rId18"/>
-    <p:sldId id="263" r:id="rId19"/>
-    <p:sldId id="274" r:id="rId20"/>
-    <p:sldId id="275" r:id="rId21"/>
-    <p:sldId id="276" r:id="rId22"/>
-    <p:sldId id="277" r:id="rId23"/>
-    <p:sldId id="279" r:id="rId24"/>
-    <p:sldId id="278" r:id="rId25"/>
-    <p:sldId id="280" r:id="rId26"/>
-    <p:sldId id="281" r:id="rId27"/>
-    <p:sldId id="282" r:id="rId28"/>
-    <p:sldId id="283" r:id="rId29"/>
-    <p:sldId id="284" r:id="rId30"/>
-    <p:sldId id="285" r:id="rId31"/>
-    <p:sldId id="286" r:id="rId32"/>
-    <p:sldId id="287" r:id="rId33"/>
-    <p:sldId id="288" r:id="rId34"/>
-    <p:sldId id="289" r:id="rId35"/>
-    <p:sldId id="290" r:id="rId36"/>
-    <p:sldId id="291" r:id="rId37"/>
+    <p:sldId id="264" r:id="rId3"/>
+    <p:sldId id="265" r:id="rId4"/>
+    <p:sldId id="266" r:id="rId5"/>
+    <p:sldId id="267" r:id="rId6"/>
+    <p:sldId id="268" r:id="rId7"/>
+    <p:sldId id="269" r:id="rId8"/>
+    <p:sldId id="270" r:id="rId9"/>
+    <p:sldId id="271" r:id="rId10"/>
+    <p:sldId id="272" r:id="rId11"/>
+    <p:sldId id="273" r:id="rId12"/>
+    <p:sldId id="259" r:id="rId13"/>
+    <p:sldId id="260" r:id="rId14"/>
+    <p:sldId id="261" r:id="rId15"/>
+    <p:sldId id="262" r:id="rId16"/>
+    <p:sldId id="263" r:id="rId17"/>
+    <p:sldId id="274" r:id="rId18"/>
+    <p:sldId id="275" r:id="rId19"/>
+    <p:sldId id="276" r:id="rId20"/>
+    <p:sldId id="277" r:id="rId21"/>
+    <p:sldId id="279" r:id="rId22"/>
+    <p:sldId id="278" r:id="rId23"/>
+    <p:sldId id="280" r:id="rId24"/>
+    <p:sldId id="281" r:id="rId25"/>
+    <p:sldId id="282" r:id="rId26"/>
+    <p:sldId id="283" r:id="rId27"/>
+    <p:sldId id="284" r:id="rId28"/>
+    <p:sldId id="285" r:id="rId29"/>
+    <p:sldId id="286" r:id="rId30"/>
+    <p:sldId id="287" r:id="rId31"/>
+    <p:sldId id="288" r:id="rId32"/>
+    <p:sldId id="289" r:id="rId33"/>
+    <p:sldId id="290" r:id="rId34"/>
+    <p:sldId id="291" r:id="rId35"/>
   </p:sldIdLst>
   <p:sldSz cx="12192000" cy="6858000"/>
   <p:notesSz cx="6858000" cy="9144000"/>
@@ -232,7 +230,7 @@
           <a:p>
             <a:fld id="{EC53E720-1243-6043-B4C4-6E31C619CC0A}" type="datetimeFigureOut">
               <a:rPr lang="en-US" smtClean="0"/>
-              <a:t>2/1/17</a:t>
+              <a:t>3/1/17</a:t>
             </a:fld>
             <a:endParaRPr lang="en-US"/>
           </a:p>
@@ -731,7 +729,7 @@
           <a:p>
             <a:fld id="{6FD7C7D2-3843-074D-9A83-F18DE7D7DD8A}" type="datetime1">
               <a:rPr lang="en-US" smtClean="0"/>
-              <a:t>2/1/17</a:t>
+              <a:t>3/1/17</a:t>
             </a:fld>
             <a:endParaRPr lang="en-US"/>
           </a:p>
@@ -1010,7 +1008,7 @@
           <a:p>
             <a:fld id="{1845299F-DBA6-8144-8C5D-0535750AFB51}" type="datetime1">
               <a:rPr lang="en-US" smtClean="0"/>
-              <a:t>2/1/17</a:t>
+              <a:t>3/1/17</a:t>
             </a:fld>
             <a:endParaRPr lang="en-US"/>
           </a:p>
@@ -1265,7 +1263,7 @@
           <a:p>
             <a:fld id="{F317D0FE-1E91-D842-A8A8-8B23377F1877}" type="datetime1">
               <a:rPr lang="en-US" smtClean="0"/>
-              <a:t>2/1/17</a:t>
+              <a:t>3/1/17</a:t>
             </a:fld>
             <a:endParaRPr lang="en-US"/>
           </a:p>
@@ -1574,7 +1572,7 @@
           <a:p>
             <a:fld id="{BC4AE5AA-C6FF-5A4F-9D02-E3454F0B3602}" type="datetime1">
               <a:rPr lang="en-US" smtClean="0"/>
-              <a:t>2/1/17</a:t>
+              <a:t>3/1/17</a:t>
             </a:fld>
             <a:endParaRPr lang="en-US"/>
           </a:p>
@@ -1923,7 +1921,7 @@
           <a:p>
             <a:fld id="{3970F026-0185-804B-BF05-EA6EC33EA811}" type="datetime1">
               <a:rPr lang="en-US" smtClean="0"/>
-              <a:t>2/1/17</a:t>
+              <a:t>3/1/17</a:t>
             </a:fld>
             <a:endParaRPr lang="en-US"/>
           </a:p>
@@ -2217,7 +2215,7 @@
           <a:p>
             <a:fld id="{DE81AA58-E2C3-4F48-B04E-18D114E0E0D1}" type="datetime1">
               <a:rPr lang="en-US" smtClean="0"/>
-              <a:t>2/1/17</a:t>
+              <a:t>3/1/17</a:t>
             </a:fld>
             <a:endParaRPr lang="en-US" dirty="0"/>
           </a:p>
@@ -2604,7 +2602,7 @@
           <a:p>
             <a:fld id="{6EC7CDD8-D400-0544-8ADA-779D39154084}" type="datetime1">
               <a:rPr lang="en-US" smtClean="0"/>
-              <a:t>2/1/17</a:t>
+              <a:t>3/1/17</a:t>
             </a:fld>
             <a:endParaRPr lang="en-US"/>
           </a:p>
@@ -2728,7 +2726,7 @@
           <a:p>
             <a:fld id="{9FC8F57C-E466-5D4A-8BA1-0F2DC96E6599}" type="datetime1">
               <a:rPr lang="en-US" smtClean="0"/>
-              <a:t>2/1/17</a:t>
+              <a:t>3/1/17</a:t>
             </a:fld>
             <a:endParaRPr lang="en-US"/>
           </a:p>
@@ -2905,7 +2903,7 @@
           <a:p>
             <a:fld id="{DBF46B55-EA12-F74C-9AED-0C94E9DB5CD6}" type="datetime1">
               <a:rPr lang="en-US" smtClean="0"/>
-              <a:t>2/1/17</a:t>
+              <a:t>3/1/17</a:t>
             </a:fld>
             <a:endParaRPr lang="en-US"/>
           </a:p>
@@ -3265,7 +3263,7 @@
           <a:p>
             <a:fld id="{E5E2A1D4-BDD0-AA4F-B33D-67E210B458F1}" type="datetime1">
               <a:rPr lang="en-US" smtClean="0"/>
-              <a:t>2/1/17</a:t>
+              <a:t>3/1/17</a:t>
             </a:fld>
             <a:endParaRPr lang="en-US"/>
           </a:p>
@@ -3650,7 +3648,7 @@
           <a:p>
             <a:fld id="{D826F452-4A85-5248-B350-1D6DEB55B823}" type="datetime1">
               <a:rPr lang="en-US" smtClean="0"/>
-              <a:t>2/1/17</a:t>
+              <a:t>3/1/17</a:t>
             </a:fld>
             <a:endParaRPr lang="en-US"/>
           </a:p>
@@ -3937,7 +3935,7 @@
             <a:fld id="{53287F0B-3DC9-8F47-B5AF-DFDDA54774AE}" type="datetime1">
               <a:rPr lang="en-US" smtClean="0"/>
               <a:pPr/>
-              <a:t>2/1/17</a:t>
+              <a:t>3/1/17</a:t>
             </a:fld>
             <a:endParaRPr lang="en-US" dirty="0"/>
           </a:p>
@@ -4654,30 +4652,7 @@
           <a:p>
             <a:r>
               <a:rPr lang="en-US" dirty="0" smtClean="0"/>
-              <a:t>Parameters and Trade Offs	</a:t>
-            </a:r>
-            <a:endParaRPr lang="en-US" dirty="0"/>
-          </a:p>
-        </p:txBody>
-      </p:sp>
-      <p:sp>
-        <p:nvSpPr>
-          <p:cNvPr id="3" name="Content Placeholder 2"/>
-          <p:cNvSpPr>
-            <a:spLocks noGrp="1"/>
-          </p:cNvSpPr>
-          <p:nvPr>
-            <p:ph idx="1"/>
-          </p:nvPr>
-        </p:nvSpPr>
-        <p:spPr/>
-        <p:txBody>
-          <a:bodyPr/>
-          <a:lstStyle/>
-          <a:p>
-            <a:r>
-              <a:rPr lang="en-US" dirty="0" smtClean="0"/>
-              <a:t>Block Size </a:t>
+              <a:t>close() </a:t>
             </a:r>
             <a:r>
               <a:rPr lang="mr-IN" dirty="0" smtClean="0"/>
@@ -4685,21 +4660,7 @@
             </a:r>
             <a:r>
               <a:rPr lang="en-US" dirty="0" smtClean="0"/>
-              <a:t> Bytes per block</a:t>
-            </a:r>
-          </a:p>
-          <a:p>
-            <a:r>
-              <a:rPr lang="en-US" dirty="0" smtClean="0"/>
-              <a:t>Indirect Blocks </a:t>
-            </a:r>
-            <a:r>
-              <a:rPr lang="mr-IN" dirty="0" smtClean="0"/>
-              <a:t>–</a:t>
-            </a:r>
-            <a:r>
-              <a:rPr lang="en-US" dirty="0" smtClean="0"/>
-              <a:t> How many blocks can we reference?</a:t>
+              <a:t> the opposite of open()</a:t>
             </a:r>
             <a:endParaRPr lang="en-US" dirty="0"/>
           </a:p>
@@ -4707,6 +4668,53 @@
       </p:sp>
       <p:sp>
         <p:nvSpPr>
+          <p:cNvPr id="3" name="Content Placeholder 2"/>
+          <p:cNvSpPr>
+            <a:spLocks noGrp="1"/>
+          </p:cNvSpPr>
+          <p:nvPr>
+            <p:ph idx="1"/>
+          </p:nvPr>
+        </p:nvSpPr>
+        <p:spPr/>
+        <p:txBody>
+          <a:bodyPr/>
+          <a:lstStyle/>
+          <a:p>
+            <a:r>
+              <a:rPr lang="en-US" dirty="0" smtClean="0"/>
+              <a:t>Remove the file descriptor from the process</a:t>
+            </a:r>
+          </a:p>
+          <a:p>
+            <a:pPr lvl="1"/>
+            <a:r>
+              <a:rPr lang="en-US" dirty="0" smtClean="0"/>
+              <a:t>It can now be re-used</a:t>
+            </a:r>
+          </a:p>
+          <a:p>
+            <a:r>
+              <a:rPr lang="en-US" dirty="0" smtClean="0"/>
+              <a:t>Tells the kernel it can free </a:t>
+            </a:r>
+            <a:r>
+              <a:rPr lang="en-US" dirty="0" err="1" smtClean="0"/>
+              <a:t>reources</a:t>
+            </a:r>
+            <a:endParaRPr lang="en-US" dirty="0" smtClean="0"/>
+          </a:p>
+          <a:p>
+            <a:pPr lvl="1"/>
+            <a:r>
+              <a:rPr lang="en-US" dirty="0" smtClean="0"/>
+              <a:t>But only if absolutely necessary</a:t>
+            </a:r>
+          </a:p>
+        </p:txBody>
+      </p:sp>
+      <p:sp>
+        <p:nvSpPr>
           <p:cNvPr id="4" name="Date Placeholder 3"/>
           <p:cNvSpPr>
             <a:spLocks noGrp="1"/>
@@ -4722,7 +4730,7 @@
           <a:p>
             <a:fld id="{BC4AE5AA-C6FF-5A4F-9D02-E3454F0B3602}" type="datetime1">
               <a:rPr lang="en-US" smtClean="0"/>
-              <a:t>2/1/17</a:t>
+              <a:t>3/1/17</a:t>
             </a:fld>
             <a:endParaRPr lang="en-US"/>
           </a:p>
@@ -4777,7 +4785,7 @@
     </p:spTree>
     <p:extLst>
       <p:ext uri="{BB962C8B-B14F-4D97-AF65-F5344CB8AC3E}">
-        <p14:creationId xmlns:p14="http://schemas.microsoft.com/office/powerpoint/2010/main" val="962404221"/>
+        <p14:creationId xmlns:p14="http://schemas.microsoft.com/office/powerpoint/2010/main" val="1585593155"/>
       </p:ext>
     </p:extLst>
   </p:cSld>
@@ -4821,7 +4829,7 @@
           <a:p>
             <a:r>
               <a:rPr lang="en-US" dirty="0" smtClean="0"/>
-              <a:t>A walk through open()</a:t>
+              <a:t>File Management Operations</a:t>
             </a:r>
             <a:endParaRPr lang="en-US" dirty="0"/>
           </a:p>
@@ -4842,81 +4850,55 @@
           <a:bodyPr/>
           <a:lstStyle/>
           <a:p>
-            <a:pPr marL="457200" indent="-457200">
-              <a:buFont typeface="+mj-lt"/>
-              <a:buAutoNum type="arabicPeriod"/>
-            </a:pPr>
-            <a:r>
-              <a:rPr lang="en-US" dirty="0" smtClean="0"/>
-              <a:t>open(”foo”)</a:t>
-            </a:r>
-          </a:p>
-          <a:p>
-            <a:pPr marL="457200" indent="-457200">
-              <a:buFont typeface="+mj-lt"/>
-              <a:buAutoNum type="arabicPeriod"/>
-            </a:pPr>
-            <a:r>
-              <a:rPr lang="en-US" dirty="0" smtClean="0"/>
-              <a:t>Execute the open() system call</a:t>
-            </a:r>
-          </a:p>
-          <a:p>
-            <a:pPr marL="457200" indent="-457200">
-              <a:buFont typeface="+mj-lt"/>
-              <a:buAutoNum type="arabicPeriod"/>
-            </a:pPr>
-            <a:r>
-              <a:rPr lang="en-US" dirty="0" smtClean="0"/>
-              <a:t>Look up the file name</a:t>
-            </a:r>
-          </a:p>
-          <a:p>
-            <a:pPr marL="457200" indent="-457200">
-              <a:buFont typeface="+mj-lt"/>
-              <a:buAutoNum type="arabicPeriod"/>
-            </a:pPr>
-            <a:r>
-              <a:rPr lang="en-US" dirty="0" smtClean="0"/>
-              <a:t>Check the </a:t>
-            </a:r>
+            <a:r>
+              <a:rPr lang="en-US" dirty="0" smtClean="0"/>
+              <a:t>Managing the meta-data</a:t>
+            </a:r>
+          </a:p>
+          <a:p>
             <a:r>
               <a:rPr lang="en-US" dirty="0" err="1" smtClean="0"/>
-              <a:t>users’s</a:t>
-            </a:r>
-            <a:r>
-              <a:rPr lang="en-US" dirty="0" smtClean="0"/>
-              <a:t> permissions against the file permissions</a:t>
-            </a:r>
-          </a:p>
-          <a:p>
-            <a:pPr marL="457200" indent="-457200">
-              <a:buFont typeface="+mj-lt"/>
-              <a:buAutoNum type="arabicPeriod"/>
-            </a:pPr>
-            <a:r>
-              <a:rPr lang="en-US" dirty="0" smtClean="0"/>
-              <a:t>Kernel records the fact that the file is open</a:t>
-            </a:r>
-          </a:p>
-          <a:p>
-            <a:pPr marL="457200" indent="-457200">
-              <a:buFont typeface="+mj-lt"/>
-              <a:buAutoNum type="arabicPeriod"/>
-            </a:pPr>
-            <a:r>
-              <a:rPr lang="en-US" dirty="0" smtClean="0"/>
-              <a:t>Per-process file descriptor allocated and returned to the caller</a:t>
-            </a:r>
-          </a:p>
-          <a:p>
-            <a:pPr marL="457200" indent="-457200">
-              <a:buFont typeface="+mj-lt"/>
-              <a:buAutoNum type="arabicPeriod"/>
-            </a:pPr>
-            <a:r>
-              <a:rPr lang="en-US" dirty="0" smtClean="0"/>
-              <a:t>No data is moved</a:t>
+              <a:t>Creat</a:t>
+            </a:r>
+            <a:r>
+              <a:rPr lang="en-US" dirty="0" smtClean="0"/>
+              <a:t> </a:t>
+            </a:r>
+            <a:r>
+              <a:rPr lang="mr-IN" dirty="0" smtClean="0"/>
+              <a:t>–</a:t>
+            </a:r>
+            <a:r>
+              <a:rPr lang="en-US" dirty="0" smtClean="0"/>
+              <a:t> Make a new file</a:t>
+            </a:r>
+          </a:p>
+          <a:p>
+            <a:r>
+              <a:rPr lang="en-US" dirty="0" smtClean="0"/>
+              <a:t>Delete </a:t>
+            </a:r>
+            <a:r>
+              <a:rPr lang="mr-IN" dirty="0" smtClean="0"/>
+              <a:t>–</a:t>
+            </a:r>
+            <a:r>
+              <a:rPr lang="en-US" dirty="0" smtClean="0"/>
+              <a:t> Remove a file</a:t>
+            </a:r>
+          </a:p>
+          <a:p>
+            <a:r>
+              <a:rPr lang="en-US" dirty="0" smtClean="0"/>
+              <a:t>Rename </a:t>
+            </a:r>
+            <a:r>
+              <a:rPr lang="mr-IN" dirty="0" smtClean="0"/>
+              <a:t>–</a:t>
+            </a:r>
+            <a:r>
+              <a:rPr lang="en-US" dirty="0" smtClean="0"/>
+              <a:t> Change the name of a file</a:t>
             </a:r>
             <a:endParaRPr lang="en-US" dirty="0"/>
           </a:p>
@@ -4939,7 +4921,7 @@
           <a:p>
             <a:fld id="{BC4AE5AA-C6FF-5A4F-9D02-E3454F0B3602}" type="datetime1">
               <a:rPr lang="en-US" smtClean="0"/>
-              <a:t>2/1/17</a:t>
+              <a:t>3/1/17</a:t>
             </a:fld>
             <a:endParaRPr lang="en-US"/>
           </a:p>
@@ -4994,7 +4976,7 @@
     </p:spTree>
     <p:extLst>
       <p:ext uri="{BB962C8B-B14F-4D97-AF65-F5344CB8AC3E}">
-        <p14:creationId xmlns:p14="http://schemas.microsoft.com/office/powerpoint/2010/main" val="1923380657"/>
+        <p14:creationId xmlns:p14="http://schemas.microsoft.com/office/powerpoint/2010/main" val="1452075992"/>
       </p:ext>
     </p:extLst>
   </p:cSld>
@@ -5023,7 +5005,7 @@
       </p:grpSpPr>
       <p:sp>
         <p:nvSpPr>
-          <p:cNvPr id="2" name="Title 1"/>
+          <p:cNvPr id="122" name="Shape 122"/>
           <p:cNvSpPr>
             <a:spLocks noGrp="1"/>
           </p:cNvSpPr>
@@ -5031,153 +5013,72 @@
             <p:ph type="title"/>
           </p:nvPr>
         </p:nvSpPr>
-        <p:spPr/>
-        <p:txBody>
-          <a:bodyPr/>
-          <a:lstStyle/>
-          <a:p>
-            <a:r>
-              <a:rPr lang="en-US" dirty="0" smtClean="0"/>
-              <a:t>close() </a:t>
-            </a:r>
-            <a:r>
-              <a:rPr lang="mr-IN" dirty="0" smtClean="0"/>
-              <a:t>–</a:t>
-            </a:r>
-            <a:r>
-              <a:rPr lang="en-US" dirty="0" smtClean="0"/>
-              <a:t> the opposite of open()</a:t>
-            </a:r>
-            <a:endParaRPr lang="en-US" dirty="0"/>
-          </a:p>
-        </p:txBody>
-      </p:sp>
-      <p:sp>
-        <p:nvSpPr>
-          <p:cNvPr id="3" name="Content Placeholder 2"/>
-          <p:cNvSpPr>
-            <a:spLocks noGrp="1"/>
-          </p:cNvSpPr>
-          <p:nvPr>
-            <p:ph idx="1"/>
-          </p:nvPr>
-        </p:nvSpPr>
-        <p:spPr/>
-        <p:txBody>
-          <a:bodyPr/>
-          <a:lstStyle/>
-          <a:p>
-            <a:r>
-              <a:rPr lang="en-US" dirty="0" smtClean="0"/>
-              <a:t>Remove the file descriptor from the process</a:t>
-            </a:r>
-          </a:p>
-          <a:p>
-            <a:pPr lvl="1"/>
-            <a:r>
-              <a:rPr lang="en-US" dirty="0" smtClean="0"/>
-              <a:t>It can now be re-used</a:t>
-            </a:r>
-          </a:p>
-          <a:p>
-            <a:r>
-              <a:rPr lang="en-US" dirty="0" smtClean="0"/>
-              <a:t>Tells the kernel it can free </a:t>
-            </a:r>
-            <a:r>
-              <a:rPr lang="en-US" dirty="0" err="1" smtClean="0"/>
-              <a:t>reources</a:t>
-            </a:r>
-            <a:endParaRPr lang="en-US" dirty="0" smtClean="0"/>
-          </a:p>
-          <a:p>
-            <a:pPr lvl="1"/>
-            <a:r>
-              <a:rPr lang="en-US" dirty="0" smtClean="0"/>
-              <a:t>But only if absolutely necessary</a:t>
-            </a:r>
-          </a:p>
-        </p:txBody>
-      </p:sp>
-      <p:sp>
-        <p:nvSpPr>
-          <p:cNvPr id="4" name="Date Placeholder 3"/>
-          <p:cNvSpPr>
-            <a:spLocks noGrp="1"/>
-          </p:cNvSpPr>
-          <p:nvPr>
-            <p:ph type="dt" sz="half" idx="10"/>
-          </p:nvPr>
-        </p:nvSpPr>
-        <p:spPr/>
-        <p:txBody>
-          <a:bodyPr/>
-          <a:lstStyle/>
-          <a:p>
-            <a:fld id="{BC4AE5AA-C6FF-5A4F-9D02-E3454F0B3602}" type="datetime1">
-              <a:rPr lang="en-US" smtClean="0"/>
-              <a:t>2/1/17</a:t>
-            </a:fld>
-            <a:endParaRPr lang="en-US"/>
-          </a:p>
-        </p:txBody>
-      </p:sp>
-      <p:sp>
-        <p:nvSpPr>
-          <p:cNvPr id="5" name="Footer Placeholder 4"/>
-          <p:cNvSpPr>
-            <a:spLocks noGrp="1"/>
-          </p:cNvSpPr>
-          <p:nvPr>
-            <p:ph type="ftr" sz="quarter" idx="11"/>
-          </p:nvPr>
-        </p:nvSpPr>
-        <p:spPr/>
-        <p:txBody>
-          <a:bodyPr/>
-          <a:lstStyle/>
-          <a:p>
-            <a:r>
-              <a:rPr lang="en-US" smtClean="0"/>
-              <a:t>Developing Products with FreeBSD</a:t>
-            </a:r>
-            <a:endParaRPr lang="en-US" dirty="0"/>
-          </a:p>
-        </p:txBody>
-      </p:sp>
-      <p:sp>
-        <p:nvSpPr>
-          <p:cNvPr id="6" name="Slide Number Placeholder 5"/>
-          <p:cNvSpPr>
-            <a:spLocks noGrp="1"/>
-          </p:cNvSpPr>
-          <p:nvPr>
-            <p:ph type="sldNum" sz="quarter" idx="12"/>
-          </p:nvPr>
-        </p:nvSpPr>
-        <p:spPr/>
-        <p:txBody>
-          <a:bodyPr/>
-          <a:lstStyle/>
-          <a:p>
-            <a:fld id="{699C44C4-0FAD-8046-A5C4-05AB318FA424}" type="slidenum">
-              <a:rPr lang="en-US" smtClean="0"/>
-              <a:t>12</a:t>
-            </a:fld>
-            <a:endParaRPr lang="en-US"/>
+        <p:spPr>
+          <a:prstGeom prst="rect">
+            <a:avLst/>
+          </a:prstGeom>
+        </p:spPr>
+        <p:txBody>
+          <a:bodyPr/>
+          <a:lstStyle/>
+          <a:p>
+            <a:r>
+              <a:t>Renaming</a:t>
+            </a:r>
+          </a:p>
+        </p:txBody>
+      </p:sp>
+      <p:sp>
+        <p:nvSpPr>
+          <p:cNvPr id="123" name="Shape 123"/>
+          <p:cNvSpPr>
+            <a:spLocks noGrp="1"/>
+          </p:cNvSpPr>
+          <p:nvPr>
+            <p:ph type="body" idx="1"/>
+          </p:nvPr>
+        </p:nvSpPr>
+        <p:spPr>
+          <a:prstGeom prst="rect">
+            <a:avLst/>
+          </a:prstGeom>
+        </p:spPr>
+        <p:txBody>
+          <a:bodyPr/>
+          <a:lstStyle/>
+          <a:p>
+            <a:r>
+              <a:rPr lang="en-US" dirty="0" smtClean="0"/>
+              <a:t>The most complex operation in filesystems</a:t>
+            </a:r>
+          </a:p>
+          <a:p>
+            <a:r>
+              <a:rPr lang="en-US" dirty="0" smtClean="0"/>
+              <a:t>Idempotent directory updates</a:t>
+            </a:r>
+            <a:endParaRPr dirty="0"/>
           </a:p>
         </p:txBody>
       </p:sp>
     </p:spTree>
     <p:extLst>
       <p:ext uri="{BB962C8B-B14F-4D97-AF65-F5344CB8AC3E}">
-        <p14:creationId xmlns:p14="http://schemas.microsoft.com/office/powerpoint/2010/main" val="1585593155"/>
+        <p14:creationId xmlns:p14="http://schemas.microsoft.com/office/powerpoint/2010/main" val="619641373"/>
       </p:ext>
     </p:extLst>
   </p:cSld>
   <p:clrMapOvr>
     <a:masterClrMapping/>
   </p:clrMapOvr>
+  <p:transition spd="med"/>
+  <p:timing>
+    <p:tnLst>
+      <p:par>
+        <p:cTn id="1" dur="indefinite" restart="never" nodeType="tmRoot"/>
+      </p:par>
+    </p:tnLst>
+  </p:timing>
 </p:sld>
 </file>
 
@@ -5200,7 +5101,7 @@
       </p:grpSpPr>
       <p:sp>
         <p:nvSpPr>
-          <p:cNvPr id="2" name="Title 1"/>
+          <p:cNvPr id="125" name="Shape 125"/>
           <p:cNvSpPr>
             <a:spLocks noGrp="1"/>
           </p:cNvSpPr>
@@ -5208,167 +5109,62 @@
             <p:ph type="title"/>
           </p:nvPr>
         </p:nvSpPr>
-        <p:spPr/>
-        <p:txBody>
-          <a:bodyPr/>
-          <a:lstStyle/>
-          <a:p>
-            <a:r>
-              <a:rPr lang="en-US" dirty="0" smtClean="0"/>
-              <a:t>File Management Operations</a:t>
-            </a:r>
-            <a:endParaRPr lang="en-US" dirty="0"/>
-          </a:p>
-        </p:txBody>
-      </p:sp>
-      <p:sp>
-        <p:nvSpPr>
-          <p:cNvPr id="3" name="Content Placeholder 2"/>
-          <p:cNvSpPr>
-            <a:spLocks noGrp="1"/>
-          </p:cNvSpPr>
-          <p:nvPr>
-            <p:ph idx="1"/>
-          </p:nvPr>
-        </p:nvSpPr>
-        <p:spPr/>
-        <p:txBody>
-          <a:bodyPr/>
-          <a:lstStyle/>
-          <a:p>
-            <a:r>
-              <a:rPr lang="en-US" dirty="0" smtClean="0"/>
-              <a:t>Managing the meta-data</a:t>
-            </a:r>
-          </a:p>
-          <a:p>
-            <a:r>
-              <a:rPr lang="en-US" dirty="0" err="1" smtClean="0"/>
-              <a:t>Creat</a:t>
-            </a:r>
-            <a:r>
-              <a:rPr lang="en-US" dirty="0" smtClean="0"/>
-              <a:t> </a:t>
-            </a:r>
-            <a:r>
-              <a:rPr lang="mr-IN" dirty="0" smtClean="0"/>
-              <a:t>–</a:t>
-            </a:r>
-            <a:r>
-              <a:rPr lang="en-US" dirty="0" smtClean="0"/>
-              <a:t> Make a new file</a:t>
-            </a:r>
-          </a:p>
-          <a:p>
-            <a:r>
-              <a:rPr lang="en-US" dirty="0" smtClean="0"/>
-              <a:t>Delete </a:t>
-            </a:r>
-            <a:r>
-              <a:rPr lang="mr-IN" dirty="0" smtClean="0"/>
-              <a:t>–</a:t>
-            </a:r>
-            <a:r>
-              <a:rPr lang="en-US" dirty="0" smtClean="0"/>
-              <a:t> Remove a file</a:t>
-            </a:r>
-          </a:p>
-          <a:p>
-            <a:r>
-              <a:rPr lang="en-US" dirty="0" smtClean="0"/>
-              <a:t>Rename </a:t>
-            </a:r>
-            <a:r>
-              <a:rPr lang="mr-IN" dirty="0" smtClean="0"/>
-              <a:t>–</a:t>
-            </a:r>
-            <a:r>
-              <a:rPr lang="en-US" dirty="0" smtClean="0"/>
-              <a:t> Change the name of a file</a:t>
-            </a:r>
-            <a:endParaRPr lang="en-US" dirty="0"/>
-          </a:p>
-        </p:txBody>
-      </p:sp>
-      <p:sp>
-        <p:nvSpPr>
-          <p:cNvPr id="4" name="Date Placeholder 3"/>
-          <p:cNvSpPr>
-            <a:spLocks noGrp="1"/>
-          </p:cNvSpPr>
-          <p:nvPr>
-            <p:ph type="dt" sz="half" idx="10"/>
-          </p:nvPr>
-        </p:nvSpPr>
-        <p:spPr/>
-        <p:txBody>
-          <a:bodyPr/>
-          <a:lstStyle/>
-          <a:p>
-            <a:fld id="{BC4AE5AA-C6FF-5A4F-9D02-E3454F0B3602}" type="datetime1">
-              <a:rPr lang="en-US" smtClean="0"/>
-              <a:t>2/1/17</a:t>
-            </a:fld>
-            <a:endParaRPr lang="en-US"/>
-          </a:p>
-        </p:txBody>
-      </p:sp>
-      <p:sp>
-        <p:nvSpPr>
-          <p:cNvPr id="5" name="Footer Placeholder 4"/>
-          <p:cNvSpPr>
-            <a:spLocks noGrp="1"/>
-          </p:cNvSpPr>
-          <p:nvPr>
-            <p:ph type="ftr" sz="quarter" idx="11"/>
-          </p:nvPr>
-        </p:nvSpPr>
-        <p:spPr/>
-        <p:txBody>
-          <a:bodyPr/>
-          <a:lstStyle/>
-          <a:p>
-            <a:r>
-              <a:rPr lang="en-US" smtClean="0"/>
-              <a:t>Developing Products with FreeBSD</a:t>
-            </a:r>
-            <a:endParaRPr lang="en-US" dirty="0"/>
-          </a:p>
-        </p:txBody>
-      </p:sp>
-      <p:sp>
-        <p:nvSpPr>
-          <p:cNvPr id="6" name="Slide Number Placeholder 5"/>
-          <p:cNvSpPr>
-            <a:spLocks noGrp="1"/>
-          </p:cNvSpPr>
-          <p:nvPr>
-            <p:ph type="sldNum" sz="quarter" idx="12"/>
-          </p:nvPr>
-        </p:nvSpPr>
-        <p:spPr/>
-        <p:txBody>
-          <a:bodyPr/>
-          <a:lstStyle/>
-          <a:p>
-            <a:fld id="{699C44C4-0FAD-8046-A5C4-05AB318FA424}" type="slidenum">
-              <a:rPr lang="en-US" smtClean="0"/>
-              <a:t>13</a:t>
-            </a:fld>
-            <a:endParaRPr lang="en-US"/>
+        <p:spPr>
+          <a:prstGeom prst="rect">
+            <a:avLst/>
+          </a:prstGeom>
+        </p:spPr>
+        <p:txBody>
+          <a:bodyPr/>
+          <a:lstStyle/>
+          <a:p>
+            <a:r>
+              <a:t>Updates required</a:t>
+            </a:r>
+          </a:p>
+        </p:txBody>
+      </p:sp>
+      <p:sp>
+        <p:nvSpPr>
+          <p:cNvPr id="126" name="Shape 126"/>
+          <p:cNvSpPr>
+            <a:spLocks noGrp="1"/>
+          </p:cNvSpPr>
+          <p:nvPr>
+            <p:ph type="body" idx="1"/>
+          </p:nvPr>
+        </p:nvSpPr>
+        <p:spPr>
+          <a:prstGeom prst="rect">
+            <a:avLst/>
+          </a:prstGeom>
+        </p:spPr>
+        <p:txBody>
+          <a:bodyPr/>
+          <a:lstStyle/>
+          <a:p>
+            <a:endParaRPr/>
           </a:p>
         </p:txBody>
       </p:sp>
     </p:spTree>
     <p:extLst>
       <p:ext uri="{BB962C8B-B14F-4D97-AF65-F5344CB8AC3E}">
-        <p14:creationId xmlns:p14="http://schemas.microsoft.com/office/powerpoint/2010/main" val="1452075992"/>
+        <p14:creationId xmlns:p14="http://schemas.microsoft.com/office/powerpoint/2010/main" val="1164351708"/>
       </p:ext>
     </p:extLst>
   </p:cSld>
   <p:clrMapOvr>
     <a:masterClrMapping/>
   </p:clrMapOvr>
+  <p:transition spd="med"/>
+  <p:timing>
+    <p:tnLst>
+      <p:par>
+        <p:cTn id="1" dur="indefinite" restart="never" nodeType="tmRoot"/>
+      </p:par>
+    </p:tnLst>
+  </p:timing>
 </p:sld>
 </file>
 
@@ -5391,7 +5187,7 @@
       </p:grpSpPr>
       <p:sp>
         <p:nvSpPr>
-          <p:cNvPr id="122" name="Shape 122"/>
+          <p:cNvPr id="128" name="Shape 128"/>
           <p:cNvSpPr>
             <a:spLocks noGrp="1"/>
           </p:cNvSpPr>
@@ -5409,14 +5205,14 @@
           <a:lstStyle/>
           <a:p>
             <a:r>
-              <a:t>Renaming</a:t>
-            </a:r>
-          </a:p>
-        </p:txBody>
-      </p:sp>
-      <p:sp>
-        <p:nvSpPr>
-          <p:cNvPr id="123" name="Shape 123"/>
+              <a:t>Step by step</a:t>
+            </a:r>
+          </a:p>
+        </p:txBody>
+      </p:sp>
+      <p:sp>
+        <p:nvSpPr>
+          <p:cNvPr id="129" name="Shape 129"/>
           <p:cNvSpPr>
             <a:spLocks noGrp="1"/>
           </p:cNvSpPr>
@@ -5434,23 +5230,25 @@
           <a:lstStyle/>
           <a:p>
             <a:r>
-              <a:rPr lang="en-US" dirty="0" smtClean="0"/>
-              <a:t>The most complex operation in filesystems</a:t>
-            </a:r>
-          </a:p>
-          <a:p>
-            <a:r>
-              <a:rPr lang="en-US" dirty="0" smtClean="0"/>
-              <a:t>Idempotent directory updates</a:t>
-            </a:r>
-            <a:endParaRPr dirty="0"/>
+              <a:t>Rights check </a:t>
+            </a:r>
+          </a:p>
+          <a:p>
+            <a:r>
+              <a:t>Lock containing directory</a:t>
+            </a:r>
+          </a:p>
+          <a:p>
+            <a:r>
+              <a:t>Inode?</a:t>
+            </a:r>
           </a:p>
         </p:txBody>
       </p:sp>
     </p:spTree>
     <p:extLst>
       <p:ext uri="{BB962C8B-B14F-4D97-AF65-F5344CB8AC3E}">
-        <p14:creationId xmlns:p14="http://schemas.microsoft.com/office/powerpoint/2010/main" val="619641373"/>
+        <p14:creationId xmlns:p14="http://schemas.microsoft.com/office/powerpoint/2010/main" val="1388164892"/>
       </p:ext>
     </p:extLst>
   </p:cSld>
@@ -5458,6 +5256,13 @@
     <a:masterClrMapping/>
   </p:clrMapOvr>
   <p:transition spd="med"/>
+  <p:timing>
+    <p:tnLst>
+      <p:par>
+        <p:cTn id="1" dur="indefinite" restart="never" nodeType="tmRoot"/>
+      </p:par>
+    </p:tnLst>
+  </p:timing>
 </p:sld>
 </file>
 
@@ -5480,7 +5285,7 @@
       </p:grpSpPr>
       <p:sp>
         <p:nvSpPr>
-          <p:cNvPr id="125" name="Shape 125"/>
+          <p:cNvPr id="131" name="Shape 131"/>
           <p:cNvSpPr>
             <a:spLocks noGrp="1"/>
           </p:cNvSpPr>
@@ -5498,14 +5303,14 @@
           <a:lstStyle/>
           <a:p>
             <a:r>
-              <a:t>Updates required</a:t>
-            </a:r>
-          </a:p>
-        </p:txBody>
-      </p:sp>
-      <p:sp>
-        <p:nvSpPr>
-          <p:cNvPr id="126" name="Shape 126"/>
+              <a:t>Within a directory</a:t>
+            </a:r>
+          </a:p>
+        </p:txBody>
+      </p:sp>
+      <p:sp>
+        <p:nvSpPr>
+          <p:cNvPr id="132" name="Shape 132"/>
           <p:cNvSpPr>
             <a:spLocks noGrp="1"/>
           </p:cNvSpPr>
@@ -5529,7 +5334,7 @@
     </p:spTree>
     <p:extLst>
       <p:ext uri="{BB962C8B-B14F-4D97-AF65-F5344CB8AC3E}">
-        <p14:creationId xmlns:p14="http://schemas.microsoft.com/office/powerpoint/2010/main" val="1164351708"/>
+        <p14:creationId xmlns:p14="http://schemas.microsoft.com/office/powerpoint/2010/main" val="624998836"/>
       </p:ext>
     </p:extLst>
   </p:cSld>
@@ -5537,6 +5342,13 @@
     <a:masterClrMapping/>
   </p:clrMapOvr>
   <p:transition spd="med"/>
+  <p:timing>
+    <p:tnLst>
+      <p:par>
+        <p:cTn id="1" dur="indefinite" restart="never" nodeType="tmRoot"/>
+      </p:par>
+    </p:tnLst>
+  </p:timing>
 </p:sld>
 </file>
 
@@ -5559,7 +5371,7 @@
       </p:grpSpPr>
       <p:sp>
         <p:nvSpPr>
-          <p:cNvPr id="128" name="Shape 128"/>
+          <p:cNvPr id="134" name="Shape 134"/>
           <p:cNvSpPr>
             <a:spLocks noGrp="1"/>
           </p:cNvSpPr>
@@ -5577,14 +5389,14 @@
           <a:lstStyle/>
           <a:p>
             <a:r>
-              <a:t>Step by step</a:t>
-            </a:r>
-          </a:p>
-        </p:txBody>
-      </p:sp>
-      <p:sp>
-        <p:nvSpPr>
-          <p:cNvPr id="129" name="Shape 129"/>
+              <a:t>Between directories</a:t>
+            </a:r>
+          </a:p>
+        </p:txBody>
+      </p:sp>
+      <p:sp>
+        <p:nvSpPr>
+          <p:cNvPr id="135" name="Shape 135"/>
           <p:cNvSpPr>
             <a:spLocks noGrp="1"/>
           </p:cNvSpPr>
@@ -5601,26 +5413,14 @@
           <a:bodyPr/>
           <a:lstStyle/>
           <a:p>
-            <a:r>
-              <a:t>Rights check </a:t>
-            </a:r>
-          </a:p>
-          <a:p>
-            <a:r>
-              <a:t>Lock containing directory</a:t>
-            </a:r>
-          </a:p>
-          <a:p>
-            <a:r>
-              <a:t>Inode?</a:t>
-            </a:r>
+            <a:endParaRPr/>
           </a:p>
         </p:txBody>
       </p:sp>
     </p:spTree>
     <p:extLst>
       <p:ext uri="{BB962C8B-B14F-4D97-AF65-F5344CB8AC3E}">
-        <p14:creationId xmlns:p14="http://schemas.microsoft.com/office/powerpoint/2010/main" val="1388164892"/>
+        <p14:creationId xmlns:p14="http://schemas.microsoft.com/office/powerpoint/2010/main" val="1012919175"/>
       </p:ext>
     </p:extLst>
   </p:cSld>
@@ -5650,7 +5450,7 @@
       </p:grpSpPr>
       <p:sp>
         <p:nvSpPr>
-          <p:cNvPr id="131" name="Shape 131"/>
+          <p:cNvPr id="2" name="Title 1"/>
           <p:cNvSpPr>
             <a:spLocks noGrp="1"/>
           </p:cNvSpPr>
@@ -5658,24 +5458,22 @@
             <p:ph type="title"/>
           </p:nvPr>
         </p:nvSpPr>
-        <p:spPr>
-          <a:prstGeom prst="rect">
-            <a:avLst/>
-          </a:prstGeom>
-        </p:spPr>
-        <p:txBody>
-          <a:bodyPr/>
-          <a:lstStyle/>
-          <a:p>
-            <a:r>
-              <a:t>Within a directory</a:t>
-            </a:r>
-          </a:p>
-        </p:txBody>
-      </p:sp>
-      <p:sp>
-        <p:nvSpPr>
-          <p:cNvPr id="132" name="Shape 132"/>
+        <p:spPr/>
+        <p:txBody>
+          <a:bodyPr/>
+          <a:lstStyle/>
+          <a:p>
+            <a:r>
+              <a:rPr lang="en-US" dirty="0" smtClean="0"/>
+              <a:t>Interactions with Other Subsystems</a:t>
+            </a:r>
+            <a:endParaRPr lang="en-US" dirty="0"/>
+          </a:p>
+        </p:txBody>
+      </p:sp>
+      <p:sp>
+        <p:nvSpPr>
+          <p:cNvPr id="3" name="Text Placeholder 2"/>
           <p:cNvSpPr>
             <a:spLocks noGrp="1"/>
           </p:cNvSpPr>
@@ -5683,23 +5481,84 @@
             <p:ph type="body" idx="1"/>
           </p:nvPr>
         </p:nvSpPr>
-        <p:spPr>
-          <a:prstGeom prst="rect">
-            <a:avLst/>
-          </a:prstGeom>
-        </p:spPr>
-        <p:txBody>
-          <a:bodyPr/>
-          <a:lstStyle/>
-          <a:p>
-            <a:endParaRPr/>
+        <p:spPr/>
+        <p:txBody>
+          <a:bodyPr/>
+          <a:lstStyle/>
+          <a:p>
+            <a:r>
+              <a:rPr lang="en-US" dirty="0" err="1" smtClean="0"/>
+              <a:t>Virtural</a:t>
+            </a:r>
+            <a:r>
+              <a:rPr lang="en-US" dirty="0" smtClean="0"/>
+              <a:t> Memory </a:t>
+            </a:r>
+            <a:r>
+              <a:rPr lang="mr-IN" dirty="0" smtClean="0"/>
+              <a:t>–</a:t>
+            </a:r>
+            <a:r>
+              <a:rPr lang="en-US" dirty="0" smtClean="0"/>
+              <a:t> VNODES and VM Objects</a:t>
+            </a:r>
+          </a:p>
+          <a:p>
+            <a:r>
+              <a:rPr lang="en-US" dirty="0" smtClean="0"/>
+              <a:t>Buffer Cache</a:t>
+            </a:r>
+          </a:p>
+          <a:p>
+            <a:r>
+              <a:rPr lang="en-US" dirty="0" smtClean="0"/>
+              <a:t>Name Cache</a:t>
+            </a:r>
+          </a:p>
+          <a:p>
+            <a:r>
+              <a:rPr lang="en-US" dirty="0" smtClean="0"/>
+              <a:t>Networking </a:t>
+            </a:r>
+            <a:r>
+              <a:rPr lang="mr-IN" dirty="0" smtClean="0"/>
+              <a:t>–</a:t>
+            </a:r>
+            <a:r>
+              <a:rPr lang="en-US" dirty="0" smtClean="0"/>
+              <a:t> Network File System (NFS)</a:t>
+            </a:r>
+            <a:endParaRPr lang="en-US" dirty="0"/>
+          </a:p>
+        </p:txBody>
+      </p:sp>
+      <p:sp>
+        <p:nvSpPr>
+          <p:cNvPr id="4" name="Slide Number Placeholder 3"/>
+          <p:cNvSpPr>
+            <a:spLocks noGrp="1"/>
+          </p:cNvSpPr>
+          <p:nvPr>
+            <p:ph type="sldNum" sz="quarter" idx="2"/>
+          </p:nvPr>
+        </p:nvSpPr>
+        <p:spPr/>
+        <p:txBody>
+          <a:bodyPr/>
+          <a:lstStyle/>
+          <a:p>
+            <a:fld id="{86CB4B4D-7CA3-9044-876B-883B54F8677D}" type="slidenum">
+              <a:rPr lang="uk-UA" smtClean="0"/>
+              <a:t>17</a:t>
+            </a:fld>
+            <a:endParaRPr lang="uk-UA"/>
           </a:p>
         </p:txBody>
       </p:sp>
     </p:spTree>
     <p:extLst>
       <p:ext uri="{BB962C8B-B14F-4D97-AF65-F5344CB8AC3E}">
-        <p14:creationId xmlns:p14="http://schemas.microsoft.com/office/powerpoint/2010/main" val="624998836"/>
+        <p14:creationId xmlns:p14="http://schemas.microsoft.com/office/powerpoint/2010/main" val="1993082967"/>
       </p:ext>
     </p:extLst>
   </p:cSld>
@@ -5729,7 +5588,7 @@
       </p:grpSpPr>
       <p:sp>
         <p:nvSpPr>
-          <p:cNvPr id="134" name="Shape 134"/>
+          <p:cNvPr id="2" name="Title 1"/>
           <p:cNvSpPr>
             <a:spLocks noGrp="1"/>
           </p:cNvSpPr>
@@ -5737,24 +5596,22 @@
             <p:ph type="title"/>
           </p:nvPr>
         </p:nvSpPr>
-        <p:spPr>
-          <a:prstGeom prst="rect">
-            <a:avLst/>
-          </a:prstGeom>
-        </p:spPr>
-        <p:txBody>
-          <a:bodyPr/>
-          <a:lstStyle/>
-          <a:p>
-            <a:r>
-              <a:t>Between directories</a:t>
-            </a:r>
-          </a:p>
-        </p:txBody>
-      </p:sp>
-      <p:sp>
-        <p:nvSpPr>
-          <p:cNvPr id="135" name="Shape 135"/>
+        <p:spPr/>
+        <p:txBody>
+          <a:bodyPr/>
+          <a:lstStyle/>
+          <a:p>
+            <a:r>
+              <a:rPr lang="en-US" dirty="0" smtClean="0"/>
+              <a:t>Naming</a:t>
+            </a:r>
+            <a:endParaRPr lang="en-US" dirty="0"/>
+          </a:p>
+        </p:txBody>
+      </p:sp>
+      <p:sp>
+        <p:nvSpPr>
+          <p:cNvPr id="3" name="Text Placeholder 2"/>
           <p:cNvSpPr>
             <a:spLocks noGrp="1"/>
           </p:cNvSpPr>
@@ -5762,23 +5619,62 @@
             <p:ph type="body" idx="1"/>
           </p:nvPr>
         </p:nvSpPr>
-        <p:spPr>
-          <a:prstGeom prst="rect">
-            <a:avLst/>
-          </a:prstGeom>
-        </p:spPr>
-        <p:txBody>
-          <a:bodyPr/>
-          <a:lstStyle/>
-          <a:p>
-            <a:endParaRPr/>
+        <p:spPr/>
+        <p:txBody>
+          <a:bodyPr/>
+          <a:lstStyle/>
+          <a:p>
+            <a:r>
+              <a:rPr lang="en-US" dirty="0" smtClean="0"/>
+              <a:t>Translate a human name to a location of stored data</a:t>
+            </a:r>
+          </a:p>
+          <a:p>
+            <a:r>
+              <a:rPr lang="en-US" dirty="0" err="1" smtClean="0"/>
+              <a:t>namei</a:t>
+            </a:r>
+            <a:r>
+              <a:rPr lang="en-US" dirty="0" smtClean="0"/>
+              <a:t>() is the interface</a:t>
+            </a:r>
+          </a:p>
+          <a:p>
+            <a:r>
+              <a:rPr lang="en-US" dirty="0" smtClean="0"/>
+              <a:t>Names are not stable</a:t>
+            </a:r>
+            <a:endParaRPr lang="en-US" dirty="0"/>
+          </a:p>
+        </p:txBody>
+      </p:sp>
+      <p:sp>
+        <p:nvSpPr>
+          <p:cNvPr id="4" name="Slide Number Placeholder 3"/>
+          <p:cNvSpPr>
+            <a:spLocks noGrp="1"/>
+          </p:cNvSpPr>
+          <p:nvPr>
+            <p:ph type="sldNum" sz="quarter" idx="2"/>
+          </p:nvPr>
+        </p:nvSpPr>
+        <p:spPr/>
+        <p:txBody>
+          <a:bodyPr/>
+          <a:lstStyle/>
+          <a:p>
+            <a:fld id="{86CB4B4D-7CA3-9044-876B-883B54F8677D}" type="slidenum">
+              <a:rPr lang="uk-UA" smtClean="0"/>
+              <a:t>18</a:t>
+            </a:fld>
+            <a:endParaRPr lang="uk-UA"/>
           </a:p>
         </p:txBody>
       </p:sp>
     </p:spTree>
     <p:extLst>
       <p:ext uri="{BB962C8B-B14F-4D97-AF65-F5344CB8AC3E}">
-        <p14:creationId xmlns:p14="http://schemas.microsoft.com/office/powerpoint/2010/main" val="1012919175"/>
+        <p14:creationId xmlns:p14="http://schemas.microsoft.com/office/powerpoint/2010/main" val="994300562"/>
       </p:ext>
     </p:extLst>
   </p:cSld>
@@ -5823,7 +5719,7 @@
           <a:p>
             <a:r>
               <a:rPr lang="en-US" dirty="0" smtClean="0"/>
-              <a:t>Interactions with Other Subsystems</a:t>
+              <a:t>Name Lookup</a:t>
             </a:r>
             <a:endParaRPr lang="en-US" dirty="0"/>
           </a:p>
@@ -5845,46 +5741,8 @@
           <a:lstStyle/>
           <a:p>
             <a:r>
-              <a:rPr lang="en-US" dirty="0" err="1" smtClean="0"/>
-              <a:t>Virtural</a:t>
-            </a:r>
-            <a:r>
-              <a:rPr lang="en-US" dirty="0" smtClean="0"/>
-              <a:t> Memory </a:t>
-            </a:r>
-            <a:r>
-              <a:rPr lang="mr-IN" dirty="0" smtClean="0"/>
-              <a:t>–</a:t>
-            </a:r>
-            <a:r>
-              <a:rPr lang="en-US" dirty="0" smtClean="0"/>
-              <a:t> VNODES and VM Objects</a:t>
-            </a:r>
-          </a:p>
-          <a:p>
-            <a:r>
-              <a:rPr lang="en-US" dirty="0" smtClean="0"/>
-              <a:t>Buffer Cache</a:t>
-            </a:r>
-          </a:p>
-          <a:p>
-            <a:r>
-              <a:rPr lang="en-US" dirty="0" smtClean="0"/>
-              <a:t>Name Cache</a:t>
-            </a:r>
-          </a:p>
-          <a:p>
-            <a:r>
-              <a:rPr lang="en-US" dirty="0" smtClean="0"/>
-              <a:t>Networking </a:t>
-            </a:r>
-            <a:r>
-              <a:rPr lang="mr-IN" dirty="0" smtClean="0"/>
-              <a:t>–</a:t>
-            </a:r>
-            <a:r>
-              <a:rPr lang="en-US" dirty="0" smtClean="0"/>
-              <a:t> Network File System (NFS)</a:t>
+              <a:rPr lang="en-US" dirty="0" smtClean="0"/>
+              <a:t>What names are being looked up?</a:t>
             </a:r>
             <a:endParaRPr lang="en-US" dirty="0"/>
           </a:p>
@@ -5916,7 +5774,7 @@
     </p:spTree>
     <p:extLst>
       <p:ext uri="{BB962C8B-B14F-4D97-AF65-F5344CB8AC3E}">
-        <p14:creationId xmlns:p14="http://schemas.microsoft.com/office/powerpoint/2010/main" val="1993082967"/>
+        <p14:creationId xmlns:p14="http://schemas.microsoft.com/office/powerpoint/2010/main" val="1162140478"/>
       </p:ext>
     </p:extLst>
   </p:cSld>
@@ -5960,8 +5818,8 @@
           <a:lstStyle/>
           <a:p>
             <a:r>
-              <a:rPr lang="en-US" dirty="0" smtClean="0"/>
-              <a:t>Review</a:t>
+              <a:rPr lang="en-US" smtClean="0"/>
+              <a:t>What is a Filesystem?</a:t>
             </a:r>
             <a:endParaRPr lang="en-US" dirty="0"/>
           </a:p>
@@ -5982,7 +5840,35 @@
           <a:bodyPr/>
           <a:lstStyle/>
           <a:p>
-            <a:endParaRPr lang="en-US"/>
+            <a:pPr lvl="0"/>
+            <a:r>
+              <a:rPr lang="en-US" dirty="0" smtClean="0"/>
+              <a:t>A system for storing data for later retrieval</a:t>
+            </a:r>
+          </a:p>
+          <a:p>
+            <a:pPr lvl="0"/>
+            <a:r>
+              <a:rPr lang="en-US" dirty="0" smtClean="0"/>
+              <a:t>Off-line Storage</a:t>
+            </a:r>
+          </a:p>
+          <a:p>
+            <a:pPr lvl="0"/>
+            <a:r>
+              <a:rPr lang="en-US" dirty="0" smtClean="0"/>
+              <a:t>Secondary Storage</a:t>
+            </a:r>
+          </a:p>
+          <a:p>
+            <a:pPr lvl="1"/>
+            <a:r>
+              <a:rPr lang="en-US" dirty="0" smtClean="0"/>
+              <a:t>As opposed to memory which is primary</a:t>
+            </a:r>
+          </a:p>
+          <a:p>
+            <a:endParaRPr lang="en-US" dirty="0"/>
           </a:p>
         </p:txBody>
       </p:sp>
@@ -6003,7 +5889,8 @@
           <a:p>
             <a:fld id="{BC4AE5AA-C6FF-5A4F-9D02-E3454F0B3602}" type="datetime1">
               <a:rPr lang="en-US" smtClean="0"/>
-              <a:t>2/1/17</a:t>
+              <a:pPr/>
+              <a:t>3/1/17</a:t>
             </a:fld>
             <a:endParaRPr lang="en-US"/>
           </a:p>
@@ -6049,6 +5936,7 @@
           <a:p>
             <a:fld id="{699C44C4-0FAD-8046-A5C4-05AB318FA424}" type="slidenum">
               <a:rPr lang="en-US" smtClean="0"/>
+              <a:pPr/>
               <a:t>2</a:t>
             </a:fld>
             <a:endParaRPr lang="en-US"/>
@@ -6058,13 +5946,20 @@
     </p:spTree>
     <p:extLst>
       <p:ext uri="{BB962C8B-B14F-4D97-AF65-F5344CB8AC3E}">
-        <p14:creationId xmlns:p14="http://schemas.microsoft.com/office/powerpoint/2010/main" val="1515190458"/>
+        <p14:creationId xmlns:p14="http://schemas.microsoft.com/office/powerpoint/2010/main" val="1203724601"/>
       </p:ext>
     </p:extLst>
   </p:cSld>
   <p:clrMapOvr>
     <a:masterClrMapping/>
   </p:clrMapOvr>
+  <p:timing>
+    <p:tnLst>
+      <p:par>
+        <p:cTn id="1" dur="indefinite" restart="never" nodeType="tmRoot"/>
+      </p:par>
+    </p:tnLst>
+  </p:timing>
 </p:sld>
 </file>
 
@@ -6102,7 +5997,7 @@
           <a:p>
             <a:r>
               <a:rPr lang="en-US" dirty="0" smtClean="0"/>
-              <a:t>Naming</a:t>
+              <a:t>Name Cache</a:t>
             </a:r>
             <a:endParaRPr lang="en-US" dirty="0"/>
           </a:p>
@@ -6125,24 +6020,22 @@
           <a:p>
             <a:r>
               <a:rPr lang="en-US" dirty="0" smtClean="0"/>
-              <a:t>Translate a human name to a location of stored data</a:t>
-            </a:r>
-          </a:p>
-          <a:p>
-            <a:r>
-              <a:rPr lang="en-US" dirty="0" err="1" smtClean="0"/>
-              <a:t>namei</a:t>
-            </a:r>
-            <a:r>
-              <a:rPr lang="en-US" dirty="0" smtClean="0"/>
-              <a:t>() is the interface</a:t>
-            </a:r>
-          </a:p>
-          <a:p>
-            <a:r>
-              <a:rPr lang="en-US" dirty="0" smtClean="0"/>
-              <a:t>Names are not stable</a:t>
-            </a:r>
+              <a:t>Speeds up searching</a:t>
+            </a:r>
+          </a:p>
+          <a:p>
+            <a:r>
+              <a:rPr lang="en-US" dirty="0" smtClean="0"/>
+              <a:t>Maintains positive and negative results</a:t>
+            </a:r>
+          </a:p>
+          <a:p>
+            <a:r>
+              <a:rPr lang="en-US" dirty="0" smtClean="0"/>
+              <a:t>Invalidation on changes in directories</a:t>
+            </a:r>
+          </a:p>
+          <a:p>
             <a:endParaRPr lang="en-US" dirty="0"/>
           </a:p>
         </p:txBody>
@@ -6173,7 +6066,7 @@
     </p:spTree>
     <p:extLst>
       <p:ext uri="{BB962C8B-B14F-4D97-AF65-F5344CB8AC3E}">
-        <p14:creationId xmlns:p14="http://schemas.microsoft.com/office/powerpoint/2010/main" val="994300562"/>
+        <p14:creationId xmlns:p14="http://schemas.microsoft.com/office/powerpoint/2010/main" val="370017038"/>
       </p:ext>
     </p:extLst>
   </p:cSld>
@@ -6218,7 +6111,7 @@
           <a:p>
             <a:r>
               <a:rPr lang="en-US" dirty="0" smtClean="0"/>
-              <a:t>Name Lookup</a:t>
+              <a:t>Measuring Cache Efficiency</a:t>
             </a:r>
             <a:endParaRPr lang="en-US" dirty="0"/>
           </a:p>
@@ -6239,11 +6132,7 @@
           <a:bodyPr/>
           <a:lstStyle/>
           <a:p>
-            <a:r>
-              <a:rPr lang="en-US" dirty="0" smtClean="0"/>
-              <a:t>What names are being looked up?</a:t>
-            </a:r>
-            <a:endParaRPr lang="en-US" dirty="0"/>
+            <a:endParaRPr lang="en-US"/>
           </a:p>
         </p:txBody>
       </p:sp>
@@ -6273,7 +6162,7 @@
     </p:spTree>
     <p:extLst>
       <p:ext uri="{BB962C8B-B14F-4D97-AF65-F5344CB8AC3E}">
-        <p14:creationId xmlns:p14="http://schemas.microsoft.com/office/powerpoint/2010/main" val="1162140478"/>
+        <p14:creationId xmlns:p14="http://schemas.microsoft.com/office/powerpoint/2010/main" val="1492828903"/>
       </p:ext>
     </p:extLst>
   </p:cSld>
@@ -6318,7 +6207,7 @@
           <a:p>
             <a:r>
               <a:rPr lang="en-US" dirty="0" smtClean="0"/>
-              <a:t>Name Cache</a:t>
+              <a:t>Who is missing the name cache?</a:t>
             </a:r>
             <a:endParaRPr lang="en-US" dirty="0"/>
           </a:p>
@@ -6339,25 +6228,7 @@
           <a:bodyPr/>
           <a:lstStyle/>
           <a:p>
-            <a:r>
-              <a:rPr lang="en-US" dirty="0" smtClean="0"/>
-              <a:t>Speeds up searching</a:t>
-            </a:r>
-          </a:p>
-          <a:p>
-            <a:r>
-              <a:rPr lang="en-US" dirty="0" smtClean="0"/>
-              <a:t>Maintains positive and negative results</a:t>
-            </a:r>
-          </a:p>
-          <a:p>
-            <a:r>
-              <a:rPr lang="en-US" dirty="0" smtClean="0"/>
-              <a:t>Invalidation on changes in directories</a:t>
-            </a:r>
-          </a:p>
-          <a:p>
-            <a:endParaRPr lang="en-US" dirty="0"/>
+            <a:endParaRPr lang="en-US"/>
           </a:p>
         </p:txBody>
       </p:sp>
@@ -6387,7 +6258,7 @@
     </p:spTree>
     <p:extLst>
       <p:ext uri="{BB962C8B-B14F-4D97-AF65-F5344CB8AC3E}">
-        <p14:creationId xmlns:p14="http://schemas.microsoft.com/office/powerpoint/2010/main" val="370017038"/>
+        <p14:creationId xmlns:p14="http://schemas.microsoft.com/office/powerpoint/2010/main" val="646591383"/>
       </p:ext>
     </p:extLst>
   </p:cSld>
@@ -6432,7 +6303,7 @@
           <a:p>
             <a:r>
               <a:rPr lang="en-US" dirty="0" smtClean="0"/>
-              <a:t>Measuring Cache Efficiency</a:t>
+              <a:t>Name Cache Module</a:t>
             </a:r>
             <a:endParaRPr lang="en-US" dirty="0"/>
           </a:p>
@@ -6450,10 +6321,97 @@
         </p:nvSpPr>
         <p:spPr/>
         <p:txBody>
-          <a:bodyPr/>
-          <a:lstStyle/>
-          <a:p>
-            <a:endParaRPr lang="en-US"/>
+          <a:bodyPr>
+            <a:normAutofit lnSpcReduction="10000"/>
+          </a:bodyPr>
+          <a:lstStyle/>
+          <a:p>
+            <a:r>
+              <a:rPr lang="en-US" dirty="0"/>
+              <a:t>enter </a:t>
+            </a:r>
+            <a:r>
+              <a:rPr lang="en-US" dirty="0" err="1"/>
+              <a:t>enter_negative</a:t>
+            </a:r>
+            <a:r>
+              <a:rPr lang="en-US" dirty="0"/>
+              <a:t> </a:t>
+            </a:r>
+            <a:r>
+              <a:rPr lang="en-US" dirty="0" err="1"/>
+              <a:t>lookup:hit</a:t>
+            </a:r>
+            <a:endParaRPr lang="en-US" dirty="0"/>
+          </a:p>
+          <a:p>
+            <a:r>
+              <a:rPr lang="en-US" dirty="0" err="1"/>
+              <a:t>lookup:hit-negative</a:t>
+            </a:r>
+            <a:endParaRPr lang="en-US" dirty="0"/>
+          </a:p>
+          <a:p>
+            <a:r>
+              <a:rPr lang="en-US" dirty="0" err="1"/>
+              <a:t>lookup:miss</a:t>
+            </a:r>
+            <a:r>
+              <a:rPr lang="en-US" dirty="0"/>
+              <a:t> purge </a:t>
+            </a:r>
+            <a:r>
+              <a:rPr lang="en-US" dirty="0" err="1"/>
+              <a:t>purge_negative</a:t>
+            </a:r>
+            <a:r>
+              <a:rPr lang="en-US" dirty="0"/>
+              <a:t> zap</a:t>
+            </a:r>
+          </a:p>
+          <a:p>
+            <a:r>
+              <a:rPr lang="en-US" dirty="0" err="1"/>
+              <a:t>zap_negative</a:t>
+            </a:r>
+            <a:endParaRPr lang="en-US" dirty="0"/>
+          </a:p>
+          <a:p>
+            <a:r>
+              <a:rPr lang="en-US" dirty="0"/>
+              <a:t>Add a positive entry Add a negative entry Name found in positive cache</a:t>
+            </a:r>
+          </a:p>
+          <a:p>
+            <a:r>
+              <a:rPr lang="en-US" dirty="0"/>
+              <a:t>Name found in negative cache</a:t>
+            </a:r>
+          </a:p>
+          <a:p>
+            <a:r>
+              <a:rPr lang="en-US" dirty="0"/>
+              <a:t>Name not found in cache Remove positive entry Remove negative entry Remove positive entry with or without </a:t>
+            </a:r>
+            <a:r>
+              <a:rPr lang="en-US" dirty="0" err="1"/>
+              <a:t>vnode</a:t>
+            </a:r>
+            <a:endParaRPr lang="en-US" dirty="0"/>
+          </a:p>
+          <a:p>
+            <a:r>
+              <a:rPr lang="en-US" dirty="0"/>
+              <a:t>Remove negative entry with or without </a:t>
+            </a:r>
+            <a:r>
+              <a:rPr lang="en-US" dirty="0" err="1"/>
+              <a:t>vnode</a:t>
+            </a:r>
+            <a:endParaRPr lang="en-US" dirty="0"/>
+          </a:p>
+          <a:p>
+            <a:endParaRPr lang="en-US" dirty="0"/>
           </a:p>
         </p:txBody>
       </p:sp>
@@ -6483,7 +6441,7 @@
     </p:spTree>
     <p:extLst>
       <p:ext uri="{BB962C8B-B14F-4D97-AF65-F5344CB8AC3E}">
-        <p14:creationId xmlns:p14="http://schemas.microsoft.com/office/powerpoint/2010/main" val="1492828903"/>
+        <p14:creationId xmlns:p14="http://schemas.microsoft.com/office/powerpoint/2010/main" val="1333048478"/>
       </p:ext>
     </p:extLst>
   </p:cSld>
@@ -6528,7 +6486,7 @@
           <a:p>
             <a:r>
               <a:rPr lang="en-US" dirty="0" smtClean="0"/>
-              <a:t>Who is missing the name cache?</a:t>
+              <a:t>Adding negative entries</a:t>
             </a:r>
             <a:endParaRPr lang="en-US" dirty="0"/>
           </a:p>
@@ -6579,7 +6537,7 @@
     </p:spTree>
     <p:extLst>
       <p:ext uri="{BB962C8B-B14F-4D97-AF65-F5344CB8AC3E}">
-        <p14:creationId xmlns:p14="http://schemas.microsoft.com/office/powerpoint/2010/main" val="646591383"/>
+        <p14:creationId xmlns:p14="http://schemas.microsoft.com/office/powerpoint/2010/main" val="2126508062"/>
       </p:ext>
     </p:extLst>
   </p:cSld>
@@ -6624,7 +6582,7 @@
           <a:p>
             <a:r>
               <a:rPr lang="en-US" dirty="0" smtClean="0"/>
-              <a:t>Name Cache Module</a:t>
+              <a:t>Directories and Files</a:t>
             </a:r>
             <a:endParaRPr lang="en-US" dirty="0"/>
           </a:p>
@@ -6642,97 +6600,35 @@
         </p:nvSpPr>
         <p:spPr/>
         <p:txBody>
-          <a:bodyPr>
-            <a:normAutofit lnSpcReduction="10000"/>
-          </a:bodyPr>
-          <a:lstStyle/>
-          <a:p>
-            <a:r>
-              <a:rPr lang="en-US" dirty="0"/>
-              <a:t>enter </a:t>
-            </a:r>
-            <a:r>
-              <a:rPr lang="en-US" dirty="0" err="1"/>
-              <a:t>enter_negative</a:t>
-            </a:r>
-            <a:r>
-              <a:rPr lang="en-US" dirty="0"/>
-              <a:t> </a:t>
-            </a:r>
-            <a:r>
-              <a:rPr lang="en-US" dirty="0" err="1"/>
-              <a:t>lookup:hit</a:t>
-            </a:r>
-            <a:endParaRPr lang="en-US" dirty="0"/>
-          </a:p>
-          <a:p>
-            <a:r>
-              <a:rPr lang="en-US" dirty="0" err="1"/>
-              <a:t>lookup:hit-negative</a:t>
-            </a:r>
-            <a:endParaRPr lang="en-US" dirty="0"/>
-          </a:p>
-          <a:p>
-            <a:r>
-              <a:rPr lang="en-US" dirty="0" err="1"/>
-              <a:t>lookup:miss</a:t>
-            </a:r>
-            <a:r>
-              <a:rPr lang="en-US" dirty="0"/>
-              <a:t> purge </a:t>
-            </a:r>
-            <a:r>
-              <a:rPr lang="en-US" dirty="0" err="1"/>
-              <a:t>purge_negative</a:t>
-            </a:r>
-            <a:r>
-              <a:rPr lang="en-US" dirty="0"/>
-              <a:t> zap</a:t>
-            </a:r>
-          </a:p>
-          <a:p>
-            <a:r>
-              <a:rPr lang="en-US" dirty="0" err="1"/>
-              <a:t>zap_negative</a:t>
-            </a:r>
-            <a:endParaRPr lang="en-US" dirty="0"/>
-          </a:p>
-          <a:p>
-            <a:r>
-              <a:rPr lang="en-US" dirty="0"/>
-              <a:t>Add a positive entry Add a negative entry Name found in positive cache</a:t>
-            </a:r>
-          </a:p>
-          <a:p>
-            <a:r>
-              <a:rPr lang="en-US" dirty="0"/>
-              <a:t>Name found in negative cache</a:t>
-            </a:r>
-          </a:p>
-          <a:p>
-            <a:r>
-              <a:rPr lang="en-US" dirty="0"/>
-              <a:t>Name not found in cache Remove positive entry Remove negative entry Remove positive entry with or without </a:t>
-            </a:r>
-            <a:r>
-              <a:rPr lang="en-US" dirty="0" err="1"/>
-              <a:t>vnode</a:t>
-            </a:r>
-            <a:endParaRPr lang="en-US" dirty="0"/>
-          </a:p>
-          <a:p>
-            <a:r>
-              <a:rPr lang="en-US" dirty="0"/>
-              <a:t>Remove negative entry with or without </a:t>
-            </a:r>
-            <a:r>
-              <a:rPr lang="en-US" dirty="0" err="1"/>
-              <a:t>vnode</a:t>
-            </a:r>
-            <a:endParaRPr lang="en-US" dirty="0"/>
-          </a:p>
-          <a:p>
-            <a:endParaRPr lang="en-US" dirty="0"/>
+          <a:bodyPr/>
+          <a:lstStyle/>
+          <a:p>
+            <a:r>
+              <a:rPr lang="en-US" dirty="0" smtClean="0"/>
+              <a:t>Directories </a:t>
+            </a:r>
+            <a:r>
+              <a:rPr lang="mr-IN" dirty="0" smtClean="0"/>
+              <a:t>–</a:t>
+            </a:r>
+            <a:r>
+              <a:rPr lang="en-US" dirty="0" smtClean="0"/>
+              <a:t> Contain files</a:t>
+            </a:r>
+          </a:p>
+          <a:p>
+            <a:r>
+              <a:rPr lang="en-US" dirty="0" smtClean="0"/>
+              <a:t>Files </a:t>
+            </a:r>
+            <a:r>
+              <a:rPr lang="mr-IN" dirty="0" smtClean="0"/>
+              <a:t>–</a:t>
+            </a:r>
+            <a:r>
+              <a:rPr lang="en-US" dirty="0" smtClean="0"/>
+              <a:t> Contain data</a:t>
+            </a:r>
           </a:p>
         </p:txBody>
       </p:sp>
@@ -6762,7 +6658,7 @@
     </p:spTree>
     <p:extLst>
       <p:ext uri="{BB962C8B-B14F-4D97-AF65-F5344CB8AC3E}">
-        <p14:creationId xmlns:p14="http://schemas.microsoft.com/office/powerpoint/2010/main" val="1333048478"/>
+        <p14:creationId xmlns:p14="http://schemas.microsoft.com/office/powerpoint/2010/main" val="182593326"/>
       </p:ext>
     </p:extLst>
   </p:cSld>
@@ -6807,7 +6703,7 @@
           <a:p>
             <a:r>
               <a:rPr lang="en-US" dirty="0" smtClean="0"/>
-              <a:t>Adding negative entries</a:t>
+              <a:t>The VNODE</a:t>
             </a:r>
             <a:endParaRPr lang="en-US" dirty="0"/>
           </a:p>
@@ -6828,7 +6724,83 @@
           <a:bodyPr/>
           <a:lstStyle/>
           <a:p>
-            <a:endParaRPr lang="en-US"/>
+            <a:r>
+              <a:rPr lang="en-US" dirty="0"/>
+              <a:t>The central structure for all storage</a:t>
+            </a:r>
+          </a:p>
+          <a:p>
+            <a:r>
+              <a:rPr lang="en-US" dirty="0" smtClean="0"/>
+              <a:t>Many things </a:t>
+            </a:r>
+            <a:r>
+              <a:rPr lang="en-US" dirty="0"/>
+              <a:t>have an associated </a:t>
+            </a:r>
+            <a:r>
+              <a:rPr lang="en-US" dirty="0" err="1"/>
+              <a:t>vnode</a:t>
+            </a:r>
+            <a:endParaRPr lang="en-US" dirty="0"/>
+          </a:p>
+          <a:p>
+            <a:pPr lvl="1"/>
+            <a:r>
+              <a:rPr lang="en-US" dirty="0" smtClean="0"/>
+              <a:t>Files</a:t>
+            </a:r>
+            <a:endParaRPr lang="en-US" dirty="0"/>
+          </a:p>
+          <a:p>
+            <a:pPr lvl="1"/>
+            <a:r>
+              <a:rPr lang="en-US" dirty="0" smtClean="0"/>
+              <a:t>Directories</a:t>
+            </a:r>
+            <a:endParaRPr lang="en-US" dirty="0"/>
+          </a:p>
+          <a:p>
+            <a:pPr lvl="1"/>
+            <a:r>
+              <a:rPr lang="en-US" dirty="0" smtClean="0"/>
+              <a:t>Block </a:t>
+            </a:r>
+            <a:r>
+              <a:rPr lang="en-US" dirty="0"/>
+              <a:t>Devices</a:t>
+            </a:r>
+          </a:p>
+          <a:p>
+            <a:pPr lvl="1"/>
+            <a:r>
+              <a:rPr lang="en-US" dirty="0" smtClean="0"/>
+              <a:t>Character </a:t>
+            </a:r>
+            <a:r>
+              <a:rPr lang="en-US" dirty="0"/>
+              <a:t>Devices </a:t>
+            </a:r>
+            <a:endParaRPr lang="en-US" dirty="0" smtClean="0"/>
+          </a:p>
+          <a:p>
+            <a:pPr lvl="1"/>
+            <a:r>
+              <a:rPr lang="en-US" dirty="0" smtClean="0"/>
+              <a:t>Some </a:t>
+            </a:r>
+            <a:r>
+              <a:rPr lang="en-US" dirty="0"/>
+              <a:t>Sockets</a:t>
+            </a:r>
+          </a:p>
+          <a:p>
+            <a:pPr lvl="1"/>
+            <a:r>
+              <a:rPr lang="en-US" dirty="0" smtClean="0"/>
+              <a:t>FIFOs</a:t>
+            </a:r>
+            <a:endParaRPr lang="en-US" dirty="0"/>
           </a:p>
         </p:txBody>
       </p:sp>
@@ -6858,7 +6830,7 @@
     </p:spTree>
     <p:extLst>
       <p:ext uri="{BB962C8B-B14F-4D97-AF65-F5344CB8AC3E}">
-        <p14:creationId xmlns:p14="http://schemas.microsoft.com/office/powerpoint/2010/main" val="2126508062"/>
+        <p14:creationId xmlns:p14="http://schemas.microsoft.com/office/powerpoint/2010/main" val="2087252333"/>
       </p:ext>
     </p:extLst>
   </p:cSld>
@@ -6903,7 +6875,7 @@
           <a:p>
             <a:r>
               <a:rPr lang="en-US" dirty="0" smtClean="0"/>
-              <a:t>Directories and Files</a:t>
+              <a:t>VNODE Operations</a:t>
             </a:r>
             <a:endParaRPr lang="en-US" dirty="0"/>
           </a:p>
@@ -6925,31 +6897,48 @@
           <a:lstStyle/>
           <a:p>
             <a:r>
-              <a:rPr lang="en-US" dirty="0" smtClean="0"/>
-              <a:t>Directories </a:t>
-            </a:r>
-            <a:r>
-              <a:rPr lang="mr-IN" dirty="0" smtClean="0"/>
-              <a:t>–</a:t>
-            </a:r>
-            <a:r>
-              <a:rPr lang="en-US" dirty="0" smtClean="0"/>
-              <a:t> Contain files</a:t>
-            </a:r>
-          </a:p>
-          <a:p>
-            <a:r>
-              <a:rPr lang="en-US" dirty="0" smtClean="0"/>
-              <a:t>Files </a:t>
-            </a:r>
-            <a:r>
-              <a:rPr lang="mr-IN" dirty="0" smtClean="0"/>
-              <a:t>–</a:t>
-            </a:r>
-            <a:r>
-              <a:rPr lang="en-US" dirty="0" smtClean="0"/>
-              <a:t> Contain data</a:t>
-            </a:r>
+              <a:rPr lang="en-US" dirty="0"/>
+              <a:t>Classic, kernel OO structure</a:t>
+            </a:r>
+          </a:p>
+          <a:p>
+            <a:r>
+              <a:rPr lang="en-US" dirty="0" smtClean="0"/>
+              <a:t>After </a:t>
+            </a:r>
+            <a:r>
+              <a:rPr lang="en-US" dirty="0"/>
+              <a:t>a path or name is looked up </a:t>
+            </a:r>
+            <a:endParaRPr lang="en-US" dirty="0" smtClean="0"/>
+          </a:p>
+          <a:p>
+            <a:r>
+              <a:rPr lang="en-US" dirty="0" smtClean="0"/>
+              <a:t>Do </a:t>
+            </a:r>
+            <a:r>
+              <a:rPr lang="en-US" dirty="0"/>
+              <a:t>something with a </a:t>
+            </a:r>
+            <a:r>
+              <a:rPr lang="en-US" dirty="0" err="1"/>
+              <a:t>vnode</a:t>
+            </a:r>
+            <a:endParaRPr lang="en-US" dirty="0"/>
+          </a:p>
+          <a:p>
+            <a:r>
+              <a:rPr lang="en-US" dirty="0" smtClean="0"/>
+              <a:t>open</a:t>
+            </a:r>
+            <a:r>
+              <a:rPr lang="en-US" dirty="0"/>
+              <a:t>, close, read, write</a:t>
+            </a:r>
+          </a:p>
+          <a:p>
+            <a:endParaRPr lang="en-US" dirty="0"/>
           </a:p>
         </p:txBody>
       </p:sp>
@@ -6979,7 +6968,7 @@
     </p:spTree>
     <p:extLst>
       <p:ext uri="{BB962C8B-B14F-4D97-AF65-F5344CB8AC3E}">
-        <p14:creationId xmlns:p14="http://schemas.microsoft.com/office/powerpoint/2010/main" val="182593326"/>
+        <p14:creationId xmlns:p14="http://schemas.microsoft.com/office/powerpoint/2010/main" val="31779183"/>
       </p:ext>
     </p:extLst>
   </p:cSld>
@@ -7024,7 +7013,7 @@
           <a:p>
             <a:r>
               <a:rPr lang="en-US" dirty="0" smtClean="0"/>
-              <a:t>The VNODE</a:t>
+              <a:t>Visualizing VNODE Operations</a:t>
             </a:r>
             <a:endParaRPr lang="en-US" dirty="0"/>
           </a:p>
@@ -7045,83 +7034,7 @@
           <a:bodyPr/>
           <a:lstStyle/>
           <a:p>
-            <a:r>
-              <a:rPr lang="en-US" dirty="0"/>
-              <a:t>The central structure for all storage</a:t>
-            </a:r>
-          </a:p>
-          <a:p>
-            <a:r>
-              <a:rPr lang="en-US" dirty="0" smtClean="0"/>
-              <a:t>Many things </a:t>
-            </a:r>
-            <a:r>
-              <a:rPr lang="en-US" dirty="0"/>
-              <a:t>have an associated </a:t>
-            </a:r>
-            <a:r>
-              <a:rPr lang="en-US" dirty="0" err="1"/>
-              <a:t>vnode</a:t>
-            </a:r>
-            <a:endParaRPr lang="en-US" dirty="0"/>
-          </a:p>
-          <a:p>
-            <a:pPr lvl="1"/>
-            <a:r>
-              <a:rPr lang="en-US" dirty="0" smtClean="0"/>
-              <a:t>Files</a:t>
-            </a:r>
-            <a:endParaRPr lang="en-US" dirty="0"/>
-          </a:p>
-          <a:p>
-            <a:pPr lvl="1"/>
-            <a:r>
-              <a:rPr lang="en-US" dirty="0" smtClean="0"/>
-              <a:t>Directories</a:t>
-            </a:r>
-            <a:endParaRPr lang="en-US" dirty="0"/>
-          </a:p>
-          <a:p>
-            <a:pPr lvl="1"/>
-            <a:r>
-              <a:rPr lang="en-US" dirty="0" smtClean="0"/>
-              <a:t>Block </a:t>
-            </a:r>
-            <a:r>
-              <a:rPr lang="en-US" dirty="0"/>
-              <a:t>Devices</a:t>
-            </a:r>
-          </a:p>
-          <a:p>
-            <a:pPr lvl="1"/>
-            <a:r>
-              <a:rPr lang="en-US" dirty="0" smtClean="0"/>
-              <a:t>Character </a:t>
-            </a:r>
-            <a:r>
-              <a:rPr lang="en-US" dirty="0"/>
-              <a:t>Devices </a:t>
-            </a:r>
-            <a:endParaRPr lang="en-US" dirty="0" smtClean="0"/>
-          </a:p>
-          <a:p>
-            <a:pPr lvl="1"/>
-            <a:r>
-              <a:rPr lang="en-US" dirty="0" smtClean="0"/>
-              <a:t>Some </a:t>
-            </a:r>
-            <a:r>
-              <a:rPr lang="en-US" dirty="0"/>
-              <a:t>Sockets</a:t>
-            </a:r>
-          </a:p>
-          <a:p>
-            <a:pPr lvl="1"/>
-            <a:r>
-              <a:rPr lang="en-US" dirty="0" smtClean="0"/>
-              <a:t>FIFOs</a:t>
-            </a:r>
-            <a:endParaRPr lang="en-US" dirty="0"/>
+            <a:endParaRPr lang="en-US"/>
           </a:p>
         </p:txBody>
       </p:sp>
@@ -7151,7 +7064,7 @@
     </p:spTree>
     <p:extLst>
       <p:ext uri="{BB962C8B-B14F-4D97-AF65-F5344CB8AC3E}">
-        <p14:creationId xmlns:p14="http://schemas.microsoft.com/office/powerpoint/2010/main" val="2087252333"/>
+        <p14:creationId xmlns:p14="http://schemas.microsoft.com/office/powerpoint/2010/main" val="2047865590"/>
       </p:ext>
     </p:extLst>
   </p:cSld>
@@ -7196,7 +7109,7 @@
           <a:p>
             <a:r>
               <a:rPr lang="en-US" dirty="0" smtClean="0"/>
-              <a:t>VNODE Operations</a:t>
+              <a:t>GEOM Overview</a:t>
             </a:r>
             <a:endParaRPr lang="en-US" dirty="0"/>
           </a:p>
@@ -7219,43 +7132,19 @@
           <a:p>
             <a:r>
               <a:rPr lang="en-US" dirty="0"/>
-              <a:t>Classic, kernel OO structure</a:t>
-            </a:r>
-          </a:p>
-          <a:p>
-            <a:r>
-              <a:rPr lang="en-US" dirty="0" smtClean="0"/>
-              <a:t>After </a:t>
-            </a:r>
+              <a:t>Framework for transforming storage requests</a:t>
+            </a:r>
+          </a:p>
+          <a:p>
             <a:r>
               <a:rPr lang="en-US" dirty="0"/>
-              <a:t>a path or name is looked up </a:t>
-            </a:r>
-            <a:endParaRPr lang="en-US" dirty="0" smtClean="0"/>
-          </a:p>
-          <a:p>
-            <a:r>
-              <a:rPr lang="en-US" dirty="0" smtClean="0"/>
-              <a:t>Do </a:t>
-            </a:r>
+              <a:t>• Object Oriented</a:t>
+            </a:r>
+          </a:p>
+          <a:p>
             <a:r>
               <a:rPr lang="en-US" dirty="0"/>
-              <a:t>something with a </a:t>
-            </a:r>
-            <a:r>
-              <a:rPr lang="en-US" dirty="0" err="1"/>
-              <a:t>vnode</a:t>
-            </a:r>
-            <a:endParaRPr lang="en-US" dirty="0"/>
-          </a:p>
-          <a:p>
-            <a:r>
-              <a:rPr lang="en-US" dirty="0" smtClean="0"/>
-              <a:t>open</a:t>
-            </a:r>
-            <a:r>
-              <a:rPr lang="en-US" dirty="0"/>
-              <a:t>, close, read, write</a:t>
+              <a:t>• Shuttles I/O requests between filesystems and devices</a:t>
             </a:r>
           </a:p>
           <a:p>
@@ -7289,7 +7178,7 @@
     </p:spTree>
     <p:extLst>
       <p:ext uri="{BB962C8B-B14F-4D97-AF65-F5344CB8AC3E}">
-        <p14:creationId xmlns:p14="http://schemas.microsoft.com/office/powerpoint/2010/main" val="31779183"/>
+        <p14:creationId xmlns:p14="http://schemas.microsoft.com/office/powerpoint/2010/main" val="1856946886"/>
       </p:ext>
     </p:extLst>
   </p:cSld>
@@ -7334,7 +7223,7 @@
           <a:p>
             <a:r>
               <a:rPr lang="en-US" dirty="0" smtClean="0"/>
-              <a:t>Storing Information</a:t>
+              <a:t>Examples</a:t>
             </a:r>
             <a:endParaRPr lang="en-US" dirty="0"/>
           </a:p>
@@ -7355,7 +7244,42 @@
           <a:bodyPr/>
           <a:lstStyle/>
           <a:p>
-            <a:endParaRPr lang="en-US"/>
+            <a:r>
+              <a:rPr lang="en-US" dirty="0" smtClean="0"/>
+              <a:t>UFS2: FreeBSD</a:t>
+            </a:r>
+          </a:p>
+          <a:p>
+            <a:r>
+              <a:rPr lang="en-US" dirty="0" smtClean="0"/>
+              <a:t>EXT4: Linux</a:t>
+            </a:r>
+          </a:p>
+          <a:p>
+            <a:r>
+              <a:rPr lang="en-US" dirty="0" smtClean="0"/>
+              <a:t>NTFS: Windows</a:t>
+            </a:r>
+          </a:p>
+          <a:p>
+            <a:r>
+              <a:rPr lang="en-US" dirty="0" smtClean="0"/>
+              <a:t>FAT: DOS</a:t>
+            </a:r>
+          </a:p>
+          <a:p>
+            <a:r>
+              <a:rPr lang="en-US" dirty="0" smtClean="0"/>
+              <a:t>ZFS: </a:t>
+            </a:r>
+            <a:r>
+              <a:rPr lang="en-US" dirty="0" err="1" smtClean="0"/>
+              <a:t>Illumos</a:t>
+            </a:r>
+            <a:r>
+              <a:rPr lang="en-US" dirty="0" smtClean="0"/>
+              <a:t> and FreeBSD</a:t>
+            </a:r>
           </a:p>
         </p:txBody>
       </p:sp>
@@ -7376,7 +7300,7 @@
           <a:p>
             <a:fld id="{BC4AE5AA-C6FF-5A4F-9D02-E3454F0B3602}" type="datetime1">
               <a:rPr lang="en-US" smtClean="0"/>
-              <a:t>2/1/17</a:t>
+              <a:t>3/1/17</a:t>
             </a:fld>
             <a:endParaRPr lang="en-US"/>
           </a:p>
@@ -7431,13 +7355,291 @@
     </p:spTree>
     <p:extLst>
       <p:ext uri="{BB962C8B-B14F-4D97-AF65-F5344CB8AC3E}">
-        <p14:creationId xmlns:p14="http://schemas.microsoft.com/office/powerpoint/2010/main" val="1263711361"/>
+        <p14:creationId xmlns:p14="http://schemas.microsoft.com/office/powerpoint/2010/main" val="1410558966"/>
       </p:ext>
     </p:extLst>
   </p:cSld>
   <p:clrMapOvr>
     <a:masterClrMapping/>
   </p:clrMapOvr>
+  <p:timing>
+    <p:tnLst>
+      <p:par>
+        <p:cTn id="1" dur="indefinite" restart="never" nodeType="tmRoot">
+          <p:childTnLst>
+            <p:seq concurrent="1" nextAc="seek">
+              <p:cTn id="2" dur="indefinite" nodeType="mainSeq">
+                <p:childTnLst>
+                  <p:par>
+                    <p:cTn id="3" fill="hold">
+                      <p:stCondLst>
+                        <p:cond delay="indefinite"/>
+                      </p:stCondLst>
+                      <p:childTnLst>
+                        <p:par>
+                          <p:cTn id="4" fill="hold">
+                            <p:stCondLst>
+                              <p:cond delay="0"/>
+                            </p:stCondLst>
+                            <p:childTnLst>
+                              <p:par>
+                                <p:cTn id="5" presetID="1" presetClass="entr" presetSubtype="0" fill="hold" grpId="0" nodeType="clickEffect">
+                                  <p:stCondLst>
+                                    <p:cond delay="0"/>
+                                  </p:stCondLst>
+                                  <p:childTnLst>
+                                    <p:set>
+                                      <p:cBhvr>
+                                        <p:cTn id="6" dur="1" fill="hold">
+                                          <p:stCondLst>
+                                            <p:cond delay="0"/>
+                                          </p:stCondLst>
+                                        </p:cTn>
+                                        <p:tgtEl>
+                                          <p:spTgt spid="3">
+                                            <p:txEl>
+                                              <p:pRg st="0" end="0"/>
+                                            </p:txEl>
+                                          </p:spTgt>
+                                        </p:tgtEl>
+                                        <p:attrNameLst>
+                                          <p:attrName>style.visibility</p:attrName>
+                                        </p:attrNameLst>
+                                      </p:cBhvr>
+                                      <p:to>
+                                        <p:strVal val="visible"/>
+                                      </p:to>
+                                    </p:set>
+                                  </p:childTnLst>
+                                </p:cTn>
+                              </p:par>
+                            </p:childTnLst>
+                          </p:cTn>
+                        </p:par>
+                      </p:childTnLst>
+                    </p:cTn>
+                  </p:par>
+                  <p:par>
+                    <p:cTn id="7" fill="hold">
+                      <p:stCondLst>
+                        <p:cond delay="indefinite"/>
+                      </p:stCondLst>
+                      <p:childTnLst>
+                        <p:par>
+                          <p:cTn id="8" fill="hold">
+                            <p:stCondLst>
+                              <p:cond delay="0"/>
+                            </p:stCondLst>
+                            <p:childTnLst>
+                              <p:par>
+                                <p:cTn id="9" presetID="1" presetClass="entr" presetSubtype="0" fill="hold" grpId="0" nodeType="clickEffect">
+                                  <p:stCondLst>
+                                    <p:cond delay="0"/>
+                                  </p:stCondLst>
+                                  <p:childTnLst>
+                                    <p:set>
+                                      <p:cBhvr>
+                                        <p:cTn id="10" dur="1" fill="hold">
+                                          <p:stCondLst>
+                                            <p:cond delay="0"/>
+                                          </p:stCondLst>
+                                        </p:cTn>
+                                        <p:tgtEl>
+                                          <p:spTgt spid="3">
+                                            <p:txEl>
+                                              <p:pRg st="1" end="1"/>
+                                            </p:txEl>
+                                          </p:spTgt>
+                                        </p:tgtEl>
+                                        <p:attrNameLst>
+                                          <p:attrName>style.visibility</p:attrName>
+                                        </p:attrNameLst>
+                                      </p:cBhvr>
+                                      <p:to>
+                                        <p:strVal val="visible"/>
+                                      </p:to>
+                                    </p:set>
+                                  </p:childTnLst>
+                                </p:cTn>
+                              </p:par>
+                            </p:childTnLst>
+                          </p:cTn>
+                        </p:par>
+                      </p:childTnLst>
+                    </p:cTn>
+                  </p:par>
+                  <p:par>
+                    <p:cTn id="11" fill="hold">
+                      <p:stCondLst>
+                        <p:cond delay="indefinite"/>
+                      </p:stCondLst>
+                      <p:childTnLst>
+                        <p:par>
+                          <p:cTn id="12" fill="hold">
+                            <p:stCondLst>
+                              <p:cond delay="0"/>
+                            </p:stCondLst>
+                            <p:childTnLst>
+                              <p:par>
+                                <p:cTn id="13" presetID="1" presetClass="entr" presetSubtype="0" fill="hold" grpId="0" nodeType="clickEffect">
+                                  <p:stCondLst>
+                                    <p:cond delay="0"/>
+                                  </p:stCondLst>
+                                  <p:childTnLst>
+                                    <p:set>
+                                      <p:cBhvr>
+                                        <p:cTn id="14" dur="1" fill="hold">
+                                          <p:stCondLst>
+                                            <p:cond delay="0"/>
+                                          </p:stCondLst>
+                                        </p:cTn>
+                                        <p:tgtEl>
+                                          <p:spTgt spid="3">
+                                            <p:txEl>
+                                              <p:pRg st="2" end="2"/>
+                                            </p:txEl>
+                                          </p:spTgt>
+                                        </p:tgtEl>
+                                        <p:attrNameLst>
+                                          <p:attrName>style.visibility</p:attrName>
+                                        </p:attrNameLst>
+                                      </p:cBhvr>
+                                      <p:to>
+                                        <p:strVal val="visible"/>
+                                      </p:to>
+                                    </p:set>
+                                  </p:childTnLst>
+                                </p:cTn>
+                              </p:par>
+                            </p:childTnLst>
+                          </p:cTn>
+                        </p:par>
+                      </p:childTnLst>
+                    </p:cTn>
+                  </p:par>
+                  <p:par>
+                    <p:cTn id="15" fill="hold">
+                      <p:stCondLst>
+                        <p:cond delay="indefinite"/>
+                      </p:stCondLst>
+                      <p:childTnLst>
+                        <p:par>
+                          <p:cTn id="16" fill="hold">
+                            <p:stCondLst>
+                              <p:cond delay="0"/>
+                            </p:stCondLst>
+                            <p:childTnLst>
+                              <p:par>
+                                <p:cTn id="17" presetID="1" presetClass="entr" presetSubtype="0" fill="hold" grpId="0" nodeType="clickEffect">
+                                  <p:stCondLst>
+                                    <p:cond delay="0"/>
+                                  </p:stCondLst>
+                                  <p:childTnLst>
+                                    <p:set>
+                                      <p:cBhvr>
+                                        <p:cTn id="18" dur="1" fill="hold">
+                                          <p:stCondLst>
+                                            <p:cond delay="0"/>
+                                          </p:stCondLst>
+                                        </p:cTn>
+                                        <p:tgtEl>
+                                          <p:spTgt spid="3">
+                                            <p:txEl>
+                                              <p:pRg st="3" end="3"/>
+                                            </p:txEl>
+                                          </p:spTgt>
+                                        </p:tgtEl>
+                                        <p:attrNameLst>
+                                          <p:attrName>style.visibility</p:attrName>
+                                        </p:attrNameLst>
+                                      </p:cBhvr>
+                                      <p:to>
+                                        <p:strVal val="visible"/>
+                                      </p:to>
+                                    </p:set>
+                                  </p:childTnLst>
+                                </p:cTn>
+                              </p:par>
+                            </p:childTnLst>
+                          </p:cTn>
+                        </p:par>
+                      </p:childTnLst>
+                    </p:cTn>
+                  </p:par>
+                  <p:par>
+                    <p:cTn id="19" fill="hold">
+                      <p:stCondLst>
+                        <p:cond delay="indefinite"/>
+                      </p:stCondLst>
+                      <p:childTnLst>
+                        <p:par>
+                          <p:cTn id="20" fill="hold">
+                            <p:stCondLst>
+                              <p:cond delay="0"/>
+                            </p:stCondLst>
+                            <p:childTnLst>
+                              <p:par>
+                                <p:cTn id="21" presetID="1" presetClass="entr" presetSubtype="0" fill="hold" grpId="0" nodeType="clickEffect">
+                                  <p:stCondLst>
+                                    <p:cond delay="0"/>
+                                  </p:stCondLst>
+                                  <p:childTnLst>
+                                    <p:set>
+                                      <p:cBhvr>
+                                        <p:cTn id="22" dur="1" fill="hold">
+                                          <p:stCondLst>
+                                            <p:cond delay="0"/>
+                                          </p:stCondLst>
+                                        </p:cTn>
+                                        <p:tgtEl>
+                                          <p:spTgt spid="3">
+                                            <p:txEl>
+                                              <p:pRg st="4" end="4"/>
+                                            </p:txEl>
+                                          </p:spTgt>
+                                        </p:tgtEl>
+                                        <p:attrNameLst>
+                                          <p:attrName>style.visibility</p:attrName>
+                                        </p:attrNameLst>
+                                      </p:cBhvr>
+                                      <p:to>
+                                        <p:strVal val="visible"/>
+                                      </p:to>
+                                    </p:set>
+                                  </p:childTnLst>
+                                </p:cTn>
+                              </p:par>
+                            </p:childTnLst>
+                          </p:cTn>
+                        </p:par>
+                      </p:childTnLst>
+                    </p:cTn>
+                  </p:par>
+                </p:childTnLst>
+              </p:cTn>
+              <p:prevCondLst>
+                <p:cond evt="onPrev" delay="0">
+                  <p:tgtEl>
+                    <p:sldTgt/>
+                  </p:tgtEl>
+                </p:cond>
+              </p:prevCondLst>
+              <p:nextCondLst>
+                <p:cond evt="onNext" delay="0">
+                  <p:tgtEl>
+                    <p:sldTgt/>
+                  </p:tgtEl>
+                </p:cond>
+              </p:nextCondLst>
+            </p:seq>
+          </p:childTnLst>
+        </p:cTn>
+      </p:par>
+    </p:tnLst>
+    <p:bldLst>
+      <p:bldP spid="3" grpId="0" build="p"/>
+    </p:bldLst>
+  </p:timing>
 </p:sld>
 </file>
 
@@ -7475,7 +7677,7 @@
           <a:p>
             <a:r>
               <a:rPr lang="en-US" dirty="0" smtClean="0"/>
-              <a:t>Visualizing VNODE Operations</a:t>
+              <a:t>GEOM Layers</a:t>
             </a:r>
             <a:endParaRPr lang="en-US" dirty="0"/>
           </a:p>
@@ -7496,7 +7698,58 @@
           <a:bodyPr/>
           <a:lstStyle/>
           <a:p>
-            <a:endParaRPr lang="en-US"/>
+            <a:r>
+              <a:rPr lang="en-US" dirty="0"/>
+              <a:t>MBR Master Boot Record </a:t>
+            </a:r>
+            <a:endParaRPr lang="en-US" dirty="0" smtClean="0"/>
+          </a:p>
+          <a:p>
+            <a:r>
+              <a:rPr lang="en-US" dirty="0" smtClean="0"/>
+              <a:t>BSD </a:t>
+            </a:r>
+            <a:r>
+              <a:rPr lang="en-US" dirty="0"/>
+              <a:t>BSD Slice</a:t>
+            </a:r>
+          </a:p>
+          <a:p>
+            <a:r>
+              <a:rPr lang="en-US" dirty="0"/>
+              <a:t>ELI Encryption </a:t>
+            </a:r>
+            <a:endParaRPr lang="en-US" dirty="0" smtClean="0"/>
+          </a:p>
+          <a:p>
+            <a:r>
+              <a:rPr lang="en-US" dirty="0" smtClean="0"/>
+              <a:t>MIRROR </a:t>
+            </a:r>
+            <a:r>
+              <a:rPr lang="en-US" dirty="0"/>
+              <a:t>Disk mirroring</a:t>
+            </a:r>
+          </a:p>
+          <a:p>
+            <a:r>
+              <a:rPr lang="en-US" dirty="0"/>
+              <a:t>JOURNAL Journaling </a:t>
+            </a:r>
+            <a:endParaRPr lang="en-US" dirty="0" smtClean="0"/>
+          </a:p>
+          <a:p>
+            <a:r>
+              <a:rPr lang="en-US" dirty="0" smtClean="0"/>
+              <a:t>RAID </a:t>
+            </a:r>
+            <a:r>
+              <a:rPr lang="en-US" dirty="0"/>
+              <a:t>Software RAID</a:t>
+            </a:r>
+          </a:p>
+          <a:p>
+            <a:endParaRPr lang="en-US" dirty="0"/>
           </a:p>
         </p:txBody>
       </p:sp>
@@ -7526,7 +7779,7 @@
     </p:spTree>
     <p:extLst>
       <p:ext uri="{BB962C8B-B14F-4D97-AF65-F5344CB8AC3E}">
-        <p14:creationId xmlns:p14="http://schemas.microsoft.com/office/powerpoint/2010/main" val="2047865590"/>
+        <p14:creationId xmlns:p14="http://schemas.microsoft.com/office/powerpoint/2010/main" val="2118315128"/>
       </p:ext>
     </p:extLst>
   </p:cSld>
@@ -7571,7 +7824,7 @@
           <a:p>
             <a:r>
               <a:rPr lang="en-US" dirty="0" smtClean="0"/>
-              <a:t>GEOM Overview</a:t>
+              <a:t>A Visual Example</a:t>
             </a:r>
             <a:endParaRPr lang="en-US" dirty="0"/>
           </a:p>
@@ -7592,25 +7845,7 @@
           <a:bodyPr/>
           <a:lstStyle/>
           <a:p>
-            <a:r>
-              <a:rPr lang="en-US" dirty="0"/>
-              <a:t>Framework for transforming storage requests</a:t>
-            </a:r>
-          </a:p>
-          <a:p>
-            <a:r>
-              <a:rPr lang="en-US" dirty="0"/>
-              <a:t>• Object Oriented</a:t>
-            </a:r>
-          </a:p>
-          <a:p>
-            <a:r>
-              <a:rPr lang="en-US" dirty="0"/>
-              <a:t>• Shuttles I/O requests between filesystems and devices</a:t>
-            </a:r>
-          </a:p>
-          <a:p>
-            <a:endParaRPr lang="en-US" dirty="0"/>
+            <a:endParaRPr lang="en-US"/>
           </a:p>
         </p:txBody>
       </p:sp>
@@ -7640,7 +7875,7 @@
     </p:spTree>
     <p:extLst>
       <p:ext uri="{BB962C8B-B14F-4D97-AF65-F5344CB8AC3E}">
-        <p14:creationId xmlns:p14="http://schemas.microsoft.com/office/powerpoint/2010/main" val="1856946886"/>
+        <p14:creationId xmlns:p14="http://schemas.microsoft.com/office/powerpoint/2010/main" val="1336700042"/>
       </p:ext>
     </p:extLst>
   </p:cSld>
@@ -7685,7 +7920,7 @@
           <a:p>
             <a:r>
               <a:rPr lang="en-US" dirty="0" smtClean="0"/>
-              <a:t>GEOM Layers</a:t>
+              <a:t>Performing I/O</a:t>
             </a:r>
             <a:endParaRPr lang="en-US" dirty="0"/>
           </a:p>
@@ -7707,57 +7942,32 @@
           <a:lstStyle/>
           <a:p>
             <a:r>
+              <a:rPr lang="en-US" dirty="0" err="1"/>
+              <a:t>sudo</a:t>
+            </a:r>
+            <a:r>
               <a:rPr lang="en-US" dirty="0"/>
-              <a:t>MBR Master Boot Record </a:t>
-            </a:r>
-            <a:endParaRPr lang="en-US" dirty="0" smtClean="0"/>
-          </a:p>
-          <a:p>
-            <a:r>
-              <a:rPr lang="en-US" dirty="0" smtClean="0"/>
-              <a:t>BSD </a:t>
+              <a:t> </a:t>
+            </a:r>
+            <a:r>
+              <a:rPr lang="en-US" dirty="0" err="1"/>
+              <a:t>dtrace</a:t>
             </a:r>
             <a:r>
               <a:rPr lang="en-US" dirty="0"/>
-              <a:t>BSD Slice</a:t>
-            </a:r>
+              <a:t> -n ::</a:t>
+            </a:r>
+            <a:r>
+              <a:rPr lang="en-US" dirty="0" err="1"/>
+              <a:t>g_io:entry</a:t>
+            </a:r>
+            <a:endParaRPr lang="en-US" dirty="0"/>
           </a:p>
           <a:p>
             <a:r>
               <a:rPr lang="en-US" dirty="0"/>
-              <a:t>ELI Encryption </a:t>
-            </a:r>
-            <a:endParaRPr lang="en-US" dirty="0" smtClean="0"/>
-          </a:p>
-          <a:p>
-            <a:r>
-              <a:rPr lang="en-US" dirty="0" smtClean="0"/>
-              <a:t>MIRROR </a:t>
-            </a:r>
-            <a:r>
-              <a:rPr lang="en-US" dirty="0"/>
-              <a:t>Disk mirroring</a:t>
-            </a:r>
-          </a:p>
-          <a:p>
-            <a:r>
-              <a:rPr lang="en-US" dirty="0"/>
-              <a:t>JOURNAL Journaling </a:t>
-            </a:r>
-            <a:endParaRPr lang="en-US" dirty="0" smtClean="0"/>
-          </a:p>
-          <a:p>
-            <a:r>
-              <a:rPr lang="en-US" dirty="0" smtClean="0"/>
-              <a:t>RAID </a:t>
-            </a:r>
-            <a:r>
-              <a:rPr lang="en-US" dirty="0"/>
-              <a:t>Software RAID</a:t>
-            </a:r>
-          </a:p>
-          <a:p>
-            <a:endParaRPr lang="en-US" dirty="0"/>
+              <a:t>This gets us the most likely 8 routines we care about.</a:t>
+            </a:r>
           </a:p>
         </p:txBody>
       </p:sp>
@@ -7787,7 +7997,7 @@
     </p:spTree>
     <p:extLst>
       <p:ext uri="{BB962C8B-B14F-4D97-AF65-F5344CB8AC3E}">
-        <p14:creationId xmlns:p14="http://schemas.microsoft.com/office/powerpoint/2010/main" val="2118315128"/>
+        <p14:creationId xmlns:p14="http://schemas.microsoft.com/office/powerpoint/2010/main" val="731228842"/>
       </p:ext>
     </p:extLst>
   </p:cSld>
@@ -7832,7 +8042,7 @@
           <a:p>
             <a:r>
               <a:rPr lang="en-US" dirty="0" smtClean="0"/>
-              <a:t>A Visual Example</a:t>
+              <a:t>NFS: The Network Filesystem</a:t>
             </a:r>
             <a:endParaRPr lang="en-US" dirty="0"/>
           </a:p>
@@ -7853,7 +8063,31 @@
           <a:bodyPr/>
           <a:lstStyle/>
           <a:p>
-            <a:endParaRPr lang="en-US"/>
+            <a:r>
+              <a:rPr lang="en-US" dirty="0"/>
+              <a:t>Developed by Sun Microsystems in the 1980s </a:t>
+            </a:r>
+            <a:endParaRPr lang="en-US" dirty="0" smtClean="0"/>
+          </a:p>
+          <a:p>
+            <a:r>
+              <a:rPr lang="en-US" dirty="0" smtClean="0"/>
+              <a:t>Applies </a:t>
+            </a:r>
+            <a:r>
+              <a:rPr lang="en-US" dirty="0"/>
+              <a:t>UNIX semantics to networked files</a:t>
+            </a:r>
+          </a:p>
+          <a:p>
+            <a:r>
+              <a:rPr lang="en-US" dirty="0" smtClean="0"/>
+              <a:t>Version </a:t>
+            </a:r>
+            <a:r>
+              <a:rPr lang="en-US" dirty="0"/>
+              <a:t>2, 3 and 4</a:t>
+            </a:r>
           </a:p>
         </p:txBody>
       </p:sp>
@@ -7883,7 +8117,7 @@
     </p:spTree>
     <p:extLst>
       <p:ext uri="{BB962C8B-B14F-4D97-AF65-F5344CB8AC3E}">
-        <p14:creationId xmlns:p14="http://schemas.microsoft.com/office/powerpoint/2010/main" val="1336700042"/>
+        <p14:creationId xmlns:p14="http://schemas.microsoft.com/office/powerpoint/2010/main" val="2103776000"/>
       </p:ext>
     </p:extLst>
   </p:cSld>
@@ -7927,10 +8161,10 @@
           <a:lstStyle/>
           <a:p>
             <a:r>
-              <a:rPr lang="en-US" dirty="0" smtClean="0"/>
-              <a:t>Performing I/O</a:t>
-            </a:r>
-            <a:endParaRPr lang="en-US" dirty="0"/>
+              <a:rPr lang="en-US" smtClean="0"/>
+              <a:t>Storage Review</a:t>
+            </a:r>
+            <a:endParaRPr lang="en-US"/>
           </a:p>
         </p:txBody>
       </p:sp>
@@ -7949,33 +8183,7 @@
           <a:bodyPr/>
           <a:lstStyle/>
           <a:p>
-            <a:r>
-              <a:rPr lang="en-US" dirty="0" err="1"/>
-              <a:t>sudo</a:t>
-            </a:r>
-            <a:r>
-              <a:rPr lang="en-US" dirty="0"/>
-              <a:t> </a:t>
-            </a:r>
-            <a:r>
-              <a:rPr lang="en-US" dirty="0" err="1"/>
-              <a:t>dtrace</a:t>
-            </a:r>
-            <a:r>
-              <a:rPr lang="en-US" dirty="0"/>
-              <a:t> -n ::</a:t>
-            </a:r>
-            <a:r>
-              <a:rPr lang="en-US" dirty="0" err="1"/>
-              <a:t>g_io:entry</a:t>
-            </a:r>
-            <a:endParaRPr lang="en-US" dirty="0"/>
-          </a:p>
-          <a:p>
-            <a:r>
-              <a:rPr lang="en-US" dirty="0"/>
-              <a:t>This gets us the most likely 8 routines we care about.</a:t>
-            </a:r>
+            <a:endParaRPr lang="en-US"/>
           </a:p>
         </p:txBody>
       </p:sp>
@@ -7997,222 +8205,6 @@
             <a:fld id="{86CB4B4D-7CA3-9044-876B-883B54F8677D}" type="slidenum">
               <a:rPr lang="uk-UA" smtClean="0"/>
               <a:t>34</a:t>
-            </a:fld>
-            <a:endParaRPr lang="uk-UA"/>
-          </a:p>
-        </p:txBody>
-      </p:sp>
-    </p:spTree>
-    <p:extLst>
-      <p:ext uri="{BB962C8B-B14F-4D97-AF65-F5344CB8AC3E}">
-        <p14:creationId xmlns:p14="http://schemas.microsoft.com/office/powerpoint/2010/main" val="731228842"/>
-      </p:ext>
-    </p:extLst>
-  </p:cSld>
-  <p:clrMapOvr>
-    <a:masterClrMapping/>
-  </p:clrMapOvr>
-  <p:transition spd="med"/>
-</p:sld>
-</file>
-
-<file path=ppt/slides/slide35.xml><?xml version="1.0" encoding="utf-8"?>
-<p:sld xmlns:a="http://schemas.openxmlformats.org/drawingml/2006/main" xmlns:r="http://schemas.openxmlformats.org/officeDocument/2006/relationships" xmlns:p="http://schemas.openxmlformats.org/presentationml/2006/main">
-  <p:cSld>
-    <p:spTree>
-      <p:nvGrpSpPr>
-        <p:cNvPr id="1" name=""/>
-        <p:cNvGrpSpPr/>
-        <p:nvPr/>
-      </p:nvGrpSpPr>
-      <p:grpSpPr>
-        <a:xfrm>
-          <a:off x="0" y="0"/>
-          <a:ext cx="0" cy="0"/>
-          <a:chOff x="0" y="0"/>
-          <a:chExt cx="0" cy="0"/>
-        </a:xfrm>
-      </p:grpSpPr>
-      <p:sp>
-        <p:nvSpPr>
-          <p:cNvPr id="2" name="Title 1"/>
-          <p:cNvSpPr>
-            <a:spLocks noGrp="1"/>
-          </p:cNvSpPr>
-          <p:nvPr>
-            <p:ph type="title"/>
-          </p:nvPr>
-        </p:nvSpPr>
-        <p:spPr/>
-        <p:txBody>
-          <a:bodyPr/>
-          <a:lstStyle/>
-          <a:p>
-            <a:r>
-              <a:rPr lang="en-US" dirty="0" smtClean="0"/>
-              <a:t>NFS: The Network Filesystem</a:t>
-            </a:r>
-            <a:endParaRPr lang="en-US" dirty="0"/>
-          </a:p>
-        </p:txBody>
-      </p:sp>
-      <p:sp>
-        <p:nvSpPr>
-          <p:cNvPr id="3" name="Text Placeholder 2"/>
-          <p:cNvSpPr>
-            <a:spLocks noGrp="1"/>
-          </p:cNvSpPr>
-          <p:nvPr>
-            <p:ph type="body" idx="1"/>
-          </p:nvPr>
-        </p:nvSpPr>
-        <p:spPr/>
-        <p:txBody>
-          <a:bodyPr/>
-          <a:lstStyle/>
-          <a:p>
-            <a:r>
-              <a:rPr lang="en-US" dirty="0"/>
-              <a:t>Developed by Sun Microsystems in the 1980s </a:t>
-            </a:r>
-            <a:endParaRPr lang="en-US" dirty="0" smtClean="0"/>
-          </a:p>
-          <a:p>
-            <a:r>
-              <a:rPr lang="en-US" dirty="0" smtClean="0"/>
-              <a:t>Applies </a:t>
-            </a:r>
-            <a:r>
-              <a:rPr lang="en-US" dirty="0"/>
-              <a:t>UNIX semantics to networked files</a:t>
-            </a:r>
-          </a:p>
-          <a:p>
-            <a:r>
-              <a:rPr lang="en-US" dirty="0" smtClean="0"/>
-              <a:t>Version </a:t>
-            </a:r>
-            <a:r>
-              <a:rPr lang="en-US" dirty="0"/>
-              <a:t>2, 3 and 4</a:t>
-            </a:r>
-          </a:p>
-        </p:txBody>
-      </p:sp>
-      <p:sp>
-        <p:nvSpPr>
-          <p:cNvPr id="4" name="Slide Number Placeholder 3"/>
-          <p:cNvSpPr>
-            <a:spLocks noGrp="1"/>
-          </p:cNvSpPr>
-          <p:nvPr>
-            <p:ph type="sldNum" sz="quarter" idx="2"/>
-          </p:nvPr>
-        </p:nvSpPr>
-        <p:spPr/>
-        <p:txBody>
-          <a:bodyPr/>
-          <a:lstStyle/>
-          <a:p>
-            <a:fld id="{86CB4B4D-7CA3-9044-876B-883B54F8677D}" type="slidenum">
-              <a:rPr lang="uk-UA" smtClean="0"/>
-              <a:t>35</a:t>
-            </a:fld>
-            <a:endParaRPr lang="uk-UA"/>
-          </a:p>
-        </p:txBody>
-      </p:sp>
-    </p:spTree>
-    <p:extLst>
-      <p:ext uri="{BB962C8B-B14F-4D97-AF65-F5344CB8AC3E}">
-        <p14:creationId xmlns:p14="http://schemas.microsoft.com/office/powerpoint/2010/main" val="2103776000"/>
-      </p:ext>
-    </p:extLst>
-  </p:cSld>
-  <p:clrMapOvr>
-    <a:masterClrMapping/>
-  </p:clrMapOvr>
-  <p:transition spd="med"/>
-</p:sld>
-</file>
-
-<file path=ppt/slides/slide36.xml><?xml version="1.0" encoding="utf-8"?>
-<p:sld xmlns:a="http://schemas.openxmlformats.org/drawingml/2006/main" xmlns:r="http://schemas.openxmlformats.org/officeDocument/2006/relationships" xmlns:p="http://schemas.openxmlformats.org/presentationml/2006/main">
-  <p:cSld>
-    <p:spTree>
-      <p:nvGrpSpPr>
-        <p:cNvPr id="1" name=""/>
-        <p:cNvGrpSpPr/>
-        <p:nvPr/>
-      </p:nvGrpSpPr>
-      <p:grpSpPr>
-        <a:xfrm>
-          <a:off x="0" y="0"/>
-          <a:ext cx="0" cy="0"/>
-          <a:chOff x="0" y="0"/>
-          <a:chExt cx="0" cy="0"/>
-        </a:xfrm>
-      </p:grpSpPr>
-      <p:sp>
-        <p:nvSpPr>
-          <p:cNvPr id="2" name="Title 1"/>
-          <p:cNvSpPr>
-            <a:spLocks noGrp="1"/>
-          </p:cNvSpPr>
-          <p:nvPr>
-            <p:ph type="title"/>
-          </p:nvPr>
-        </p:nvSpPr>
-        <p:spPr/>
-        <p:txBody>
-          <a:bodyPr/>
-          <a:lstStyle/>
-          <a:p>
-            <a:r>
-              <a:rPr lang="en-US" smtClean="0"/>
-              <a:t>Storage Review</a:t>
-            </a:r>
-            <a:endParaRPr lang="en-US"/>
-          </a:p>
-        </p:txBody>
-      </p:sp>
-      <p:sp>
-        <p:nvSpPr>
-          <p:cNvPr id="3" name="Text Placeholder 2"/>
-          <p:cNvSpPr>
-            <a:spLocks noGrp="1"/>
-          </p:cNvSpPr>
-          <p:nvPr>
-            <p:ph type="body" idx="1"/>
-          </p:nvPr>
-        </p:nvSpPr>
-        <p:spPr/>
-        <p:txBody>
-          <a:bodyPr/>
-          <a:lstStyle/>
-          <a:p>
-            <a:endParaRPr lang="en-US"/>
-          </a:p>
-        </p:txBody>
-      </p:sp>
-      <p:sp>
-        <p:nvSpPr>
-          <p:cNvPr id="4" name="Slide Number Placeholder 3"/>
-          <p:cNvSpPr>
-            <a:spLocks noGrp="1"/>
-          </p:cNvSpPr>
-          <p:nvPr>
-            <p:ph type="sldNum" sz="quarter" idx="2"/>
-          </p:nvPr>
-        </p:nvSpPr>
-        <p:spPr/>
-        <p:txBody>
-          <a:bodyPr/>
-          <a:lstStyle/>
-          <a:p>
-            <a:fld id="{86CB4B4D-7CA3-9044-876B-883B54F8677D}" type="slidenum">
-              <a:rPr lang="uk-UA" smtClean="0"/>
-              <a:t>36</a:t>
             </a:fld>
             <a:endParaRPr lang="uk-UA"/>
           </a:p>
@@ -8266,7 +8258,7 @@
           <a:p>
             <a:r>
               <a:rPr lang="en-US" dirty="0" smtClean="0"/>
-              <a:t>What is a Filesystem?</a:t>
+              <a:t>Goals</a:t>
             </a:r>
             <a:endParaRPr lang="en-US" dirty="0"/>
           </a:p>
@@ -8287,7 +8279,43 @@
           <a:bodyPr/>
           <a:lstStyle/>
           <a:p>
-            <a:endParaRPr lang="en-US"/>
+            <a:r>
+              <a:rPr lang="en-US" dirty="0" smtClean="0"/>
+              <a:t>Fast Storage and Retrieval of User Data</a:t>
+            </a:r>
+          </a:p>
+          <a:p>
+            <a:r>
+              <a:rPr lang="en-US" dirty="0" smtClean="0"/>
+              <a:t>Scalable: Files, Data, Disks, </a:t>
+            </a:r>
+            <a:r>
+              <a:rPr lang="mr-IN" dirty="0" smtClean="0"/>
+              <a:t>…</a:t>
+            </a:r>
+            <a:endParaRPr lang="en-US" dirty="0" smtClean="0"/>
+          </a:p>
+          <a:p>
+            <a:r>
+              <a:rPr lang="en-US" dirty="0" smtClean="0"/>
+              <a:t>Reliable: “Destroy data once and no one trusts you again.” </a:t>
+            </a:r>
+            <a:r>
+              <a:rPr lang="mr-IN" dirty="0" smtClean="0"/>
+              <a:t>–</a:t>
+            </a:r>
+            <a:r>
+              <a:rPr lang="en-US" dirty="0" smtClean="0"/>
+              <a:t> Kirk </a:t>
+            </a:r>
+            <a:r>
+              <a:rPr lang="en-US" dirty="0" err="1" smtClean="0"/>
+              <a:t>McKusick</a:t>
+            </a:r>
+            <a:endParaRPr lang="en-US" dirty="0" smtClean="0"/>
+          </a:p>
+          <a:p>
+            <a:endParaRPr lang="en-US" dirty="0"/>
           </a:p>
         </p:txBody>
       </p:sp>
@@ -8308,7 +8336,7 @@
           <a:p>
             <a:fld id="{BC4AE5AA-C6FF-5A4F-9D02-E3454F0B3602}" type="datetime1">
               <a:rPr lang="en-US" smtClean="0"/>
-              <a:t>2/1/17</a:t>
+              <a:t>3/1/17</a:t>
             </a:fld>
             <a:endParaRPr lang="en-US"/>
           </a:p>
@@ -8363,7 +8391,7 @@
     </p:spTree>
     <p:extLst>
       <p:ext uri="{BB962C8B-B14F-4D97-AF65-F5344CB8AC3E}">
-        <p14:creationId xmlns:p14="http://schemas.microsoft.com/office/powerpoint/2010/main" val="1203724601"/>
+        <p14:creationId xmlns:p14="http://schemas.microsoft.com/office/powerpoint/2010/main" val="216811476"/>
       </p:ext>
     </p:extLst>
   </p:cSld>
@@ -8407,7 +8435,7 @@
           <a:p>
             <a:r>
               <a:rPr lang="en-US" dirty="0" smtClean="0"/>
-              <a:t>Examples</a:t>
+              <a:t>Glossary</a:t>
             </a:r>
             <a:endParaRPr lang="en-US" dirty="0"/>
           </a:p>
@@ -8430,40 +8458,23 @@
           <a:p>
             <a:r>
               <a:rPr lang="en-US" dirty="0" smtClean="0"/>
-              <a:t>UFS2: FreeBSD</a:t>
-            </a:r>
-          </a:p>
-          <a:p>
-            <a:r>
-              <a:rPr lang="en-US" dirty="0" smtClean="0"/>
-              <a:t>EXT4: Linux</a:t>
-            </a:r>
-          </a:p>
-          <a:p>
-            <a:r>
-              <a:rPr lang="en-US" dirty="0" smtClean="0"/>
-              <a:t>NTFS: Windows</a:t>
-            </a:r>
-          </a:p>
-          <a:p>
-            <a:r>
-              <a:rPr lang="en-US" dirty="0" smtClean="0"/>
-              <a:t>FAT: DOS</a:t>
-            </a:r>
-          </a:p>
-          <a:p>
-            <a:r>
-              <a:rPr lang="en-US" dirty="0" smtClean="0"/>
-              <a:t>ZFS: </a:t>
-            </a:r>
-            <a:r>
-              <a:rPr lang="en-US" dirty="0" err="1" smtClean="0"/>
-              <a:t>Illumos</a:t>
-            </a:r>
-            <a:r>
-              <a:rPr lang="en-US" dirty="0" smtClean="0"/>
-              <a:t> and FreeBSD</a:t>
-            </a:r>
+              <a:t>Block Smallest piece of stored data</a:t>
+            </a:r>
+          </a:p>
+          <a:p>
+            <a:r>
+              <a:rPr lang="en-US" dirty="0" smtClean="0"/>
+              <a:t>File A collection of blocks</a:t>
+            </a:r>
+          </a:p>
+          <a:p>
+            <a:r>
+              <a:rPr lang="en-US" dirty="0" smtClean="0"/>
+              <a:t>Directory A collection of files</a:t>
+            </a:r>
+          </a:p>
+          <a:p>
+            <a:endParaRPr lang="en-US" dirty="0"/>
           </a:p>
         </p:txBody>
       </p:sp>
@@ -8484,7 +8495,7 @@
           <a:p>
             <a:fld id="{BC4AE5AA-C6FF-5A4F-9D02-E3454F0B3602}" type="datetime1">
               <a:rPr lang="en-US" smtClean="0"/>
-              <a:t>2/1/17</a:t>
+              <a:t>3/1/17</a:t>
             </a:fld>
             <a:endParaRPr lang="en-US"/>
           </a:p>
@@ -8539,7 +8550,7 @@
     </p:spTree>
     <p:extLst>
       <p:ext uri="{BB962C8B-B14F-4D97-AF65-F5344CB8AC3E}">
-        <p14:creationId xmlns:p14="http://schemas.microsoft.com/office/powerpoint/2010/main" val="1410558966"/>
+        <p14:creationId xmlns:p14="http://schemas.microsoft.com/office/powerpoint/2010/main" val="1790719523"/>
       </p:ext>
     </p:extLst>
   </p:cSld>
@@ -8583,7 +8594,7 @@
           <a:p>
             <a:r>
               <a:rPr lang="en-US" dirty="0" smtClean="0"/>
-              <a:t>Goals</a:t>
+              <a:t>Access to stored data</a:t>
             </a:r>
             <a:endParaRPr lang="en-US" dirty="0"/>
           </a:p>
@@ -8605,39 +8616,33 @@
           <a:lstStyle/>
           <a:p>
             <a:r>
-              <a:rPr lang="en-US" dirty="0" smtClean="0"/>
-              <a:t>Fast Storage and Retrieval of User Data</a:t>
-            </a:r>
-          </a:p>
-          <a:p>
-            <a:r>
-              <a:rPr lang="en-US" dirty="0" smtClean="0"/>
-              <a:t>Scalable: Files, Data, Disks, </a:t>
-            </a:r>
-            <a:r>
-              <a:rPr lang="mr-IN" dirty="0" smtClean="0"/>
-              <a:t>…</a:t>
-            </a:r>
-            <a:endParaRPr lang="en-US" dirty="0" smtClean="0"/>
-          </a:p>
-          <a:p>
-            <a:r>
-              <a:rPr lang="en-US" dirty="0" smtClean="0"/>
-              <a:t>Reliable: “Destroy data once and no one trusts you again.” </a:t>
-            </a:r>
-            <a:r>
-              <a:rPr lang="mr-IN" dirty="0" smtClean="0"/>
-              <a:t>–</a:t>
-            </a:r>
-            <a:r>
-              <a:rPr lang="en-US" dirty="0" smtClean="0"/>
-              <a:t> Kirk </a:t>
-            </a:r>
-            <a:r>
               <a:rPr lang="en-US" dirty="0" err="1" smtClean="0"/>
-              <a:t>McKusick</a:t>
-            </a:r>
-            <a:endParaRPr lang="en-US" dirty="0" smtClean="0"/>
+              <a:t>syscall</a:t>
+            </a:r>
+            <a:r>
+              <a:rPr lang="en-US" dirty="0" smtClean="0"/>
+              <a:t>: open, close, read, write</a:t>
+            </a:r>
+          </a:p>
+          <a:p>
+            <a:r>
+              <a:rPr lang="en-US" dirty="0" smtClean="0"/>
+              <a:t>filesystem: </a:t>
+            </a:r>
+            <a:r>
+              <a:rPr lang="en-US" dirty="0" err="1" smtClean="0"/>
+              <a:t>vnode</a:t>
+            </a:r>
+            <a:r>
+              <a:rPr lang="en-US" dirty="0" smtClean="0"/>
+              <a:t> operations</a:t>
+            </a:r>
+          </a:p>
+          <a:p>
+            <a:r>
+              <a:rPr lang="en-US" dirty="0" smtClean="0"/>
+              <a:t>physical media: GEOM layer</a:t>
+            </a:r>
           </a:p>
           <a:p>
             <a:endParaRPr lang="en-US" dirty="0"/>
@@ -8661,7 +8666,7 @@
           <a:p>
             <a:fld id="{BC4AE5AA-C6FF-5A4F-9D02-E3454F0B3602}" type="datetime1">
               <a:rPr lang="en-US" smtClean="0"/>
-              <a:t>2/1/17</a:t>
+              <a:t>3/1/17</a:t>
             </a:fld>
             <a:endParaRPr lang="en-US"/>
           </a:p>
@@ -8716,7 +8721,7 @@
     </p:spTree>
     <p:extLst>
       <p:ext uri="{BB962C8B-B14F-4D97-AF65-F5344CB8AC3E}">
-        <p14:creationId xmlns:p14="http://schemas.microsoft.com/office/powerpoint/2010/main" val="216811476"/>
+        <p14:creationId xmlns:p14="http://schemas.microsoft.com/office/powerpoint/2010/main" val="1453160394"/>
       </p:ext>
     </p:extLst>
   </p:cSld>
@@ -8760,7 +8765,7 @@
           <a:p>
             <a:r>
               <a:rPr lang="en-US" dirty="0" smtClean="0"/>
-              <a:t>Glossary</a:t>
+              <a:t>Filesystems of FreeBSD</a:t>
             </a:r>
             <a:endParaRPr lang="en-US" dirty="0"/>
           </a:p>
@@ -8783,22 +8788,66 @@
           <a:p>
             <a:r>
               <a:rPr lang="en-US" dirty="0" smtClean="0"/>
-              <a:t>Block Smallest piece of stored data</a:t>
-            </a:r>
-          </a:p>
-          <a:p>
-            <a:r>
-              <a:rPr lang="en-US" dirty="0" smtClean="0"/>
-              <a:t>File A collection of blocks</a:t>
-            </a:r>
-          </a:p>
-          <a:p>
-            <a:r>
-              <a:rPr lang="en-US" dirty="0" smtClean="0"/>
-              <a:t>Directory A collection of files</a:t>
-            </a:r>
-          </a:p>
-          <a:p>
+              <a:t>UFS</a:t>
+            </a:r>
+          </a:p>
+          <a:p>
+            <a:pPr lvl="1"/>
+            <a:r>
+              <a:rPr lang="en-US" dirty="0" smtClean="0"/>
+              <a:t>Fast</a:t>
+            </a:r>
+          </a:p>
+          <a:p>
+            <a:pPr lvl="1"/>
+            <a:r>
+              <a:rPr lang="en-US" dirty="0" smtClean="0"/>
+              <a:t>Small</a:t>
+            </a:r>
+          </a:p>
+          <a:p>
+            <a:pPr lvl="1"/>
+            <a:r>
+              <a:rPr lang="en-US" dirty="0" smtClean="0"/>
+              <a:t>Snapshots</a:t>
+            </a:r>
+          </a:p>
+          <a:p>
+            <a:pPr lvl="1"/>
+            <a:r>
+              <a:rPr lang="en-US" dirty="0" smtClean="0"/>
+              <a:t>A bit of journaling</a:t>
+            </a:r>
+          </a:p>
+          <a:p>
+            <a:r>
+              <a:rPr lang="en-US" dirty="0" smtClean="0"/>
+              <a:t>ZFS</a:t>
+            </a:r>
+          </a:p>
+          <a:p>
+            <a:pPr lvl="1"/>
+            <a:r>
+              <a:rPr lang="en-US" dirty="0" smtClean="0"/>
+              <a:t>Large storage</a:t>
+            </a:r>
+          </a:p>
+          <a:p>
+            <a:pPr lvl="1"/>
+            <a:r>
+              <a:rPr lang="en-US" dirty="0" smtClean="0"/>
+              <a:t>Copy on Write</a:t>
+            </a:r>
+          </a:p>
+          <a:p>
+            <a:pPr lvl="1"/>
+            <a:r>
+              <a:rPr lang="en-US" dirty="0" smtClean="0"/>
+              <a:t>Snapshots</a:t>
+            </a:r>
+          </a:p>
+          <a:p>
+            <a:pPr lvl="1"/>
             <a:endParaRPr lang="en-US" dirty="0"/>
           </a:p>
         </p:txBody>
@@ -8820,7 +8869,7 @@
           <a:p>
             <a:fld id="{BC4AE5AA-C6FF-5A4F-9D02-E3454F0B3602}" type="datetime1">
               <a:rPr lang="en-US" smtClean="0"/>
-              <a:t>2/1/17</a:t>
+              <a:t>3/1/17</a:t>
             </a:fld>
             <a:endParaRPr lang="en-US"/>
           </a:p>
@@ -8875,7 +8924,7 @@
     </p:spTree>
     <p:extLst>
       <p:ext uri="{BB962C8B-B14F-4D97-AF65-F5344CB8AC3E}">
-        <p14:creationId xmlns:p14="http://schemas.microsoft.com/office/powerpoint/2010/main" val="1790719523"/>
+        <p14:creationId xmlns:p14="http://schemas.microsoft.com/office/powerpoint/2010/main" val="855881070"/>
       </p:ext>
     </p:extLst>
   </p:cSld>
@@ -8919,7 +8968,7 @@
           <a:p>
             <a:r>
               <a:rPr lang="en-US" dirty="0" smtClean="0"/>
-              <a:t>Access to stored data</a:t>
+              <a:t>Parameters and Trade Offs	</a:t>
             </a:r>
             <a:endParaRPr lang="en-US" dirty="0"/>
           </a:p>
@@ -8941,35 +8990,31 @@
           <a:lstStyle/>
           <a:p>
             <a:r>
-              <a:rPr lang="en-US" dirty="0" err="1" smtClean="0"/>
-              <a:t>syscall</a:t>
-            </a:r>
-            <a:r>
-              <a:rPr lang="en-US" dirty="0" smtClean="0"/>
-              <a:t>: open, close, read, write</a:t>
-            </a:r>
-          </a:p>
-          <a:p>
-            <a:r>
-              <a:rPr lang="en-US" dirty="0" smtClean="0"/>
-              <a:t>filesystem: </a:t>
-            </a:r>
-            <a:r>
-              <a:rPr lang="en-US" dirty="0" err="1" smtClean="0"/>
-              <a:t>vnode</a:t>
-            </a:r>
-            <a:r>
-              <a:rPr lang="en-US" dirty="0" smtClean="0"/>
-              <a:t> operations</a:t>
-            </a:r>
-          </a:p>
-          <a:p>
-            <a:r>
-              <a:rPr lang="en-US" dirty="0" smtClean="0"/>
-              <a:t>physical media: GEOM layer</a:t>
-            </a:r>
-          </a:p>
-          <a:p>
+              <a:rPr lang="en-US" dirty="0" smtClean="0"/>
+              <a:t>Block Size </a:t>
+            </a:r>
+            <a:r>
+              <a:rPr lang="mr-IN" dirty="0" smtClean="0"/>
+              <a:t>–</a:t>
+            </a:r>
+            <a:r>
+              <a:rPr lang="en-US" dirty="0" smtClean="0"/>
+              <a:t> Bytes per block</a:t>
+            </a:r>
+          </a:p>
+          <a:p>
+            <a:r>
+              <a:rPr lang="en-US" dirty="0" smtClean="0"/>
+              <a:t>Indirect Blocks </a:t>
+            </a:r>
+            <a:r>
+              <a:rPr lang="mr-IN" dirty="0" smtClean="0"/>
+              <a:t>–</a:t>
+            </a:r>
+            <a:r>
+              <a:rPr lang="en-US" dirty="0" smtClean="0"/>
+              <a:t> How many blocks can we reference?</a:t>
+            </a:r>
             <a:endParaRPr lang="en-US" dirty="0"/>
           </a:p>
         </p:txBody>
@@ -8991,7 +9036,7 @@
           <a:p>
             <a:fld id="{BC4AE5AA-C6FF-5A4F-9D02-E3454F0B3602}" type="datetime1">
               <a:rPr lang="en-US" smtClean="0"/>
-              <a:t>2/1/17</a:t>
+              <a:t>3/1/17</a:t>
             </a:fld>
             <a:endParaRPr lang="en-US"/>
           </a:p>
@@ -9046,7 +9091,7 @@
     </p:spTree>
     <p:extLst>
       <p:ext uri="{BB962C8B-B14F-4D97-AF65-F5344CB8AC3E}">
-        <p14:creationId xmlns:p14="http://schemas.microsoft.com/office/powerpoint/2010/main" val="1453160394"/>
+        <p14:creationId xmlns:p14="http://schemas.microsoft.com/office/powerpoint/2010/main" val="962404221"/>
       </p:ext>
     </p:extLst>
   </p:cSld>
@@ -9090,7 +9135,7 @@
           <a:p>
             <a:r>
               <a:rPr lang="en-US" dirty="0" smtClean="0"/>
-              <a:t>Filesystems of FreeBSD</a:t>
+              <a:t>A walk through open()</a:t>
             </a:r>
             <a:endParaRPr lang="en-US" dirty="0"/>
           </a:p>
@@ -9111,68 +9156,82 @@
           <a:bodyPr/>
           <a:lstStyle/>
           <a:p>
-            <a:r>
-              <a:rPr lang="en-US" dirty="0" smtClean="0"/>
-              <a:t>UFS</a:t>
-            </a:r>
-          </a:p>
-          <a:p>
-            <a:pPr lvl="1"/>
-            <a:r>
-              <a:rPr lang="en-US" dirty="0" smtClean="0"/>
-              <a:t>Fast</a:t>
-            </a:r>
-          </a:p>
-          <a:p>
-            <a:pPr lvl="1"/>
-            <a:r>
-              <a:rPr lang="en-US" dirty="0" smtClean="0"/>
-              <a:t>Small</a:t>
-            </a:r>
-          </a:p>
-          <a:p>
-            <a:pPr lvl="1"/>
-            <a:r>
-              <a:rPr lang="en-US" dirty="0" smtClean="0"/>
-              <a:t>Snapshots</a:t>
-            </a:r>
-          </a:p>
-          <a:p>
-            <a:pPr lvl="1"/>
-            <a:r>
-              <a:rPr lang="en-US" dirty="0" smtClean="0"/>
-              <a:t>A bit of journaling</a:t>
-            </a:r>
-          </a:p>
-          <a:p>
-            <a:r>
-              <a:rPr lang="en-US" dirty="0" smtClean="0"/>
-              <a:t>ZFS</a:t>
-            </a:r>
-          </a:p>
-          <a:p>
-            <a:pPr lvl="1"/>
-            <a:r>
-              <a:rPr lang="en-US" dirty="0" smtClean="0"/>
-              <a:t>Large storage</a:t>
-            </a:r>
-          </a:p>
-          <a:p>
-            <a:pPr lvl="1"/>
-            <a:r>
-              <a:rPr lang="en-US" dirty="0" smtClean="0"/>
-              <a:t>Copy on Write</a:t>
-            </a:r>
-          </a:p>
-          <a:p>
-            <a:pPr lvl="1"/>
-            <a:r>
-              <a:rPr lang="en-US" dirty="0" smtClean="0"/>
-              <a:t>Snapshots</a:t>
-            </a:r>
-          </a:p>
-          <a:p>
-            <a:pPr lvl="1"/>
+            <a:pPr marL="457200" indent="-457200">
+              <a:buFont typeface="+mj-lt"/>
+              <a:buAutoNum type="arabicPeriod"/>
+            </a:pPr>
+            <a:r>
+              <a:rPr lang="en-US" dirty="0" smtClean="0"/>
+              <a:t>open(”foo”)</a:t>
+            </a:r>
+          </a:p>
+          <a:p>
+            <a:pPr marL="457200" indent="-457200">
+              <a:buFont typeface="+mj-lt"/>
+              <a:buAutoNum type="arabicPeriod"/>
+            </a:pPr>
+            <a:r>
+              <a:rPr lang="en-US" dirty="0" smtClean="0"/>
+              <a:t>Execute the open() system call</a:t>
+            </a:r>
+          </a:p>
+          <a:p>
+            <a:pPr marL="457200" indent="-457200">
+              <a:buFont typeface="+mj-lt"/>
+              <a:buAutoNum type="arabicPeriod"/>
+            </a:pPr>
+            <a:r>
+              <a:rPr lang="en-US" dirty="0" smtClean="0"/>
+              <a:t>Look up the file name</a:t>
+            </a:r>
+          </a:p>
+          <a:p>
+            <a:pPr marL="457200" indent="-457200">
+              <a:buFont typeface="+mj-lt"/>
+              <a:buAutoNum type="arabicPeriod"/>
+            </a:pPr>
+            <a:r>
+              <a:rPr lang="en-US" dirty="0" smtClean="0"/>
+              <a:t>Check the </a:t>
+            </a:r>
+            <a:r>
+              <a:rPr lang="en-US" dirty="0" err="1" smtClean="0"/>
+              <a:t>users’s</a:t>
+            </a:r>
+            <a:r>
+              <a:rPr lang="en-US" dirty="0" smtClean="0"/>
+              <a:t> permissions against the file permissions</a:t>
+            </a:r>
+          </a:p>
+          <a:p>
+            <a:pPr marL="457200" indent="-457200">
+              <a:buFont typeface="+mj-lt"/>
+              <a:buAutoNum type="arabicPeriod"/>
+            </a:pPr>
+            <a:r>
+              <a:rPr lang="en-US" dirty="0" smtClean="0"/>
+              <a:t>Kernel records the fact that the file is open</a:t>
+            </a:r>
+          </a:p>
+          <a:p>
+            <a:pPr marL="457200" indent="-457200">
+              <a:buFont typeface="+mj-lt"/>
+              <a:buAutoNum type="arabicPeriod"/>
+            </a:pPr>
+            <a:r>
+              <a:rPr lang="en-US" dirty="0" smtClean="0"/>
+              <a:t>Per-process file descriptor allocated and returned to the caller</a:t>
+            </a:r>
+          </a:p>
+          <a:p>
+            <a:pPr marL="457200" indent="-457200">
+              <a:buFont typeface="+mj-lt"/>
+              <a:buAutoNum type="arabicPeriod"/>
+            </a:pPr>
+            <a:r>
+              <a:rPr lang="en-US" dirty="0" smtClean="0"/>
+              <a:t>No data is moved</a:t>
+            </a:r>
             <a:endParaRPr lang="en-US" dirty="0"/>
           </a:p>
         </p:txBody>
@@ -9194,7 +9253,7 @@
           <a:p>
             <a:fld id="{BC4AE5AA-C6FF-5A4F-9D02-E3454F0B3602}" type="datetime1">
               <a:rPr lang="en-US" smtClean="0"/>
-              <a:t>2/1/17</a:t>
+              <a:t>3/1/17</a:t>
             </a:fld>
             <a:endParaRPr lang="en-US"/>
           </a:p>
@@ -9249,7 +9308,7 @@
     </p:spTree>
     <p:extLst>
       <p:ext uri="{BB962C8B-B14F-4D97-AF65-F5344CB8AC3E}">
-        <p14:creationId xmlns:p14="http://schemas.microsoft.com/office/powerpoint/2010/main" val="855881070"/>
+        <p14:creationId xmlns:p14="http://schemas.microsoft.com/office/powerpoint/2010/main" val="1923380657"/>
       </p:ext>
     </p:extLst>
   </p:cSld>

</xml_diff>

<commit_message>
Finished draft for Feb 2017 Darmtadt course
</commit_message>
<xml_diff>
--- a/undergraduate/lectures/storage.pptx
+++ b/undergraduate/lectures/storage.pptx
@@ -5,7 +5,7 @@
     <p:sldMasterId id="2147483786" r:id="rId1"/>
   </p:sldMasterIdLst>
   <p:notesMasterIdLst>
-    <p:notesMasterId r:id="rId36"/>
+    <p:notesMasterId r:id="rId32"/>
   </p:notesMasterIdLst>
   <p:sldIdLst>
     <p:sldId id="256" r:id="rId2"/>
@@ -21,27 +21,23 @@
     <p:sldId id="273" r:id="rId12"/>
     <p:sldId id="259" r:id="rId13"/>
     <p:sldId id="260" r:id="rId14"/>
-    <p:sldId id="261" r:id="rId15"/>
-    <p:sldId id="262" r:id="rId16"/>
-    <p:sldId id="263" r:id="rId17"/>
-    <p:sldId id="274" r:id="rId18"/>
-    <p:sldId id="275" r:id="rId19"/>
-    <p:sldId id="276" r:id="rId20"/>
-    <p:sldId id="277" r:id="rId21"/>
-    <p:sldId id="279" r:id="rId22"/>
-    <p:sldId id="278" r:id="rId23"/>
-    <p:sldId id="280" r:id="rId24"/>
-    <p:sldId id="281" r:id="rId25"/>
-    <p:sldId id="282" r:id="rId26"/>
-    <p:sldId id="283" r:id="rId27"/>
-    <p:sldId id="284" r:id="rId28"/>
-    <p:sldId id="285" r:id="rId29"/>
-    <p:sldId id="286" r:id="rId30"/>
-    <p:sldId id="287" r:id="rId31"/>
-    <p:sldId id="288" r:id="rId32"/>
-    <p:sldId id="289" r:id="rId33"/>
-    <p:sldId id="290" r:id="rId34"/>
-    <p:sldId id="291" r:id="rId35"/>
+    <p:sldId id="274" r:id="rId15"/>
+    <p:sldId id="275" r:id="rId16"/>
+    <p:sldId id="276" r:id="rId17"/>
+    <p:sldId id="277" r:id="rId18"/>
+    <p:sldId id="279" r:id="rId19"/>
+    <p:sldId id="278" r:id="rId20"/>
+    <p:sldId id="280" r:id="rId21"/>
+    <p:sldId id="281" r:id="rId22"/>
+    <p:sldId id="282" r:id="rId23"/>
+    <p:sldId id="283" r:id="rId24"/>
+    <p:sldId id="284" r:id="rId25"/>
+    <p:sldId id="285" r:id="rId26"/>
+    <p:sldId id="286" r:id="rId27"/>
+    <p:sldId id="287" r:id="rId28"/>
+    <p:sldId id="288" r:id="rId29"/>
+    <p:sldId id="289" r:id="rId30"/>
+    <p:sldId id="291" r:id="rId31"/>
   </p:sldIdLst>
   <p:sldSz cx="12192000" cy="6858000"/>
   <p:notesSz cx="6858000" cy="9144000"/>
@@ -5143,7 +5139,88 @@
           <a:bodyPr/>
           <a:lstStyle/>
           <a:p>
-            <a:endParaRPr/>
+            <a:pPr algn="ctr"/>
+            <a:r>
+              <a:rPr lang="en-US" dirty="0" smtClean="0">
+                <a:latin typeface="Courier" charset="0"/>
+                <a:ea typeface="Courier" charset="0"/>
+                <a:cs typeface="Courier" charset="0"/>
+              </a:rPr>
+              <a:t>mv /</a:t>
+            </a:r>
+            <a:r>
+              <a:rPr lang="en-US" dirty="0" err="1" smtClean="0">
+                <a:latin typeface="Courier" charset="0"/>
+                <a:ea typeface="Courier" charset="0"/>
+                <a:cs typeface="Courier" charset="0"/>
+              </a:rPr>
+              <a:t>tmp</a:t>
+            </a:r>
+            <a:r>
+              <a:rPr lang="en-US" dirty="0" smtClean="0">
+                <a:latin typeface="Courier" charset="0"/>
+                <a:ea typeface="Courier" charset="0"/>
+                <a:cs typeface="Courier" charset="0"/>
+              </a:rPr>
+              <a:t>/foo /tmp2/bar</a:t>
+            </a:r>
+          </a:p>
+          <a:p>
+            <a:pPr marL="457200" indent="-457200">
+              <a:buFont typeface="+mj-lt"/>
+              <a:buAutoNum type="arabicPeriod"/>
+            </a:pPr>
+            <a:endParaRPr lang="en-US" dirty="0"/>
+          </a:p>
+          <a:p>
+            <a:pPr marL="457200" indent="-457200">
+              <a:buFont typeface="+mj-lt"/>
+              <a:buAutoNum type="arabicPeriod"/>
+            </a:pPr>
+            <a:r>
+              <a:rPr lang="en-US" dirty="0" smtClean="0"/>
+              <a:t>Increment a counter on the file’s </a:t>
+            </a:r>
+            <a:r>
+              <a:rPr lang="en-US" dirty="0" err="1" smtClean="0"/>
+              <a:t>inode</a:t>
+            </a:r>
+            <a:endParaRPr lang="en-US" dirty="0" smtClean="0"/>
+          </a:p>
+          <a:p>
+            <a:pPr marL="457200" indent="-457200">
+              <a:buFont typeface="+mj-lt"/>
+              <a:buAutoNum type="arabicPeriod"/>
+            </a:pPr>
+            <a:r>
+              <a:rPr lang="en-US" dirty="0" smtClean="0"/>
+              <a:t>Write the new entry to the target directory</a:t>
+            </a:r>
+          </a:p>
+          <a:p>
+            <a:pPr marL="457200" indent="-457200">
+              <a:buFont typeface="+mj-lt"/>
+              <a:buAutoNum type="arabicPeriod"/>
+            </a:pPr>
+            <a:r>
+              <a:rPr lang="en-US" dirty="0" smtClean="0"/>
+              <a:t>Remove the old entry from the source directory</a:t>
+            </a:r>
+          </a:p>
+          <a:p>
+            <a:pPr marL="457200" indent="-457200">
+              <a:buFont typeface="+mj-lt"/>
+              <a:buAutoNum type="arabicPeriod"/>
+            </a:pPr>
+            <a:r>
+              <a:rPr lang="en-US" dirty="0" smtClean="0"/>
+              <a:t>Decrement the counter on the file’s </a:t>
+            </a:r>
+            <a:r>
+              <a:rPr lang="en-US" dirty="0" err="1" smtClean="0"/>
+              <a:t>inode</a:t>
+            </a:r>
+            <a:endParaRPr dirty="0"/>
           </a:p>
         </p:txBody>
       </p:sp>
@@ -5161,7 +5238,172 @@
   <p:timing>
     <p:tnLst>
       <p:par>
-        <p:cTn id="1" dur="indefinite" restart="never" nodeType="tmRoot"/>
+        <p:cTn id="1" dur="indefinite" restart="never" nodeType="tmRoot">
+          <p:childTnLst>
+            <p:seq concurrent="1" nextAc="seek">
+              <p:cTn id="2" dur="indefinite" nodeType="mainSeq">
+                <p:childTnLst>
+                  <p:par>
+                    <p:cTn id="3" fill="hold">
+                      <p:stCondLst>
+                        <p:cond delay="indefinite"/>
+                      </p:stCondLst>
+                      <p:childTnLst>
+                        <p:par>
+                          <p:cTn id="4" fill="hold">
+                            <p:stCondLst>
+                              <p:cond delay="0"/>
+                            </p:stCondLst>
+                            <p:childTnLst>
+                              <p:par>
+                                <p:cTn id="5" presetID="1" presetClass="entr" presetSubtype="0" fill="hold" nodeType="clickEffect">
+                                  <p:stCondLst>
+                                    <p:cond delay="0"/>
+                                  </p:stCondLst>
+                                  <p:childTnLst>
+                                    <p:set>
+                                      <p:cBhvr>
+                                        <p:cTn id="6" dur="1" fill="hold">
+                                          <p:stCondLst>
+                                            <p:cond delay="0"/>
+                                          </p:stCondLst>
+                                        </p:cTn>
+                                        <p:tgtEl>
+                                          <p:spTgt spid="126">
+                                            <p:txEl>
+                                              <p:pRg st="2" end="2"/>
+                                            </p:txEl>
+                                          </p:spTgt>
+                                        </p:tgtEl>
+                                        <p:attrNameLst>
+                                          <p:attrName>style.visibility</p:attrName>
+                                        </p:attrNameLst>
+                                      </p:cBhvr>
+                                      <p:to>
+                                        <p:strVal val="visible"/>
+                                      </p:to>
+                                    </p:set>
+                                  </p:childTnLst>
+                                </p:cTn>
+                              </p:par>
+                              <p:par>
+                                <p:cTn id="7" presetID="1" presetClass="entr" presetSubtype="0" fill="hold" nodeType="withEffect">
+                                  <p:stCondLst>
+                                    <p:cond delay="0"/>
+                                  </p:stCondLst>
+                                  <p:childTnLst>
+                                    <p:set>
+                                      <p:cBhvr>
+                                        <p:cTn id="8" dur="1" fill="hold">
+                                          <p:stCondLst>
+                                            <p:cond delay="0"/>
+                                          </p:stCondLst>
+                                        </p:cTn>
+                                        <p:tgtEl>
+                                          <p:spTgt spid="126">
+                                            <p:txEl>
+                                              <p:pRg st="3" end="3"/>
+                                            </p:txEl>
+                                          </p:spTgt>
+                                        </p:tgtEl>
+                                        <p:attrNameLst>
+                                          <p:attrName>style.visibility</p:attrName>
+                                        </p:attrNameLst>
+                                      </p:cBhvr>
+                                      <p:to>
+                                        <p:strVal val="visible"/>
+                                      </p:to>
+                                    </p:set>
+                                  </p:childTnLst>
+                                </p:cTn>
+                              </p:par>
+                              <p:par>
+                                <p:cTn id="9" presetID="1" presetClass="entr" presetSubtype="0" fill="hold" nodeType="withEffect">
+                                  <p:stCondLst>
+                                    <p:cond delay="0"/>
+                                  </p:stCondLst>
+                                  <p:childTnLst>
+                                    <p:set>
+                                      <p:cBhvr>
+                                        <p:cTn id="10" dur="1" fill="hold">
+                                          <p:stCondLst>
+                                            <p:cond delay="0"/>
+                                          </p:stCondLst>
+                                        </p:cTn>
+                                        <p:tgtEl>
+                                          <p:spTgt spid="126">
+                                            <p:txEl>
+                                              <p:pRg st="4" end="4"/>
+                                            </p:txEl>
+                                          </p:spTgt>
+                                        </p:tgtEl>
+                                        <p:attrNameLst>
+                                          <p:attrName>style.visibility</p:attrName>
+                                        </p:attrNameLst>
+                                      </p:cBhvr>
+                                      <p:to>
+                                        <p:strVal val="visible"/>
+                                      </p:to>
+                                    </p:set>
+                                  </p:childTnLst>
+                                </p:cTn>
+                              </p:par>
+                              <p:par>
+                                <p:cTn id="11" presetID="1" presetClass="entr" presetSubtype="0" fill="hold" nodeType="withEffect">
+                                  <p:stCondLst>
+                                    <p:cond delay="0"/>
+                                  </p:stCondLst>
+                                  <p:childTnLst>
+                                    <p:set>
+                                      <p:cBhvr>
+                                        <p:cTn id="12" dur="1" fill="hold">
+                                          <p:stCondLst>
+                                            <p:cond delay="0"/>
+                                          </p:stCondLst>
+                                        </p:cTn>
+                                        <p:tgtEl>
+                                          <p:spTgt spid="126">
+                                            <p:txEl>
+                                              <p:pRg st="5" end="5"/>
+                                            </p:txEl>
+                                          </p:spTgt>
+                                        </p:tgtEl>
+                                        <p:attrNameLst>
+                                          <p:attrName>style.visibility</p:attrName>
+                                        </p:attrNameLst>
+                                      </p:cBhvr>
+                                      <p:to>
+                                        <p:strVal val="visible"/>
+                                      </p:to>
+                                    </p:set>
+                                  </p:childTnLst>
+                                </p:cTn>
+                              </p:par>
+                            </p:childTnLst>
+                          </p:cTn>
+                        </p:par>
+                      </p:childTnLst>
+                    </p:cTn>
+                  </p:par>
+                </p:childTnLst>
+              </p:cTn>
+              <p:prevCondLst>
+                <p:cond evt="onPrev" delay="0">
+                  <p:tgtEl>
+                    <p:sldTgt/>
+                  </p:tgtEl>
+                </p:cond>
+              </p:prevCondLst>
+              <p:nextCondLst>
+                <p:cond evt="onNext" delay="0">
+                  <p:tgtEl>
+                    <p:sldTgt/>
+                  </p:tgtEl>
+                </p:cond>
+              </p:nextCondLst>
+            </p:seq>
+          </p:childTnLst>
+        </p:cTn>
       </p:par>
     </p:tnLst>
   </p:timing>
@@ -5187,7 +5429,7 @@
       </p:grpSpPr>
       <p:sp>
         <p:nvSpPr>
-          <p:cNvPr id="128" name="Shape 128"/>
+          <p:cNvPr id="2" name="Title 1"/>
           <p:cNvSpPr>
             <a:spLocks noGrp="1"/>
           </p:cNvSpPr>
@@ -5195,24 +5437,22 @@
             <p:ph type="title"/>
           </p:nvPr>
         </p:nvSpPr>
-        <p:spPr>
-          <a:prstGeom prst="rect">
-            <a:avLst/>
-          </a:prstGeom>
-        </p:spPr>
-        <p:txBody>
-          <a:bodyPr/>
-          <a:lstStyle/>
-          <a:p>
-            <a:r>
-              <a:t>Step by step</a:t>
-            </a:r>
-          </a:p>
-        </p:txBody>
-      </p:sp>
-      <p:sp>
-        <p:nvSpPr>
-          <p:cNvPr id="129" name="Shape 129"/>
+        <p:spPr/>
+        <p:txBody>
+          <a:bodyPr/>
+          <a:lstStyle/>
+          <a:p>
+            <a:r>
+              <a:rPr lang="en-US" dirty="0" smtClean="0"/>
+              <a:t>Interactions with Other Subsystems</a:t>
+            </a:r>
+            <a:endParaRPr lang="en-US" dirty="0"/>
+          </a:p>
+        </p:txBody>
+      </p:sp>
+      <p:sp>
+        <p:nvSpPr>
+          <p:cNvPr id="3" name="Text Placeholder 2"/>
           <p:cNvSpPr>
             <a:spLocks noGrp="1"/>
           </p:cNvSpPr>
@@ -5220,35 +5460,84 @@
             <p:ph type="body" idx="1"/>
           </p:nvPr>
         </p:nvSpPr>
-        <p:spPr>
-          <a:prstGeom prst="rect">
-            <a:avLst/>
-          </a:prstGeom>
-        </p:spPr>
-        <p:txBody>
-          <a:bodyPr/>
-          <a:lstStyle/>
-          <a:p>
-            <a:r>
-              <a:t>Rights check </a:t>
-            </a:r>
-          </a:p>
-          <a:p>
-            <a:r>
-              <a:t>Lock containing directory</a:t>
-            </a:r>
-          </a:p>
-          <a:p>
-            <a:r>
-              <a:t>Inode?</a:t>
-            </a:r>
+        <p:spPr/>
+        <p:txBody>
+          <a:bodyPr/>
+          <a:lstStyle/>
+          <a:p>
+            <a:r>
+              <a:rPr lang="en-US" dirty="0" err="1" smtClean="0"/>
+              <a:t>Virtural</a:t>
+            </a:r>
+            <a:r>
+              <a:rPr lang="en-US" dirty="0" smtClean="0"/>
+              <a:t> Memory </a:t>
+            </a:r>
+            <a:r>
+              <a:rPr lang="mr-IN" dirty="0" smtClean="0"/>
+              <a:t>–</a:t>
+            </a:r>
+            <a:r>
+              <a:rPr lang="en-US" dirty="0" smtClean="0"/>
+              <a:t> VNODES and VM Objects</a:t>
+            </a:r>
+          </a:p>
+          <a:p>
+            <a:r>
+              <a:rPr lang="en-US" dirty="0" smtClean="0"/>
+              <a:t>Buffer Cache</a:t>
+            </a:r>
+          </a:p>
+          <a:p>
+            <a:r>
+              <a:rPr lang="en-US" dirty="0" smtClean="0"/>
+              <a:t>Name Cache</a:t>
+            </a:r>
+          </a:p>
+          <a:p>
+            <a:r>
+              <a:rPr lang="en-US" dirty="0" smtClean="0"/>
+              <a:t>Networking </a:t>
+            </a:r>
+            <a:r>
+              <a:rPr lang="mr-IN" dirty="0" smtClean="0"/>
+              <a:t>–</a:t>
+            </a:r>
+            <a:r>
+              <a:rPr lang="en-US" dirty="0" smtClean="0"/>
+              <a:t> Network File System (NFS)</a:t>
+            </a:r>
+            <a:endParaRPr lang="en-US" dirty="0"/>
+          </a:p>
+        </p:txBody>
+      </p:sp>
+      <p:sp>
+        <p:nvSpPr>
+          <p:cNvPr id="4" name="Slide Number Placeholder 3"/>
+          <p:cNvSpPr>
+            <a:spLocks noGrp="1"/>
+          </p:cNvSpPr>
+          <p:nvPr>
+            <p:ph type="sldNum" sz="quarter" idx="2"/>
+          </p:nvPr>
+        </p:nvSpPr>
+        <p:spPr/>
+        <p:txBody>
+          <a:bodyPr/>
+          <a:lstStyle/>
+          <a:p>
+            <a:fld id="{86CB4B4D-7CA3-9044-876B-883B54F8677D}" type="slidenum">
+              <a:rPr lang="uk-UA" smtClean="0"/>
+              <a:t>14</a:t>
+            </a:fld>
+            <a:endParaRPr lang="uk-UA"/>
           </a:p>
         </p:txBody>
       </p:sp>
     </p:spTree>
     <p:extLst>
       <p:ext uri="{BB962C8B-B14F-4D97-AF65-F5344CB8AC3E}">
-        <p14:creationId xmlns:p14="http://schemas.microsoft.com/office/powerpoint/2010/main" val="1388164892"/>
+        <p14:creationId xmlns:p14="http://schemas.microsoft.com/office/powerpoint/2010/main" val="1993082967"/>
       </p:ext>
     </p:extLst>
   </p:cSld>
@@ -5285,7 +5574,7 @@
       </p:grpSpPr>
       <p:sp>
         <p:nvSpPr>
-          <p:cNvPr id="131" name="Shape 131"/>
+          <p:cNvPr id="2" name="Title 1"/>
           <p:cNvSpPr>
             <a:spLocks noGrp="1"/>
           </p:cNvSpPr>
@@ -5293,24 +5582,22 @@
             <p:ph type="title"/>
           </p:nvPr>
         </p:nvSpPr>
-        <p:spPr>
-          <a:prstGeom prst="rect">
-            <a:avLst/>
-          </a:prstGeom>
-        </p:spPr>
-        <p:txBody>
-          <a:bodyPr/>
-          <a:lstStyle/>
-          <a:p>
-            <a:r>
-              <a:t>Within a directory</a:t>
-            </a:r>
-          </a:p>
-        </p:txBody>
-      </p:sp>
-      <p:sp>
-        <p:nvSpPr>
-          <p:cNvPr id="132" name="Shape 132"/>
+        <p:spPr/>
+        <p:txBody>
+          <a:bodyPr/>
+          <a:lstStyle/>
+          <a:p>
+            <a:r>
+              <a:rPr lang="en-US" dirty="0" smtClean="0"/>
+              <a:t>Naming</a:t>
+            </a:r>
+            <a:endParaRPr lang="en-US" dirty="0"/>
+          </a:p>
+        </p:txBody>
+      </p:sp>
+      <p:sp>
+        <p:nvSpPr>
+          <p:cNvPr id="3" name="Text Placeholder 2"/>
           <p:cNvSpPr>
             <a:spLocks noGrp="1"/>
           </p:cNvSpPr>
@@ -5318,23 +5605,62 @@
             <p:ph type="body" idx="1"/>
           </p:nvPr>
         </p:nvSpPr>
-        <p:spPr>
-          <a:prstGeom prst="rect">
-            <a:avLst/>
-          </a:prstGeom>
-        </p:spPr>
-        <p:txBody>
-          <a:bodyPr/>
-          <a:lstStyle/>
-          <a:p>
-            <a:endParaRPr/>
+        <p:spPr/>
+        <p:txBody>
+          <a:bodyPr/>
+          <a:lstStyle/>
+          <a:p>
+            <a:r>
+              <a:rPr lang="en-US" dirty="0" smtClean="0"/>
+              <a:t>Translate a human name to a location of stored data</a:t>
+            </a:r>
+          </a:p>
+          <a:p>
+            <a:r>
+              <a:rPr lang="en-US" dirty="0" err="1" smtClean="0"/>
+              <a:t>namei</a:t>
+            </a:r>
+            <a:r>
+              <a:rPr lang="en-US" dirty="0" smtClean="0"/>
+              <a:t>() is the interface</a:t>
+            </a:r>
+          </a:p>
+          <a:p>
+            <a:r>
+              <a:rPr lang="en-US" dirty="0" smtClean="0"/>
+              <a:t>Names are not stable</a:t>
+            </a:r>
+            <a:endParaRPr lang="en-US" dirty="0"/>
+          </a:p>
+        </p:txBody>
+      </p:sp>
+      <p:sp>
+        <p:nvSpPr>
+          <p:cNvPr id="4" name="Slide Number Placeholder 3"/>
+          <p:cNvSpPr>
+            <a:spLocks noGrp="1"/>
+          </p:cNvSpPr>
+          <p:nvPr>
+            <p:ph type="sldNum" sz="quarter" idx="2"/>
+          </p:nvPr>
+        </p:nvSpPr>
+        <p:spPr/>
+        <p:txBody>
+          <a:bodyPr/>
+          <a:lstStyle/>
+          <a:p>
+            <a:fld id="{86CB4B4D-7CA3-9044-876B-883B54F8677D}" type="slidenum">
+              <a:rPr lang="uk-UA" smtClean="0"/>
+              <a:t>15</a:t>
+            </a:fld>
+            <a:endParaRPr lang="uk-UA"/>
           </a:p>
         </p:txBody>
       </p:sp>
     </p:spTree>
     <p:extLst>
       <p:ext uri="{BB962C8B-B14F-4D97-AF65-F5344CB8AC3E}">
-        <p14:creationId xmlns:p14="http://schemas.microsoft.com/office/powerpoint/2010/main" val="624998836"/>
+        <p14:creationId xmlns:p14="http://schemas.microsoft.com/office/powerpoint/2010/main" val="994300562"/>
       </p:ext>
     </p:extLst>
   </p:cSld>
@@ -5371,7 +5697,7 @@
       </p:grpSpPr>
       <p:sp>
         <p:nvSpPr>
-          <p:cNvPr id="134" name="Shape 134"/>
+          <p:cNvPr id="2" name="Title 1"/>
           <p:cNvSpPr>
             <a:spLocks noGrp="1"/>
           </p:cNvSpPr>
@@ -5379,24 +5705,22 @@
             <p:ph type="title"/>
           </p:nvPr>
         </p:nvSpPr>
-        <p:spPr>
-          <a:prstGeom prst="rect">
-            <a:avLst/>
-          </a:prstGeom>
-        </p:spPr>
-        <p:txBody>
-          <a:bodyPr/>
-          <a:lstStyle/>
-          <a:p>
-            <a:r>
-              <a:t>Between directories</a:t>
-            </a:r>
-          </a:p>
-        </p:txBody>
-      </p:sp>
-      <p:sp>
-        <p:nvSpPr>
-          <p:cNvPr id="135" name="Shape 135"/>
+        <p:spPr/>
+        <p:txBody>
+          <a:bodyPr/>
+          <a:lstStyle/>
+          <a:p>
+            <a:r>
+              <a:rPr lang="en-US" dirty="0" smtClean="0"/>
+              <a:t>Name Lookup</a:t>
+            </a:r>
+            <a:endParaRPr lang="en-US" dirty="0"/>
+          </a:p>
+        </p:txBody>
+      </p:sp>
+      <p:sp>
+        <p:nvSpPr>
+          <p:cNvPr id="3" name="Text Placeholder 2"/>
           <p:cNvSpPr>
             <a:spLocks noGrp="1"/>
           </p:cNvSpPr>
@@ -5404,23 +5728,46 @@
             <p:ph type="body" idx="1"/>
           </p:nvPr>
         </p:nvSpPr>
-        <p:spPr>
-          <a:prstGeom prst="rect">
-            <a:avLst/>
-          </a:prstGeom>
-        </p:spPr>
-        <p:txBody>
-          <a:bodyPr/>
-          <a:lstStyle/>
-          <a:p>
-            <a:endParaRPr/>
+        <p:spPr/>
+        <p:txBody>
+          <a:bodyPr/>
+          <a:lstStyle/>
+          <a:p>
+            <a:r>
+              <a:rPr lang="en-US" dirty="0" smtClean="0"/>
+              <a:t>What names are being looked up?</a:t>
+            </a:r>
+            <a:endParaRPr lang="en-US" dirty="0"/>
+          </a:p>
+        </p:txBody>
+      </p:sp>
+      <p:sp>
+        <p:nvSpPr>
+          <p:cNvPr id="4" name="Slide Number Placeholder 3"/>
+          <p:cNvSpPr>
+            <a:spLocks noGrp="1"/>
+          </p:cNvSpPr>
+          <p:nvPr>
+            <p:ph type="sldNum" sz="quarter" idx="2"/>
+          </p:nvPr>
+        </p:nvSpPr>
+        <p:spPr/>
+        <p:txBody>
+          <a:bodyPr/>
+          <a:lstStyle/>
+          <a:p>
+            <a:fld id="{86CB4B4D-7CA3-9044-876B-883B54F8677D}" type="slidenum">
+              <a:rPr lang="uk-UA" smtClean="0"/>
+              <a:t>16</a:t>
+            </a:fld>
+            <a:endParaRPr lang="uk-UA"/>
           </a:p>
         </p:txBody>
       </p:sp>
     </p:spTree>
     <p:extLst>
       <p:ext uri="{BB962C8B-B14F-4D97-AF65-F5344CB8AC3E}">
-        <p14:creationId xmlns:p14="http://schemas.microsoft.com/office/powerpoint/2010/main" val="1012919175"/>
+        <p14:creationId xmlns:p14="http://schemas.microsoft.com/office/powerpoint/2010/main" val="1162140478"/>
       </p:ext>
     </p:extLst>
   </p:cSld>
@@ -5428,6 +5775,13 @@
     <a:masterClrMapping/>
   </p:clrMapOvr>
   <p:transition spd="med"/>
+  <p:timing>
+    <p:tnLst>
+      <p:par>
+        <p:cTn id="1" dur="indefinite" restart="never" nodeType="tmRoot"/>
+      </p:par>
+    </p:tnLst>
+  </p:timing>
 </p:sld>
 </file>
 
@@ -5465,7 +5819,7 @@
           <a:p>
             <a:r>
               <a:rPr lang="en-US" dirty="0" smtClean="0"/>
-              <a:t>Interactions with Other Subsystems</a:t>
+              <a:t>Name Cache</a:t>
             </a:r>
             <a:endParaRPr lang="en-US" dirty="0"/>
           </a:p>
@@ -5487,47 +5841,23 @@
           <a:lstStyle/>
           <a:p>
             <a:r>
-              <a:rPr lang="en-US" dirty="0" err="1" smtClean="0"/>
-              <a:t>Virtural</a:t>
-            </a:r>
-            <a:r>
-              <a:rPr lang="en-US" dirty="0" smtClean="0"/>
-              <a:t> Memory </a:t>
-            </a:r>
-            <a:r>
-              <a:rPr lang="mr-IN" dirty="0" smtClean="0"/>
-              <a:t>–</a:t>
-            </a:r>
-            <a:r>
-              <a:rPr lang="en-US" dirty="0" smtClean="0"/>
-              <a:t> VNODES and VM Objects</a:t>
-            </a:r>
-          </a:p>
-          <a:p>
-            <a:r>
-              <a:rPr lang="en-US" dirty="0" smtClean="0"/>
-              <a:t>Buffer Cache</a:t>
-            </a:r>
-          </a:p>
-          <a:p>
-            <a:r>
-              <a:rPr lang="en-US" dirty="0" smtClean="0"/>
-              <a:t>Name Cache</a:t>
-            </a:r>
-          </a:p>
-          <a:p>
-            <a:r>
-              <a:rPr lang="en-US" dirty="0" smtClean="0"/>
-              <a:t>Networking </a:t>
-            </a:r>
-            <a:r>
-              <a:rPr lang="mr-IN" dirty="0" smtClean="0"/>
-              <a:t>–</a:t>
-            </a:r>
-            <a:r>
-              <a:rPr lang="en-US" dirty="0" smtClean="0"/>
-              <a:t> Network File System (NFS)</a:t>
-            </a:r>
+              <a:rPr lang="en-US" dirty="0" smtClean="0"/>
+              <a:t>Speeds up searching</a:t>
+            </a:r>
+          </a:p>
+          <a:p>
+            <a:r>
+              <a:rPr lang="en-US" dirty="0" smtClean="0"/>
+              <a:t>Maintains positive and negative results</a:t>
+            </a:r>
+          </a:p>
+          <a:p>
+            <a:r>
+              <a:rPr lang="en-US" dirty="0" smtClean="0"/>
+              <a:t>Invalidation on changes in directories</a:t>
+            </a:r>
+          </a:p>
+          <a:p>
             <a:endParaRPr lang="en-US" dirty="0"/>
           </a:p>
         </p:txBody>
@@ -5558,7 +5888,7 @@
     </p:spTree>
     <p:extLst>
       <p:ext uri="{BB962C8B-B14F-4D97-AF65-F5344CB8AC3E}">
-        <p14:creationId xmlns:p14="http://schemas.microsoft.com/office/powerpoint/2010/main" val="1993082967"/>
+        <p14:creationId xmlns:p14="http://schemas.microsoft.com/office/powerpoint/2010/main" val="370017038"/>
       </p:ext>
     </p:extLst>
   </p:cSld>
@@ -5566,6 +5896,13 @@
     <a:masterClrMapping/>
   </p:clrMapOvr>
   <p:transition spd="med"/>
+  <p:timing>
+    <p:tnLst>
+      <p:par>
+        <p:cTn id="1" dur="indefinite" restart="never" nodeType="tmRoot"/>
+      </p:par>
+    </p:tnLst>
+  </p:timing>
 </p:sld>
 </file>
 
@@ -5603,7 +5940,7 @@
           <a:p>
             <a:r>
               <a:rPr lang="en-US" dirty="0" smtClean="0"/>
-              <a:t>Naming</a:t>
+              <a:t>Measuring Cache Efficiency</a:t>
             </a:r>
             <a:endParaRPr lang="en-US" dirty="0"/>
           </a:p>
@@ -5624,27 +5961,7 @@
           <a:bodyPr/>
           <a:lstStyle/>
           <a:p>
-            <a:r>
-              <a:rPr lang="en-US" dirty="0" smtClean="0"/>
-              <a:t>Translate a human name to a location of stored data</a:t>
-            </a:r>
-          </a:p>
-          <a:p>
-            <a:r>
-              <a:rPr lang="en-US" dirty="0" err="1" smtClean="0"/>
-              <a:t>namei</a:t>
-            </a:r>
-            <a:r>
-              <a:rPr lang="en-US" dirty="0" smtClean="0"/>
-              <a:t>() is the interface</a:t>
-            </a:r>
-          </a:p>
-          <a:p>
-            <a:r>
-              <a:rPr lang="en-US" dirty="0" smtClean="0"/>
-              <a:t>Names are not stable</a:t>
-            </a:r>
-            <a:endParaRPr lang="en-US" dirty="0"/>
+            <a:endParaRPr lang="en-US"/>
           </a:p>
         </p:txBody>
       </p:sp>
@@ -5674,7 +5991,7 @@
     </p:spTree>
     <p:extLst>
       <p:ext uri="{BB962C8B-B14F-4D97-AF65-F5344CB8AC3E}">
-        <p14:creationId xmlns:p14="http://schemas.microsoft.com/office/powerpoint/2010/main" val="994300562"/>
+        <p14:creationId xmlns:p14="http://schemas.microsoft.com/office/powerpoint/2010/main" val="1492828903"/>
       </p:ext>
     </p:extLst>
   </p:cSld>
@@ -5682,6 +5999,13 @@
     <a:masterClrMapping/>
   </p:clrMapOvr>
   <p:transition spd="med"/>
+  <p:timing>
+    <p:tnLst>
+      <p:par>
+        <p:cTn id="1" dur="indefinite" restart="never" nodeType="tmRoot"/>
+      </p:par>
+    </p:tnLst>
+  </p:timing>
 </p:sld>
 </file>
 
@@ -5719,7 +6043,7 @@
           <a:p>
             <a:r>
               <a:rPr lang="en-US" dirty="0" smtClean="0"/>
-              <a:t>Name Lookup</a:t>
+              <a:t>Who is missing the name cache?</a:t>
             </a:r>
             <a:endParaRPr lang="en-US" dirty="0"/>
           </a:p>
@@ -5740,11 +6064,7 @@
           <a:bodyPr/>
           <a:lstStyle/>
           <a:p>
-            <a:r>
-              <a:rPr lang="en-US" dirty="0" smtClean="0"/>
-              <a:t>What names are being looked up?</a:t>
-            </a:r>
-            <a:endParaRPr lang="en-US" dirty="0"/>
+            <a:endParaRPr lang="en-US"/>
           </a:p>
         </p:txBody>
       </p:sp>
@@ -5774,7 +6094,7 @@
     </p:spTree>
     <p:extLst>
       <p:ext uri="{BB962C8B-B14F-4D97-AF65-F5344CB8AC3E}">
-        <p14:creationId xmlns:p14="http://schemas.microsoft.com/office/powerpoint/2010/main" val="1162140478"/>
+        <p14:creationId xmlns:p14="http://schemas.microsoft.com/office/powerpoint/2010/main" val="646591383"/>
       </p:ext>
     </p:extLst>
   </p:cSld>
@@ -5782,6 +6102,13 @@
     <a:masterClrMapping/>
   </p:clrMapOvr>
   <p:transition spd="med"/>
+  <p:timing>
+    <p:tnLst>
+      <p:par>
+        <p:cTn id="1" dur="indefinite" restart="never" nodeType="tmRoot"/>
+      </p:par>
+    </p:tnLst>
+  </p:timing>
 </p:sld>
 </file>
 
@@ -5997,7 +6324,7 @@
           <a:p>
             <a:r>
               <a:rPr lang="en-US" dirty="0" smtClean="0"/>
-              <a:t>Name Cache</a:t>
+              <a:t>Name Cache Module</a:t>
             </a:r>
             <a:endParaRPr lang="en-US" dirty="0"/>
           </a:p>
@@ -6015,25 +6342,94 @@
         </p:nvSpPr>
         <p:spPr/>
         <p:txBody>
-          <a:bodyPr/>
-          <a:lstStyle/>
-          <a:p>
-            <a:r>
-              <a:rPr lang="en-US" dirty="0" smtClean="0"/>
-              <a:t>Speeds up searching</a:t>
-            </a:r>
-          </a:p>
-          <a:p>
-            <a:r>
-              <a:rPr lang="en-US" dirty="0" smtClean="0"/>
-              <a:t>Maintains positive and negative results</a:t>
-            </a:r>
-          </a:p>
-          <a:p>
-            <a:r>
-              <a:rPr lang="en-US" dirty="0" smtClean="0"/>
-              <a:t>Invalidation on changes in directories</a:t>
-            </a:r>
+          <a:bodyPr>
+            <a:normAutofit lnSpcReduction="10000"/>
+          </a:bodyPr>
+          <a:lstStyle/>
+          <a:p>
+            <a:r>
+              <a:rPr lang="en-US" dirty="0"/>
+              <a:t>enter </a:t>
+            </a:r>
+            <a:r>
+              <a:rPr lang="en-US" dirty="0" err="1"/>
+              <a:t>enter_negative</a:t>
+            </a:r>
+            <a:r>
+              <a:rPr lang="en-US" dirty="0"/>
+              <a:t> </a:t>
+            </a:r>
+            <a:r>
+              <a:rPr lang="en-US" dirty="0" err="1"/>
+              <a:t>lookup:hit</a:t>
+            </a:r>
+            <a:endParaRPr lang="en-US" dirty="0"/>
+          </a:p>
+          <a:p>
+            <a:r>
+              <a:rPr lang="en-US" dirty="0" err="1"/>
+              <a:t>lookup:hit-negative</a:t>
+            </a:r>
+            <a:endParaRPr lang="en-US" dirty="0"/>
+          </a:p>
+          <a:p>
+            <a:r>
+              <a:rPr lang="en-US" dirty="0" err="1"/>
+              <a:t>lookup:miss</a:t>
+            </a:r>
+            <a:r>
+              <a:rPr lang="en-US" dirty="0"/>
+              <a:t> purge </a:t>
+            </a:r>
+            <a:r>
+              <a:rPr lang="en-US" dirty="0" err="1"/>
+              <a:t>purge_negative</a:t>
+            </a:r>
+            <a:r>
+              <a:rPr lang="en-US" dirty="0"/>
+              <a:t> zap</a:t>
+            </a:r>
+          </a:p>
+          <a:p>
+            <a:r>
+              <a:rPr lang="en-US" dirty="0" err="1"/>
+              <a:t>zap_negative</a:t>
+            </a:r>
+            <a:endParaRPr lang="en-US" dirty="0"/>
+          </a:p>
+          <a:p>
+            <a:r>
+              <a:rPr lang="en-US" dirty="0"/>
+              <a:t>Add a positive entry Add a negative entry Name found in positive cache</a:t>
+            </a:r>
+          </a:p>
+          <a:p>
+            <a:r>
+              <a:rPr lang="en-US" dirty="0"/>
+              <a:t>Name found in negative cache</a:t>
+            </a:r>
+          </a:p>
+          <a:p>
+            <a:r>
+              <a:rPr lang="en-US" dirty="0"/>
+              <a:t>Name not found in cache Remove positive entry Remove negative entry Remove positive entry with or without </a:t>
+            </a:r>
+            <a:r>
+              <a:rPr lang="en-US" dirty="0" err="1"/>
+              <a:t>vnode</a:t>
+            </a:r>
+            <a:endParaRPr lang="en-US" dirty="0"/>
+          </a:p>
+          <a:p>
+            <a:r>
+              <a:rPr lang="en-US" dirty="0"/>
+              <a:t>Remove negative entry with or without </a:t>
+            </a:r>
+            <a:r>
+              <a:rPr lang="en-US" dirty="0" err="1"/>
+              <a:t>vnode</a:t>
+            </a:r>
+            <a:endParaRPr lang="en-US" dirty="0"/>
           </a:p>
           <a:p>
             <a:endParaRPr lang="en-US" dirty="0"/>
@@ -6066,7 +6462,7 @@
     </p:spTree>
     <p:extLst>
       <p:ext uri="{BB962C8B-B14F-4D97-AF65-F5344CB8AC3E}">
-        <p14:creationId xmlns:p14="http://schemas.microsoft.com/office/powerpoint/2010/main" val="370017038"/>
+        <p14:creationId xmlns:p14="http://schemas.microsoft.com/office/powerpoint/2010/main" val="1333048478"/>
       </p:ext>
     </p:extLst>
   </p:cSld>
@@ -6074,6 +6470,13 @@
     <a:masterClrMapping/>
   </p:clrMapOvr>
   <p:transition spd="med"/>
+  <p:timing>
+    <p:tnLst>
+      <p:par>
+        <p:cTn id="1" dur="indefinite" restart="never" nodeType="tmRoot"/>
+      </p:par>
+    </p:tnLst>
+  </p:timing>
 </p:sld>
 </file>
 
@@ -6111,7 +6514,7 @@
           <a:p>
             <a:r>
               <a:rPr lang="en-US" dirty="0" smtClean="0"/>
-              <a:t>Measuring Cache Efficiency</a:t>
+              <a:t>Adding negative entries</a:t>
             </a:r>
             <a:endParaRPr lang="en-US" dirty="0"/>
           </a:p>
@@ -6162,7 +6565,7 @@
     </p:spTree>
     <p:extLst>
       <p:ext uri="{BB962C8B-B14F-4D97-AF65-F5344CB8AC3E}">
-        <p14:creationId xmlns:p14="http://schemas.microsoft.com/office/powerpoint/2010/main" val="1492828903"/>
+        <p14:creationId xmlns:p14="http://schemas.microsoft.com/office/powerpoint/2010/main" val="2126508062"/>
       </p:ext>
     </p:extLst>
   </p:cSld>
@@ -6170,6 +6573,13 @@
     <a:masterClrMapping/>
   </p:clrMapOvr>
   <p:transition spd="med"/>
+  <p:timing>
+    <p:tnLst>
+      <p:par>
+        <p:cTn id="1" dur="indefinite" restart="never" nodeType="tmRoot"/>
+      </p:par>
+    </p:tnLst>
+  </p:timing>
 </p:sld>
 </file>
 
@@ -6207,7 +6617,7 @@
           <a:p>
             <a:r>
               <a:rPr lang="en-US" dirty="0" smtClean="0"/>
-              <a:t>Who is missing the name cache?</a:t>
+              <a:t>Directories and Files</a:t>
             </a:r>
             <a:endParaRPr lang="en-US" dirty="0"/>
           </a:p>
@@ -6228,7 +6638,32 @@
           <a:bodyPr/>
           <a:lstStyle/>
           <a:p>
-            <a:endParaRPr lang="en-US"/>
+            <a:r>
+              <a:rPr lang="en-US" dirty="0" smtClean="0"/>
+              <a:t>Directories </a:t>
+            </a:r>
+            <a:r>
+              <a:rPr lang="mr-IN" dirty="0" smtClean="0"/>
+              <a:t>–</a:t>
+            </a:r>
+            <a:r>
+              <a:rPr lang="en-US" dirty="0" smtClean="0"/>
+              <a:t> Contain files</a:t>
+            </a:r>
+          </a:p>
+          <a:p>
+            <a:r>
+              <a:rPr lang="en-US" dirty="0" smtClean="0"/>
+              <a:t>Files </a:t>
+            </a:r>
+            <a:r>
+              <a:rPr lang="mr-IN" dirty="0" smtClean="0"/>
+              <a:t>–</a:t>
+            </a:r>
+            <a:r>
+              <a:rPr lang="en-US" dirty="0" smtClean="0"/>
+              <a:t> Contain data</a:t>
+            </a:r>
           </a:p>
         </p:txBody>
       </p:sp>
@@ -6258,7 +6693,7 @@
     </p:spTree>
     <p:extLst>
       <p:ext uri="{BB962C8B-B14F-4D97-AF65-F5344CB8AC3E}">
-        <p14:creationId xmlns:p14="http://schemas.microsoft.com/office/powerpoint/2010/main" val="646591383"/>
+        <p14:creationId xmlns:p14="http://schemas.microsoft.com/office/powerpoint/2010/main" val="182593326"/>
       </p:ext>
     </p:extLst>
   </p:cSld>
@@ -6266,6 +6701,13 @@
     <a:masterClrMapping/>
   </p:clrMapOvr>
   <p:transition spd="med"/>
+  <p:timing>
+    <p:tnLst>
+      <p:par>
+        <p:cTn id="1" dur="indefinite" restart="never" nodeType="tmRoot"/>
+      </p:par>
+    </p:tnLst>
+  </p:timing>
 </p:sld>
 </file>
 
@@ -6303,7 +6745,7 @@
           <a:p>
             <a:r>
               <a:rPr lang="en-US" dirty="0" smtClean="0"/>
-              <a:t>Name Cache Module</a:t>
+              <a:t>The VNODE</a:t>
             </a:r>
             <a:endParaRPr lang="en-US" dirty="0"/>
           </a:p>
@@ -6321,77 +6763,22 @@
         </p:nvSpPr>
         <p:spPr/>
         <p:txBody>
-          <a:bodyPr>
-            <a:normAutofit lnSpcReduction="10000"/>
-          </a:bodyPr>
+          <a:bodyPr/>
           <a:lstStyle/>
           <a:p>
             <a:r>
               <a:rPr lang="en-US" dirty="0"/>
-              <a:t>enter </a:t>
-            </a:r>
-            <a:r>
-              <a:rPr lang="en-US" dirty="0" err="1"/>
-              <a:t>enter_negative</a:t>
+              <a:t>The central structure for all storage</a:t>
+            </a:r>
+          </a:p>
+          <a:p>
+            <a:r>
+              <a:rPr lang="en-US" dirty="0" smtClean="0"/>
+              <a:t>Many things </a:t>
             </a:r>
             <a:r>
               <a:rPr lang="en-US" dirty="0"/>
-              <a:t> </a:t>
-            </a:r>
-            <a:r>
-              <a:rPr lang="en-US" dirty="0" err="1"/>
-              <a:t>lookup:hit</a:t>
-            </a:r>
-            <a:endParaRPr lang="en-US" dirty="0"/>
-          </a:p>
-          <a:p>
-            <a:r>
-              <a:rPr lang="en-US" dirty="0" err="1"/>
-              <a:t>lookup:hit-negative</a:t>
-            </a:r>
-            <a:endParaRPr lang="en-US" dirty="0"/>
-          </a:p>
-          <a:p>
-            <a:r>
-              <a:rPr lang="en-US" dirty="0" err="1"/>
-              <a:t>lookup:miss</a:t>
-            </a:r>
-            <a:r>
-              <a:rPr lang="en-US" dirty="0"/>
-              <a:t> purge </a:t>
-            </a:r>
-            <a:r>
-              <a:rPr lang="en-US" dirty="0" err="1"/>
-              <a:t>purge_negative</a:t>
-            </a:r>
-            <a:r>
-              <a:rPr lang="en-US" dirty="0"/>
-              <a:t> zap</a:t>
-            </a:r>
-          </a:p>
-          <a:p>
-            <a:r>
-              <a:rPr lang="en-US" dirty="0" err="1"/>
-              <a:t>zap_negative</a:t>
-            </a:r>
-            <a:endParaRPr lang="en-US" dirty="0"/>
-          </a:p>
-          <a:p>
-            <a:r>
-              <a:rPr lang="en-US" dirty="0"/>
-              <a:t>Add a positive entry Add a negative entry Name found in positive cache</a:t>
-            </a:r>
-          </a:p>
-          <a:p>
-            <a:r>
-              <a:rPr lang="en-US" dirty="0"/>
-              <a:t>Name found in negative cache</a:t>
-            </a:r>
-          </a:p>
-          <a:p>
-            <a:r>
-              <a:rPr lang="en-US" dirty="0"/>
-              <a:t>Name not found in cache Remove positive entry Remove negative entry Remove positive entry with or without </a:t>
+              <a:t>have an associated </a:t>
             </a:r>
             <a:r>
               <a:rPr lang="en-US" dirty="0" err="1"/>
@@ -6400,17 +6787,61 @@
             <a:endParaRPr lang="en-US" dirty="0"/>
           </a:p>
           <a:p>
+            <a:pPr lvl="1"/>
+            <a:r>
+              <a:rPr lang="en-US" dirty="0" smtClean="0"/>
+              <a:t>Files</a:t>
+            </a:r>
+            <a:endParaRPr lang="en-US" dirty="0"/>
+          </a:p>
+          <a:p>
+            <a:pPr lvl="1"/>
+            <a:r>
+              <a:rPr lang="en-US" dirty="0" smtClean="0"/>
+              <a:t>Directories</a:t>
+            </a:r>
+            <a:endParaRPr lang="en-US" dirty="0"/>
+          </a:p>
+          <a:p>
+            <a:pPr lvl="1"/>
+            <a:r>
+              <a:rPr lang="en-US" dirty="0" smtClean="0"/>
+              <a:t>Block </a:t>
+            </a:r>
             <a:r>
               <a:rPr lang="en-US" dirty="0"/>
-              <a:t>Remove negative entry with or without </a:t>
-            </a:r>
-            <a:r>
-              <a:rPr lang="en-US" dirty="0" err="1"/>
-              <a:t>vnode</a:t>
-            </a:r>
-            <a:endParaRPr lang="en-US" dirty="0"/>
-          </a:p>
-          <a:p>
+              <a:t>Devices</a:t>
+            </a:r>
+          </a:p>
+          <a:p>
+            <a:pPr lvl="1"/>
+            <a:r>
+              <a:rPr lang="en-US" dirty="0" smtClean="0"/>
+              <a:t>Character </a:t>
+            </a:r>
+            <a:r>
+              <a:rPr lang="en-US" dirty="0"/>
+              <a:t>Devices </a:t>
+            </a:r>
+            <a:endParaRPr lang="en-US" dirty="0" smtClean="0"/>
+          </a:p>
+          <a:p>
+            <a:pPr lvl="1"/>
+            <a:r>
+              <a:rPr lang="en-US" dirty="0" smtClean="0"/>
+              <a:t>Some </a:t>
+            </a:r>
+            <a:r>
+              <a:rPr lang="en-US" dirty="0"/>
+              <a:t>Sockets</a:t>
+            </a:r>
+          </a:p>
+          <a:p>
+            <a:pPr lvl="1"/>
+            <a:r>
+              <a:rPr lang="en-US" dirty="0" smtClean="0"/>
+              <a:t>FIFOs</a:t>
+            </a:r>
             <a:endParaRPr lang="en-US" dirty="0"/>
           </a:p>
         </p:txBody>
@@ -6441,7 +6872,7 @@
     </p:spTree>
     <p:extLst>
       <p:ext uri="{BB962C8B-B14F-4D97-AF65-F5344CB8AC3E}">
-        <p14:creationId xmlns:p14="http://schemas.microsoft.com/office/powerpoint/2010/main" val="1333048478"/>
+        <p14:creationId xmlns:p14="http://schemas.microsoft.com/office/powerpoint/2010/main" val="2087252333"/>
       </p:ext>
     </p:extLst>
   </p:cSld>
@@ -6449,6 +6880,13 @@
     <a:masterClrMapping/>
   </p:clrMapOvr>
   <p:transition spd="med"/>
+  <p:timing>
+    <p:tnLst>
+      <p:par>
+        <p:cTn id="1" dur="indefinite" restart="never" nodeType="tmRoot"/>
+      </p:par>
+    </p:tnLst>
+  </p:timing>
 </p:sld>
 </file>
 
@@ -6486,7 +6924,7 @@
           <a:p>
             <a:r>
               <a:rPr lang="en-US" dirty="0" smtClean="0"/>
-              <a:t>Adding negative entries</a:t>
+              <a:t>VNODE Operations</a:t>
             </a:r>
             <a:endParaRPr lang="en-US" dirty="0"/>
           </a:p>
@@ -6507,7 +6945,49 @@
           <a:bodyPr/>
           <a:lstStyle/>
           <a:p>
-            <a:endParaRPr lang="en-US"/>
+            <a:r>
+              <a:rPr lang="en-US" dirty="0"/>
+              <a:t>Classic, kernel OO structure</a:t>
+            </a:r>
+          </a:p>
+          <a:p>
+            <a:r>
+              <a:rPr lang="en-US" dirty="0" smtClean="0"/>
+              <a:t>After </a:t>
+            </a:r>
+            <a:r>
+              <a:rPr lang="en-US" dirty="0"/>
+              <a:t>a path or name is looked up </a:t>
+            </a:r>
+            <a:endParaRPr lang="en-US" dirty="0" smtClean="0"/>
+          </a:p>
+          <a:p>
+            <a:r>
+              <a:rPr lang="en-US" dirty="0" smtClean="0"/>
+              <a:t>Do </a:t>
+            </a:r>
+            <a:r>
+              <a:rPr lang="en-US" dirty="0"/>
+              <a:t>something with a </a:t>
+            </a:r>
+            <a:r>
+              <a:rPr lang="en-US" dirty="0" err="1"/>
+              <a:t>vnode</a:t>
+            </a:r>
+            <a:endParaRPr lang="en-US" dirty="0"/>
+          </a:p>
+          <a:p>
+            <a:r>
+              <a:rPr lang="en-US" dirty="0" smtClean="0"/>
+              <a:t>open</a:t>
+            </a:r>
+            <a:r>
+              <a:rPr lang="en-US" dirty="0"/>
+              <a:t>, close, read, write</a:t>
+            </a:r>
+          </a:p>
+          <a:p>
+            <a:endParaRPr lang="en-US" dirty="0"/>
           </a:p>
         </p:txBody>
       </p:sp>
@@ -6537,7 +7017,7 @@
     </p:spTree>
     <p:extLst>
       <p:ext uri="{BB962C8B-B14F-4D97-AF65-F5344CB8AC3E}">
-        <p14:creationId xmlns:p14="http://schemas.microsoft.com/office/powerpoint/2010/main" val="2126508062"/>
+        <p14:creationId xmlns:p14="http://schemas.microsoft.com/office/powerpoint/2010/main" val="31779183"/>
       </p:ext>
     </p:extLst>
   </p:cSld>
@@ -6545,6 +7025,13 @@
     <a:masterClrMapping/>
   </p:clrMapOvr>
   <p:transition spd="med"/>
+  <p:timing>
+    <p:tnLst>
+      <p:par>
+        <p:cTn id="1" dur="indefinite" restart="never" nodeType="tmRoot"/>
+      </p:par>
+    </p:tnLst>
+  </p:timing>
 </p:sld>
 </file>
 
@@ -6582,7 +7069,7 @@
           <a:p>
             <a:r>
               <a:rPr lang="en-US" dirty="0" smtClean="0"/>
-              <a:t>Directories and Files</a:t>
+              <a:t>Visualizing VNODE Operations</a:t>
             </a:r>
             <a:endParaRPr lang="en-US" dirty="0"/>
           </a:p>
@@ -6603,32 +7090,7 @@
           <a:bodyPr/>
           <a:lstStyle/>
           <a:p>
-            <a:r>
-              <a:rPr lang="en-US" dirty="0" smtClean="0"/>
-              <a:t>Directories </a:t>
-            </a:r>
-            <a:r>
-              <a:rPr lang="mr-IN" dirty="0" smtClean="0"/>
-              <a:t>–</a:t>
-            </a:r>
-            <a:r>
-              <a:rPr lang="en-US" dirty="0" smtClean="0"/>
-              <a:t> Contain files</a:t>
-            </a:r>
-          </a:p>
-          <a:p>
-            <a:r>
-              <a:rPr lang="en-US" dirty="0" smtClean="0"/>
-              <a:t>Files </a:t>
-            </a:r>
-            <a:r>
-              <a:rPr lang="mr-IN" dirty="0" smtClean="0"/>
-              <a:t>–</a:t>
-            </a:r>
-            <a:r>
-              <a:rPr lang="en-US" dirty="0" smtClean="0"/>
-              <a:t> Contain data</a:t>
-            </a:r>
+            <a:endParaRPr lang="en-US"/>
           </a:p>
         </p:txBody>
       </p:sp>
@@ -6658,7 +7120,7 @@
     </p:spTree>
     <p:extLst>
       <p:ext uri="{BB962C8B-B14F-4D97-AF65-F5344CB8AC3E}">
-        <p14:creationId xmlns:p14="http://schemas.microsoft.com/office/powerpoint/2010/main" val="182593326"/>
+        <p14:creationId xmlns:p14="http://schemas.microsoft.com/office/powerpoint/2010/main" val="2047865590"/>
       </p:ext>
     </p:extLst>
   </p:cSld>
@@ -6666,6 +7128,13 @@
     <a:masterClrMapping/>
   </p:clrMapOvr>
   <p:transition spd="med"/>
+  <p:timing>
+    <p:tnLst>
+      <p:par>
+        <p:cTn id="1" dur="indefinite" restart="never" nodeType="tmRoot"/>
+      </p:par>
+    </p:tnLst>
+  </p:timing>
 </p:sld>
 </file>
 
@@ -6703,7 +7172,7 @@
           <a:p>
             <a:r>
               <a:rPr lang="en-US" dirty="0" smtClean="0"/>
-              <a:t>The VNODE</a:t>
+              <a:t>GEOM Overview</a:t>
             </a:r>
             <a:endParaRPr lang="en-US" dirty="0"/>
           </a:p>
@@ -6726,80 +7195,22 @@
           <a:p>
             <a:r>
               <a:rPr lang="en-US" dirty="0"/>
-              <a:t>The central structure for all storage</a:t>
-            </a:r>
-          </a:p>
-          <a:p>
-            <a:r>
-              <a:rPr lang="en-US" dirty="0" smtClean="0"/>
-              <a:t>Many things </a:t>
-            </a:r>
+              <a:t>Framework for transforming storage requests</a:t>
+            </a:r>
+          </a:p>
+          <a:p>
             <a:r>
               <a:rPr lang="en-US" dirty="0"/>
-              <a:t>have an associated </a:t>
-            </a:r>
-            <a:r>
-              <a:rPr lang="en-US" dirty="0" err="1"/>
-              <a:t>vnode</a:t>
-            </a:r>
-            <a:endParaRPr lang="en-US" dirty="0"/>
-          </a:p>
-          <a:p>
-            <a:pPr lvl="1"/>
-            <a:r>
-              <a:rPr lang="en-US" dirty="0" smtClean="0"/>
-              <a:t>Files</a:t>
-            </a:r>
-            <a:endParaRPr lang="en-US" dirty="0"/>
-          </a:p>
-          <a:p>
-            <a:pPr lvl="1"/>
-            <a:r>
-              <a:rPr lang="en-US" dirty="0" smtClean="0"/>
-              <a:t>Directories</a:t>
-            </a:r>
-            <a:endParaRPr lang="en-US" dirty="0"/>
-          </a:p>
-          <a:p>
-            <a:pPr lvl="1"/>
-            <a:r>
-              <a:rPr lang="en-US" dirty="0" smtClean="0"/>
-              <a:t>Block </a:t>
-            </a:r>
+              <a:t>• Object Oriented</a:t>
+            </a:r>
+          </a:p>
+          <a:p>
             <a:r>
               <a:rPr lang="en-US" dirty="0"/>
-              <a:t>Devices</a:t>
-            </a:r>
-          </a:p>
-          <a:p>
-            <a:pPr lvl="1"/>
-            <a:r>
-              <a:rPr lang="en-US" dirty="0" smtClean="0"/>
-              <a:t>Character </a:t>
-            </a:r>
-            <a:r>
-              <a:rPr lang="en-US" dirty="0"/>
-              <a:t>Devices </a:t>
-            </a:r>
-            <a:endParaRPr lang="en-US" dirty="0" smtClean="0"/>
-          </a:p>
-          <a:p>
-            <a:pPr lvl="1"/>
-            <a:r>
-              <a:rPr lang="en-US" dirty="0" smtClean="0"/>
-              <a:t>Some </a:t>
-            </a:r>
-            <a:r>
-              <a:rPr lang="en-US" dirty="0"/>
-              <a:t>Sockets</a:t>
-            </a:r>
-          </a:p>
-          <a:p>
-            <a:pPr lvl="1"/>
-            <a:r>
-              <a:rPr lang="en-US" dirty="0" smtClean="0"/>
-              <a:t>FIFOs</a:t>
-            </a:r>
+              <a:t>• Shuttles I/O requests between filesystems and devices</a:t>
+            </a:r>
+          </a:p>
+          <a:p>
             <a:endParaRPr lang="en-US" dirty="0"/>
           </a:p>
         </p:txBody>
@@ -6830,7 +7241,7 @@
     </p:spTree>
     <p:extLst>
       <p:ext uri="{BB962C8B-B14F-4D97-AF65-F5344CB8AC3E}">
-        <p14:creationId xmlns:p14="http://schemas.microsoft.com/office/powerpoint/2010/main" val="2087252333"/>
+        <p14:creationId xmlns:p14="http://schemas.microsoft.com/office/powerpoint/2010/main" val="1856946886"/>
       </p:ext>
     </p:extLst>
   </p:cSld>
@@ -6838,6 +7249,13 @@
     <a:masterClrMapping/>
   </p:clrMapOvr>
   <p:transition spd="med"/>
+  <p:timing>
+    <p:tnLst>
+      <p:par>
+        <p:cTn id="1" dur="indefinite" restart="never" nodeType="tmRoot"/>
+      </p:par>
+    </p:tnLst>
+  </p:timing>
 </p:sld>
 </file>
 
@@ -6875,7 +7293,7 @@
           <a:p>
             <a:r>
               <a:rPr lang="en-US" dirty="0" smtClean="0"/>
-              <a:t>VNODE Operations</a:t>
+              <a:t>GEOM Layers</a:t>
             </a:r>
             <a:endParaRPr lang="en-US" dirty="0"/>
           </a:p>
@@ -6898,43 +7316,52 @@
           <a:p>
             <a:r>
               <a:rPr lang="en-US" dirty="0"/>
-              <a:t>Classic, kernel OO structure</a:t>
-            </a:r>
-          </a:p>
-          <a:p>
-            <a:r>
-              <a:rPr lang="en-US" dirty="0" smtClean="0"/>
-              <a:t>After </a:t>
+              <a:t>MBR Master Boot Record </a:t>
+            </a:r>
+            <a:endParaRPr lang="en-US" dirty="0" smtClean="0"/>
+          </a:p>
+          <a:p>
+            <a:r>
+              <a:rPr lang="en-US" dirty="0" smtClean="0"/>
+              <a:t>BSD </a:t>
             </a:r>
             <a:r>
               <a:rPr lang="en-US" dirty="0"/>
-              <a:t>a path or name is looked up </a:t>
+              <a:t>BSD Slice</a:t>
+            </a:r>
+          </a:p>
+          <a:p>
+            <a:r>
+              <a:rPr lang="en-US" dirty="0"/>
+              <a:t>ELI Encryption </a:t>
             </a:r>
             <a:endParaRPr lang="en-US" dirty="0" smtClean="0"/>
           </a:p>
           <a:p>
             <a:r>
               <a:rPr lang="en-US" dirty="0" smtClean="0"/>
-              <a:t>Do </a:t>
+              <a:t>MIRROR </a:t>
             </a:r>
             <a:r>
               <a:rPr lang="en-US" dirty="0"/>
-              <a:t>something with a </a:t>
-            </a:r>
-            <a:r>
-              <a:rPr lang="en-US" dirty="0" err="1"/>
-              <a:t>vnode</a:t>
-            </a:r>
-            <a:endParaRPr lang="en-US" dirty="0"/>
-          </a:p>
-          <a:p>
-            <a:r>
-              <a:rPr lang="en-US" dirty="0" smtClean="0"/>
-              <a:t>open</a:t>
-            </a:r>
+              <a:t>Disk mirroring</a:t>
+            </a:r>
+          </a:p>
+          <a:p>
             <a:r>
               <a:rPr lang="en-US" dirty="0"/>
-              <a:t>, close, read, write</a:t>
+              <a:t>JOURNAL Journaling </a:t>
+            </a:r>
+            <a:endParaRPr lang="en-US" dirty="0" smtClean="0"/>
+          </a:p>
+          <a:p>
+            <a:r>
+              <a:rPr lang="en-US" dirty="0" smtClean="0"/>
+              <a:t>RAID </a:t>
+            </a:r>
+            <a:r>
+              <a:rPr lang="en-US" dirty="0"/>
+              <a:t>Software RAID</a:t>
             </a:r>
           </a:p>
           <a:p>
@@ -6968,7 +7395,7 @@
     </p:spTree>
     <p:extLst>
       <p:ext uri="{BB962C8B-B14F-4D97-AF65-F5344CB8AC3E}">
-        <p14:creationId xmlns:p14="http://schemas.microsoft.com/office/powerpoint/2010/main" val="31779183"/>
+        <p14:creationId xmlns:p14="http://schemas.microsoft.com/office/powerpoint/2010/main" val="2118315128"/>
       </p:ext>
     </p:extLst>
   </p:cSld>
@@ -6976,6 +7403,13 @@
     <a:masterClrMapping/>
   </p:clrMapOvr>
   <p:transition spd="med"/>
+  <p:timing>
+    <p:tnLst>
+      <p:par>
+        <p:cTn id="1" dur="indefinite" restart="never" nodeType="tmRoot"/>
+      </p:par>
+    </p:tnLst>
+  </p:timing>
 </p:sld>
 </file>
 
@@ -7013,7 +7447,7 @@
           <a:p>
             <a:r>
               <a:rPr lang="en-US" dirty="0" smtClean="0"/>
-              <a:t>Visualizing VNODE Operations</a:t>
+              <a:t>A Visual Example</a:t>
             </a:r>
             <a:endParaRPr lang="en-US" dirty="0"/>
           </a:p>
@@ -7034,7 +7468,7 @@
           <a:bodyPr/>
           <a:lstStyle/>
           <a:p>
-            <a:endParaRPr lang="en-US"/>
+            <a:endParaRPr lang="en-US" dirty="0"/>
           </a:p>
         </p:txBody>
       </p:sp>
@@ -7064,7 +7498,7 @@
     </p:spTree>
     <p:extLst>
       <p:ext uri="{BB962C8B-B14F-4D97-AF65-F5344CB8AC3E}">
-        <p14:creationId xmlns:p14="http://schemas.microsoft.com/office/powerpoint/2010/main" val="2047865590"/>
+        <p14:creationId xmlns:p14="http://schemas.microsoft.com/office/powerpoint/2010/main" val="1336700042"/>
       </p:ext>
     </p:extLst>
   </p:cSld>
@@ -7072,6 +7506,13 @@
     <a:masterClrMapping/>
   </p:clrMapOvr>
   <p:transition spd="med"/>
+  <p:timing>
+    <p:tnLst>
+      <p:par>
+        <p:cTn id="1" dur="indefinite" restart="never" nodeType="tmRoot"/>
+      </p:par>
+    </p:tnLst>
+  </p:timing>
 </p:sld>
 </file>
 
@@ -7109,7 +7550,7 @@
           <a:p>
             <a:r>
               <a:rPr lang="en-US" dirty="0" smtClean="0"/>
-              <a:t>GEOM Overview</a:t>
+              <a:t>Performing I/O</a:t>
             </a:r>
             <a:endParaRPr lang="en-US" dirty="0"/>
           </a:p>
@@ -7131,24 +7572,56 @@
           <a:lstStyle/>
           <a:p>
             <a:r>
+              <a:rPr lang="en-US" dirty="0" err="1">
+                <a:latin typeface="Courier" charset="0"/>
+                <a:ea typeface="Courier" charset="0"/>
+                <a:cs typeface="Courier" charset="0"/>
+              </a:rPr>
+              <a:t>sudo</a:t>
+            </a:r>
+            <a:r>
+              <a:rPr lang="en-US" dirty="0">
+                <a:latin typeface="Courier" charset="0"/>
+                <a:ea typeface="Courier" charset="0"/>
+                <a:cs typeface="Courier" charset="0"/>
+              </a:rPr>
+              <a:t> </a:t>
+            </a:r>
+            <a:r>
+              <a:rPr lang="en-US" dirty="0" err="1">
+                <a:latin typeface="Courier" charset="0"/>
+                <a:ea typeface="Courier" charset="0"/>
+                <a:cs typeface="Courier" charset="0"/>
+              </a:rPr>
+              <a:t>dtrace</a:t>
+            </a:r>
+            <a:r>
+              <a:rPr lang="en-US" dirty="0">
+                <a:latin typeface="Courier" charset="0"/>
+                <a:ea typeface="Courier" charset="0"/>
+                <a:cs typeface="Courier" charset="0"/>
+              </a:rPr>
+              <a:t> -n ::</a:t>
+            </a:r>
+            <a:r>
+              <a:rPr lang="en-US" dirty="0" err="1">
+                <a:latin typeface="Courier" charset="0"/>
+                <a:ea typeface="Courier" charset="0"/>
+                <a:cs typeface="Courier" charset="0"/>
+              </a:rPr>
+              <a:t>g_io:entry</a:t>
+            </a:r>
+            <a:endParaRPr lang="en-US" dirty="0">
+              <a:latin typeface="Courier" charset="0"/>
+              <a:ea typeface="Courier" charset="0"/>
+              <a:cs typeface="Courier" charset="0"/>
+            </a:endParaRPr>
+          </a:p>
+          <a:p>
+            <a:r>
               <a:rPr lang="en-US" dirty="0"/>
-              <a:t>Framework for transforming storage requests</a:t>
-            </a:r>
-          </a:p>
-          <a:p>
-            <a:r>
-              <a:rPr lang="en-US" dirty="0"/>
-              <a:t>• Object Oriented</a:t>
-            </a:r>
-          </a:p>
-          <a:p>
-            <a:r>
-              <a:rPr lang="en-US" dirty="0"/>
-              <a:t>• Shuttles I/O requests between filesystems and devices</a:t>
-            </a:r>
-          </a:p>
-          <a:p>
-            <a:endParaRPr lang="en-US" dirty="0"/>
+              <a:t>This gets us the most likely 8 routines we care about.</a:t>
+            </a:r>
           </a:p>
         </p:txBody>
       </p:sp>
@@ -7178,7 +7651,7 @@
     </p:spTree>
     <p:extLst>
       <p:ext uri="{BB962C8B-B14F-4D97-AF65-F5344CB8AC3E}">
-        <p14:creationId xmlns:p14="http://schemas.microsoft.com/office/powerpoint/2010/main" val="1856946886"/>
+        <p14:creationId xmlns:p14="http://schemas.microsoft.com/office/powerpoint/2010/main" val="731228842"/>
       </p:ext>
     </p:extLst>
   </p:cSld>
@@ -7186,6 +7659,13 @@
     <a:masterClrMapping/>
   </p:clrMapOvr>
   <p:transition spd="med"/>
+  <p:timing>
+    <p:tnLst>
+      <p:par>
+        <p:cTn id="1" dur="indefinite" restart="never" nodeType="tmRoot"/>
+      </p:par>
+    </p:tnLst>
+  </p:timing>
 </p:sld>
 </file>
 
@@ -7676,10 +8156,10 @@
           <a:lstStyle/>
           <a:p>
             <a:r>
-              <a:rPr lang="en-US" dirty="0" smtClean="0"/>
-              <a:t>GEOM Layers</a:t>
-            </a:r>
-            <a:endParaRPr lang="en-US" dirty="0"/>
+              <a:rPr lang="en-US" smtClean="0"/>
+              <a:t>Storage Review</a:t>
+            </a:r>
+            <a:endParaRPr lang="en-US"/>
           </a:p>
         </p:txBody>
       </p:sp>
@@ -7699,56 +8179,41 @@
           <a:lstStyle/>
           <a:p>
             <a:r>
-              <a:rPr lang="en-US" dirty="0"/>
-              <a:t>MBR Master Boot Record </a:t>
+              <a:rPr lang="en-US" dirty="0" smtClean="0"/>
+              <a:t>Naming</a:t>
+            </a:r>
+          </a:p>
+          <a:p>
+            <a:r>
+              <a:rPr lang="en-US" dirty="0" smtClean="0"/>
+              <a:t>Renaming</a:t>
+            </a:r>
+          </a:p>
+          <a:p>
+            <a:r>
+              <a:rPr lang="en-US" dirty="0" err="1" smtClean="0"/>
+              <a:t>inodes</a:t>
             </a:r>
             <a:endParaRPr lang="en-US" dirty="0" smtClean="0"/>
           </a:p>
           <a:p>
             <a:r>
-              <a:rPr lang="en-US" dirty="0" smtClean="0"/>
-              <a:t>BSD </a:t>
-            </a:r>
-            <a:r>
-              <a:rPr lang="en-US" dirty="0"/>
-              <a:t>BSD Slice</a:t>
-            </a:r>
-          </a:p>
-          <a:p>
-            <a:r>
-              <a:rPr lang="en-US" dirty="0"/>
-              <a:t>ELI Encryption </a:t>
+              <a:rPr lang="en-US" dirty="0" err="1" smtClean="0"/>
+              <a:t>vnodes</a:t>
             </a:r>
             <a:endParaRPr lang="en-US" dirty="0" smtClean="0"/>
           </a:p>
           <a:p>
             <a:r>
               <a:rPr lang="en-US" dirty="0" smtClean="0"/>
-              <a:t>MIRROR </a:t>
-            </a:r>
-            <a:r>
-              <a:rPr lang="en-US" dirty="0"/>
-              <a:t>Disk mirroring</a:t>
-            </a:r>
-          </a:p>
-          <a:p>
-            <a:r>
-              <a:rPr lang="en-US" dirty="0"/>
-              <a:t>JOURNAL Journaling </a:t>
-            </a:r>
-            <a:endParaRPr lang="en-US" dirty="0" smtClean="0"/>
-          </a:p>
-          <a:p>
-            <a:r>
-              <a:rPr lang="en-US" dirty="0" smtClean="0"/>
-              <a:t>RAID </a:t>
-            </a:r>
-            <a:r>
-              <a:rPr lang="en-US" dirty="0"/>
-              <a:t>Software RAID</a:t>
-            </a:r>
-          </a:p>
-          <a:p>
+              <a:t>name cache</a:t>
+            </a:r>
+          </a:p>
+          <a:p>
+            <a:r>
+              <a:rPr lang="en-US" smtClean="0"/>
+              <a:t>GEOM system</a:t>
+            </a:r>
             <a:endParaRPr lang="en-US" dirty="0"/>
           </a:p>
         </p:txBody>
@@ -7771,440 +8236,6 @@
             <a:fld id="{86CB4B4D-7CA3-9044-876B-883B54F8677D}" type="slidenum">
               <a:rPr lang="uk-UA" smtClean="0"/>
               <a:t>30</a:t>
-            </a:fld>
-            <a:endParaRPr lang="uk-UA"/>
-          </a:p>
-        </p:txBody>
-      </p:sp>
-    </p:spTree>
-    <p:extLst>
-      <p:ext uri="{BB962C8B-B14F-4D97-AF65-F5344CB8AC3E}">
-        <p14:creationId xmlns:p14="http://schemas.microsoft.com/office/powerpoint/2010/main" val="2118315128"/>
-      </p:ext>
-    </p:extLst>
-  </p:cSld>
-  <p:clrMapOvr>
-    <a:masterClrMapping/>
-  </p:clrMapOvr>
-  <p:transition spd="med"/>
-</p:sld>
-</file>
-
-<file path=ppt/slides/slide31.xml><?xml version="1.0" encoding="utf-8"?>
-<p:sld xmlns:a="http://schemas.openxmlformats.org/drawingml/2006/main" xmlns:r="http://schemas.openxmlformats.org/officeDocument/2006/relationships" xmlns:p="http://schemas.openxmlformats.org/presentationml/2006/main">
-  <p:cSld>
-    <p:spTree>
-      <p:nvGrpSpPr>
-        <p:cNvPr id="1" name=""/>
-        <p:cNvGrpSpPr/>
-        <p:nvPr/>
-      </p:nvGrpSpPr>
-      <p:grpSpPr>
-        <a:xfrm>
-          <a:off x="0" y="0"/>
-          <a:ext cx="0" cy="0"/>
-          <a:chOff x="0" y="0"/>
-          <a:chExt cx="0" cy="0"/>
-        </a:xfrm>
-      </p:grpSpPr>
-      <p:sp>
-        <p:nvSpPr>
-          <p:cNvPr id="2" name="Title 1"/>
-          <p:cNvSpPr>
-            <a:spLocks noGrp="1"/>
-          </p:cNvSpPr>
-          <p:nvPr>
-            <p:ph type="title"/>
-          </p:nvPr>
-        </p:nvSpPr>
-        <p:spPr/>
-        <p:txBody>
-          <a:bodyPr/>
-          <a:lstStyle/>
-          <a:p>
-            <a:r>
-              <a:rPr lang="en-US" dirty="0" smtClean="0"/>
-              <a:t>A Visual Example</a:t>
-            </a:r>
-            <a:endParaRPr lang="en-US" dirty="0"/>
-          </a:p>
-        </p:txBody>
-      </p:sp>
-      <p:sp>
-        <p:nvSpPr>
-          <p:cNvPr id="3" name="Text Placeholder 2"/>
-          <p:cNvSpPr>
-            <a:spLocks noGrp="1"/>
-          </p:cNvSpPr>
-          <p:nvPr>
-            <p:ph type="body" idx="1"/>
-          </p:nvPr>
-        </p:nvSpPr>
-        <p:spPr/>
-        <p:txBody>
-          <a:bodyPr/>
-          <a:lstStyle/>
-          <a:p>
-            <a:endParaRPr lang="en-US"/>
-          </a:p>
-        </p:txBody>
-      </p:sp>
-      <p:sp>
-        <p:nvSpPr>
-          <p:cNvPr id="4" name="Slide Number Placeholder 3"/>
-          <p:cNvSpPr>
-            <a:spLocks noGrp="1"/>
-          </p:cNvSpPr>
-          <p:nvPr>
-            <p:ph type="sldNum" sz="quarter" idx="2"/>
-          </p:nvPr>
-        </p:nvSpPr>
-        <p:spPr/>
-        <p:txBody>
-          <a:bodyPr/>
-          <a:lstStyle/>
-          <a:p>
-            <a:fld id="{86CB4B4D-7CA3-9044-876B-883B54F8677D}" type="slidenum">
-              <a:rPr lang="uk-UA" smtClean="0"/>
-              <a:t>31</a:t>
-            </a:fld>
-            <a:endParaRPr lang="uk-UA"/>
-          </a:p>
-        </p:txBody>
-      </p:sp>
-    </p:spTree>
-    <p:extLst>
-      <p:ext uri="{BB962C8B-B14F-4D97-AF65-F5344CB8AC3E}">
-        <p14:creationId xmlns:p14="http://schemas.microsoft.com/office/powerpoint/2010/main" val="1336700042"/>
-      </p:ext>
-    </p:extLst>
-  </p:cSld>
-  <p:clrMapOvr>
-    <a:masterClrMapping/>
-  </p:clrMapOvr>
-  <p:transition spd="med"/>
-</p:sld>
-</file>
-
-<file path=ppt/slides/slide32.xml><?xml version="1.0" encoding="utf-8"?>
-<p:sld xmlns:a="http://schemas.openxmlformats.org/drawingml/2006/main" xmlns:r="http://schemas.openxmlformats.org/officeDocument/2006/relationships" xmlns:p="http://schemas.openxmlformats.org/presentationml/2006/main">
-  <p:cSld>
-    <p:spTree>
-      <p:nvGrpSpPr>
-        <p:cNvPr id="1" name=""/>
-        <p:cNvGrpSpPr/>
-        <p:nvPr/>
-      </p:nvGrpSpPr>
-      <p:grpSpPr>
-        <a:xfrm>
-          <a:off x="0" y="0"/>
-          <a:ext cx="0" cy="0"/>
-          <a:chOff x="0" y="0"/>
-          <a:chExt cx="0" cy="0"/>
-        </a:xfrm>
-      </p:grpSpPr>
-      <p:sp>
-        <p:nvSpPr>
-          <p:cNvPr id="2" name="Title 1"/>
-          <p:cNvSpPr>
-            <a:spLocks noGrp="1"/>
-          </p:cNvSpPr>
-          <p:nvPr>
-            <p:ph type="title"/>
-          </p:nvPr>
-        </p:nvSpPr>
-        <p:spPr/>
-        <p:txBody>
-          <a:bodyPr/>
-          <a:lstStyle/>
-          <a:p>
-            <a:r>
-              <a:rPr lang="en-US" dirty="0" smtClean="0"/>
-              <a:t>Performing I/O</a:t>
-            </a:r>
-            <a:endParaRPr lang="en-US" dirty="0"/>
-          </a:p>
-        </p:txBody>
-      </p:sp>
-      <p:sp>
-        <p:nvSpPr>
-          <p:cNvPr id="3" name="Text Placeholder 2"/>
-          <p:cNvSpPr>
-            <a:spLocks noGrp="1"/>
-          </p:cNvSpPr>
-          <p:nvPr>
-            <p:ph type="body" idx="1"/>
-          </p:nvPr>
-        </p:nvSpPr>
-        <p:spPr/>
-        <p:txBody>
-          <a:bodyPr/>
-          <a:lstStyle/>
-          <a:p>
-            <a:r>
-              <a:rPr lang="en-US" dirty="0" err="1"/>
-              <a:t>sudo</a:t>
-            </a:r>
-            <a:r>
-              <a:rPr lang="en-US" dirty="0"/>
-              <a:t> </a:t>
-            </a:r>
-            <a:r>
-              <a:rPr lang="en-US" dirty="0" err="1"/>
-              <a:t>dtrace</a:t>
-            </a:r>
-            <a:r>
-              <a:rPr lang="en-US" dirty="0"/>
-              <a:t> -n ::</a:t>
-            </a:r>
-            <a:r>
-              <a:rPr lang="en-US" dirty="0" err="1"/>
-              <a:t>g_io:entry</a:t>
-            </a:r>
-            <a:endParaRPr lang="en-US" dirty="0"/>
-          </a:p>
-          <a:p>
-            <a:r>
-              <a:rPr lang="en-US" dirty="0"/>
-              <a:t>This gets us the most likely 8 routines we care about.</a:t>
-            </a:r>
-          </a:p>
-        </p:txBody>
-      </p:sp>
-      <p:sp>
-        <p:nvSpPr>
-          <p:cNvPr id="4" name="Slide Number Placeholder 3"/>
-          <p:cNvSpPr>
-            <a:spLocks noGrp="1"/>
-          </p:cNvSpPr>
-          <p:nvPr>
-            <p:ph type="sldNum" sz="quarter" idx="2"/>
-          </p:nvPr>
-        </p:nvSpPr>
-        <p:spPr/>
-        <p:txBody>
-          <a:bodyPr/>
-          <a:lstStyle/>
-          <a:p>
-            <a:fld id="{86CB4B4D-7CA3-9044-876B-883B54F8677D}" type="slidenum">
-              <a:rPr lang="uk-UA" smtClean="0"/>
-              <a:t>32</a:t>
-            </a:fld>
-            <a:endParaRPr lang="uk-UA"/>
-          </a:p>
-        </p:txBody>
-      </p:sp>
-    </p:spTree>
-    <p:extLst>
-      <p:ext uri="{BB962C8B-B14F-4D97-AF65-F5344CB8AC3E}">
-        <p14:creationId xmlns:p14="http://schemas.microsoft.com/office/powerpoint/2010/main" val="731228842"/>
-      </p:ext>
-    </p:extLst>
-  </p:cSld>
-  <p:clrMapOvr>
-    <a:masterClrMapping/>
-  </p:clrMapOvr>
-  <p:transition spd="med"/>
-</p:sld>
-</file>
-
-<file path=ppt/slides/slide33.xml><?xml version="1.0" encoding="utf-8"?>
-<p:sld xmlns:a="http://schemas.openxmlformats.org/drawingml/2006/main" xmlns:r="http://schemas.openxmlformats.org/officeDocument/2006/relationships" xmlns:p="http://schemas.openxmlformats.org/presentationml/2006/main">
-  <p:cSld>
-    <p:spTree>
-      <p:nvGrpSpPr>
-        <p:cNvPr id="1" name=""/>
-        <p:cNvGrpSpPr/>
-        <p:nvPr/>
-      </p:nvGrpSpPr>
-      <p:grpSpPr>
-        <a:xfrm>
-          <a:off x="0" y="0"/>
-          <a:ext cx="0" cy="0"/>
-          <a:chOff x="0" y="0"/>
-          <a:chExt cx="0" cy="0"/>
-        </a:xfrm>
-      </p:grpSpPr>
-      <p:sp>
-        <p:nvSpPr>
-          <p:cNvPr id="2" name="Title 1"/>
-          <p:cNvSpPr>
-            <a:spLocks noGrp="1"/>
-          </p:cNvSpPr>
-          <p:nvPr>
-            <p:ph type="title"/>
-          </p:nvPr>
-        </p:nvSpPr>
-        <p:spPr/>
-        <p:txBody>
-          <a:bodyPr/>
-          <a:lstStyle/>
-          <a:p>
-            <a:r>
-              <a:rPr lang="en-US" dirty="0" smtClean="0"/>
-              <a:t>NFS: The Network Filesystem</a:t>
-            </a:r>
-            <a:endParaRPr lang="en-US" dirty="0"/>
-          </a:p>
-        </p:txBody>
-      </p:sp>
-      <p:sp>
-        <p:nvSpPr>
-          <p:cNvPr id="3" name="Text Placeholder 2"/>
-          <p:cNvSpPr>
-            <a:spLocks noGrp="1"/>
-          </p:cNvSpPr>
-          <p:nvPr>
-            <p:ph type="body" idx="1"/>
-          </p:nvPr>
-        </p:nvSpPr>
-        <p:spPr/>
-        <p:txBody>
-          <a:bodyPr/>
-          <a:lstStyle/>
-          <a:p>
-            <a:r>
-              <a:rPr lang="en-US" dirty="0"/>
-              <a:t>Developed by Sun Microsystems in the 1980s </a:t>
-            </a:r>
-            <a:endParaRPr lang="en-US" dirty="0" smtClean="0"/>
-          </a:p>
-          <a:p>
-            <a:r>
-              <a:rPr lang="en-US" dirty="0" smtClean="0"/>
-              <a:t>Applies </a:t>
-            </a:r>
-            <a:r>
-              <a:rPr lang="en-US" dirty="0"/>
-              <a:t>UNIX semantics to networked files</a:t>
-            </a:r>
-          </a:p>
-          <a:p>
-            <a:r>
-              <a:rPr lang="en-US" dirty="0" smtClean="0"/>
-              <a:t>Version </a:t>
-            </a:r>
-            <a:r>
-              <a:rPr lang="en-US" dirty="0"/>
-              <a:t>2, 3 and 4</a:t>
-            </a:r>
-          </a:p>
-        </p:txBody>
-      </p:sp>
-      <p:sp>
-        <p:nvSpPr>
-          <p:cNvPr id="4" name="Slide Number Placeholder 3"/>
-          <p:cNvSpPr>
-            <a:spLocks noGrp="1"/>
-          </p:cNvSpPr>
-          <p:nvPr>
-            <p:ph type="sldNum" sz="quarter" idx="2"/>
-          </p:nvPr>
-        </p:nvSpPr>
-        <p:spPr/>
-        <p:txBody>
-          <a:bodyPr/>
-          <a:lstStyle/>
-          <a:p>
-            <a:fld id="{86CB4B4D-7CA3-9044-876B-883B54F8677D}" type="slidenum">
-              <a:rPr lang="uk-UA" smtClean="0"/>
-              <a:t>33</a:t>
-            </a:fld>
-            <a:endParaRPr lang="uk-UA"/>
-          </a:p>
-        </p:txBody>
-      </p:sp>
-    </p:spTree>
-    <p:extLst>
-      <p:ext uri="{BB962C8B-B14F-4D97-AF65-F5344CB8AC3E}">
-        <p14:creationId xmlns:p14="http://schemas.microsoft.com/office/powerpoint/2010/main" val="2103776000"/>
-      </p:ext>
-    </p:extLst>
-  </p:cSld>
-  <p:clrMapOvr>
-    <a:masterClrMapping/>
-  </p:clrMapOvr>
-  <p:transition spd="med"/>
-</p:sld>
-</file>
-
-<file path=ppt/slides/slide34.xml><?xml version="1.0" encoding="utf-8"?>
-<p:sld xmlns:a="http://schemas.openxmlformats.org/drawingml/2006/main" xmlns:r="http://schemas.openxmlformats.org/officeDocument/2006/relationships" xmlns:p="http://schemas.openxmlformats.org/presentationml/2006/main">
-  <p:cSld>
-    <p:spTree>
-      <p:nvGrpSpPr>
-        <p:cNvPr id="1" name=""/>
-        <p:cNvGrpSpPr/>
-        <p:nvPr/>
-      </p:nvGrpSpPr>
-      <p:grpSpPr>
-        <a:xfrm>
-          <a:off x="0" y="0"/>
-          <a:ext cx="0" cy="0"/>
-          <a:chOff x="0" y="0"/>
-          <a:chExt cx="0" cy="0"/>
-        </a:xfrm>
-      </p:grpSpPr>
-      <p:sp>
-        <p:nvSpPr>
-          <p:cNvPr id="2" name="Title 1"/>
-          <p:cNvSpPr>
-            <a:spLocks noGrp="1"/>
-          </p:cNvSpPr>
-          <p:nvPr>
-            <p:ph type="title"/>
-          </p:nvPr>
-        </p:nvSpPr>
-        <p:spPr/>
-        <p:txBody>
-          <a:bodyPr/>
-          <a:lstStyle/>
-          <a:p>
-            <a:r>
-              <a:rPr lang="en-US" smtClean="0"/>
-              <a:t>Storage Review</a:t>
-            </a:r>
-            <a:endParaRPr lang="en-US"/>
-          </a:p>
-        </p:txBody>
-      </p:sp>
-      <p:sp>
-        <p:nvSpPr>
-          <p:cNvPr id="3" name="Text Placeholder 2"/>
-          <p:cNvSpPr>
-            <a:spLocks noGrp="1"/>
-          </p:cNvSpPr>
-          <p:nvPr>
-            <p:ph type="body" idx="1"/>
-          </p:nvPr>
-        </p:nvSpPr>
-        <p:spPr/>
-        <p:txBody>
-          <a:bodyPr/>
-          <a:lstStyle/>
-          <a:p>
-            <a:endParaRPr lang="en-US"/>
-          </a:p>
-        </p:txBody>
-      </p:sp>
-      <p:sp>
-        <p:nvSpPr>
-          <p:cNvPr id="4" name="Slide Number Placeholder 3"/>
-          <p:cNvSpPr>
-            <a:spLocks noGrp="1"/>
-          </p:cNvSpPr>
-          <p:nvPr>
-            <p:ph type="sldNum" sz="quarter" idx="2"/>
-          </p:nvPr>
-        </p:nvSpPr>
-        <p:spPr/>
-        <p:txBody>
-          <a:bodyPr/>
-          <a:lstStyle/>
-          <a:p>
-            <a:fld id="{86CB4B4D-7CA3-9044-876B-883B54F8677D}" type="slidenum">
-              <a:rPr lang="uk-UA" smtClean="0"/>
-              <a:t>34</a:t>
             </a:fld>
             <a:endParaRPr lang="uk-UA"/>
           </a:p>
@@ -8221,6 +8252,13 @@
     <a:masterClrMapping/>
   </p:clrMapOvr>
   <p:transition spd="med"/>
+  <p:timing>
+    <p:tnLst>
+      <p:par>
+        <p:cTn id="1" dur="indefinite" restart="never" nodeType="tmRoot"/>
+      </p:par>
+    </p:tnLst>
+  </p:timing>
 </p:sld>
 </file>
 
@@ -8398,6 +8436,13 @@
   <p:clrMapOvr>
     <a:masterClrMapping/>
   </p:clrMapOvr>
+  <p:timing>
+    <p:tnLst>
+      <p:par>
+        <p:cTn id="1" dur="indefinite" restart="never" nodeType="tmRoot"/>
+      </p:par>
+    </p:tnLst>
+  </p:timing>
 </p:sld>
 </file>
 
@@ -8457,21 +8502,52 @@
           <a:lstStyle/>
           <a:p>
             <a:r>
-              <a:rPr lang="en-US" dirty="0" smtClean="0"/>
-              <a:t>Block Smallest piece of stored data</a:t>
-            </a:r>
-          </a:p>
-          <a:p>
-            <a:r>
-              <a:rPr lang="en-US" dirty="0" smtClean="0"/>
-              <a:t>File A collection of blocks</a:t>
-            </a:r>
-          </a:p>
-          <a:p>
-            <a:r>
-              <a:rPr lang="en-US" dirty="0" smtClean="0"/>
-              <a:t>Directory A collection of files</a:t>
-            </a:r>
+              <a:rPr lang="en-US" b="1" dirty="0" smtClean="0"/>
+              <a:t>Block</a:t>
+            </a:r>
+            <a:r>
+              <a:rPr lang="en-US" dirty="0" smtClean="0"/>
+              <a:t> Smallest piece of stored data</a:t>
+            </a:r>
+          </a:p>
+          <a:p>
+            <a:r>
+              <a:rPr lang="en-US" b="1" dirty="0" smtClean="0"/>
+              <a:t>File</a:t>
+            </a:r>
+            <a:r>
+              <a:rPr lang="en-US" dirty="0" smtClean="0"/>
+              <a:t> A collection of blocks</a:t>
+            </a:r>
+          </a:p>
+          <a:p>
+            <a:r>
+              <a:rPr lang="en-US" b="1" dirty="0" smtClean="0"/>
+              <a:t>Directory</a:t>
+            </a:r>
+            <a:r>
+              <a:rPr lang="en-US" dirty="0" smtClean="0"/>
+              <a:t> A collection of </a:t>
+            </a:r>
+            <a:r>
+              <a:rPr lang="en-US" dirty="0" smtClean="0"/>
+              <a:t>files, also a file itself</a:t>
+            </a:r>
+          </a:p>
+          <a:p>
+            <a:r>
+              <a:rPr lang="en-US" b="1" dirty="0" smtClean="0"/>
+              <a:t>Link</a:t>
+            </a:r>
+            <a:r>
+              <a:rPr lang="en-US" b="1" dirty="0"/>
+              <a:t> </a:t>
+            </a:r>
+            <a:r>
+              <a:rPr lang="en-US" dirty="0" smtClean="0"/>
+              <a:t>A special type of file that contains a pointer to a file</a:t>
+            </a:r>
+            <a:endParaRPr lang="en-US" b="1" dirty="0" smtClean="0"/>
           </a:p>
           <a:p>
             <a:endParaRPr lang="en-US" dirty="0"/>
@@ -8557,6 +8633,13 @@
   <p:clrMapOvr>
     <a:masterClrMapping/>
   </p:clrMapOvr>
+  <p:timing>
+    <p:tnLst>
+      <p:par>
+        <p:cTn id="1" dur="indefinite" restart="never" nodeType="tmRoot"/>
+      </p:par>
+    </p:tnLst>
+  </p:timing>
 </p:sld>
 </file>
 
@@ -8728,6 +8811,13 @@
   <p:clrMapOvr>
     <a:masterClrMapping/>
   </p:clrMapOvr>
+  <p:timing>
+    <p:tnLst>
+      <p:par>
+        <p:cTn id="1" dur="indefinite" restart="never" nodeType="tmRoot"/>
+      </p:par>
+    </p:tnLst>
+  </p:timing>
 </p:sld>
 </file>
 
@@ -9195,12 +9285,12 @@
               <a:t>Check the </a:t>
             </a:r>
             <a:r>
-              <a:rPr lang="en-US" dirty="0" err="1" smtClean="0"/>
-              <a:t>users’s</a:t>
-            </a:r>
-            <a:r>
-              <a:rPr lang="en-US" dirty="0" smtClean="0"/>
-              <a:t> permissions against the file permissions</a:t>
+              <a:rPr lang="en-US" dirty="0" smtClean="0"/>
+              <a:t>user’s </a:t>
+            </a:r>
+            <a:r>
+              <a:rPr lang="en-US" dirty="0" smtClean="0"/>
+              <a:t>permissions against the file permissions</a:t>
             </a:r>
           </a:p>
           <a:p>

</xml_diff>